<commit_message>
updated powerpoint inside repo
</commit_message>
<xml_diff>
--- a/Scenery Layout.pptx
+++ b/Scenery Layout.pptx
@@ -9,6 +9,8 @@
     <p:sldId id="257" r:id="rId3"/>
     <p:sldId id="258" r:id="rId4"/>
     <p:sldId id="259" r:id="rId5"/>
+    <p:sldId id="260" r:id="rId6"/>
+    <p:sldId id="261" r:id="rId7"/>
   </p:sldIdLst>
   <p:sldSz cx="12192000" cy="6858000"/>
   <p:notesSz cx="6858000" cy="9144000"/>
@@ -107,6 +109,11 @@
       </a:defRPr>
     </a:lvl9pPr>
   </p:defaultTextStyle>
+  <p:extLst>
+    <p:ext uri="{EFAFB233-063F-42B5-8137-9DF3F51BA10A}">
+      <p15:sldGuideLst xmlns:p15="http://schemas.microsoft.com/office/powerpoint/2012/main"/>
+    </p:ext>
+  </p:extLst>
 </p:presentation>
 </file>
 
@@ -257,7 +264,7 @@
           <a:p>
             <a:fld id="{856BFE26-3A45-154B-ADFD-2E8DA00B338B}" type="datetimeFigureOut">
               <a:rPr lang="en-US" smtClean="0"/>
-              <a:t>3/31/25</a:t>
+              <a:t>4/10/25</a:t>
             </a:fld>
             <a:endParaRPr lang="en-US"/>
           </a:p>
@@ -455,7 +462,7 @@
           <a:p>
             <a:fld id="{856BFE26-3A45-154B-ADFD-2E8DA00B338B}" type="datetimeFigureOut">
               <a:rPr lang="en-US" smtClean="0"/>
-              <a:t>3/31/25</a:t>
+              <a:t>4/10/25</a:t>
             </a:fld>
             <a:endParaRPr lang="en-US"/>
           </a:p>
@@ -663,7 +670,7 @@
           <a:p>
             <a:fld id="{856BFE26-3A45-154B-ADFD-2E8DA00B338B}" type="datetimeFigureOut">
               <a:rPr lang="en-US" smtClean="0"/>
-              <a:t>3/31/25</a:t>
+              <a:t>4/10/25</a:t>
             </a:fld>
             <a:endParaRPr lang="en-US"/>
           </a:p>
@@ -861,7 +868,7 @@
           <a:p>
             <a:fld id="{856BFE26-3A45-154B-ADFD-2E8DA00B338B}" type="datetimeFigureOut">
               <a:rPr lang="en-US" smtClean="0"/>
-              <a:t>3/31/25</a:t>
+              <a:t>4/10/25</a:t>
             </a:fld>
             <a:endParaRPr lang="en-US"/>
           </a:p>
@@ -1136,7 +1143,7 @@
           <a:p>
             <a:fld id="{856BFE26-3A45-154B-ADFD-2E8DA00B338B}" type="datetimeFigureOut">
               <a:rPr lang="en-US" smtClean="0"/>
-              <a:t>3/31/25</a:t>
+              <a:t>4/10/25</a:t>
             </a:fld>
             <a:endParaRPr lang="en-US"/>
           </a:p>
@@ -1401,7 +1408,7 @@
           <a:p>
             <a:fld id="{856BFE26-3A45-154B-ADFD-2E8DA00B338B}" type="datetimeFigureOut">
               <a:rPr lang="en-US" smtClean="0"/>
-              <a:t>3/31/25</a:t>
+              <a:t>4/10/25</a:t>
             </a:fld>
             <a:endParaRPr lang="en-US"/>
           </a:p>
@@ -1813,7 +1820,7 @@
           <a:p>
             <a:fld id="{856BFE26-3A45-154B-ADFD-2E8DA00B338B}" type="datetimeFigureOut">
               <a:rPr lang="en-US" smtClean="0"/>
-              <a:t>3/31/25</a:t>
+              <a:t>4/10/25</a:t>
             </a:fld>
             <a:endParaRPr lang="en-US"/>
           </a:p>
@@ -1954,7 +1961,7 @@
           <a:p>
             <a:fld id="{856BFE26-3A45-154B-ADFD-2E8DA00B338B}" type="datetimeFigureOut">
               <a:rPr lang="en-US" smtClean="0"/>
-              <a:t>3/31/25</a:t>
+              <a:t>4/10/25</a:t>
             </a:fld>
             <a:endParaRPr lang="en-US"/>
           </a:p>
@@ -2067,7 +2074,7 @@
           <a:p>
             <a:fld id="{856BFE26-3A45-154B-ADFD-2E8DA00B338B}" type="datetimeFigureOut">
               <a:rPr lang="en-US" smtClean="0"/>
-              <a:t>3/31/25</a:t>
+              <a:t>4/10/25</a:t>
             </a:fld>
             <a:endParaRPr lang="en-US"/>
           </a:p>
@@ -2378,7 +2385,7 @@
           <a:p>
             <a:fld id="{856BFE26-3A45-154B-ADFD-2E8DA00B338B}" type="datetimeFigureOut">
               <a:rPr lang="en-US" smtClean="0"/>
-              <a:t>3/31/25</a:t>
+              <a:t>4/10/25</a:t>
             </a:fld>
             <a:endParaRPr lang="en-US"/>
           </a:p>
@@ -2666,7 +2673,7 @@
           <a:p>
             <a:fld id="{856BFE26-3A45-154B-ADFD-2E8DA00B338B}" type="datetimeFigureOut">
               <a:rPr lang="en-US" smtClean="0"/>
-              <a:t>3/31/25</a:t>
+              <a:t>4/10/25</a:t>
             </a:fld>
             <a:endParaRPr lang="en-US"/>
           </a:p>
@@ -2907,7 +2914,7 @@
           <a:p>
             <a:fld id="{856BFE26-3A45-154B-ADFD-2E8DA00B338B}" type="datetimeFigureOut">
               <a:rPr lang="en-US" smtClean="0"/>
-              <a:t>3/31/25</a:t>
+              <a:t>4/10/25</a:t>
             </a:fld>
             <a:endParaRPr lang="en-US"/>
           </a:p>
@@ -4398,6 +4405,246 @@
     <p:extLst>
       <p:ext uri="{BB962C8B-B14F-4D97-AF65-F5344CB8AC3E}">
         <p14:creationId xmlns:p14="http://schemas.microsoft.com/office/powerpoint/2010/main" val="2982297825"/>
+      </p:ext>
+    </p:extLst>
+  </p:cSld>
+  <p:clrMapOvr>
+    <a:masterClrMapping/>
+  </p:clrMapOvr>
+</p:sld>
+</file>
+
+<file path=ppt/slides/slide5.xml><?xml version="1.0" encoding="utf-8"?>
+<p:sld xmlns:a="http://schemas.openxmlformats.org/drawingml/2006/main" xmlns:r="http://schemas.openxmlformats.org/officeDocument/2006/relationships" xmlns:p="http://schemas.openxmlformats.org/presentationml/2006/main">
+  <p:cSld>
+    <p:spTree>
+      <p:nvGrpSpPr>
+        <p:cNvPr id="1" name=""/>
+        <p:cNvGrpSpPr/>
+        <p:nvPr/>
+      </p:nvGrpSpPr>
+      <p:grpSpPr>
+        <a:xfrm>
+          <a:off x="0" y="0"/>
+          <a:ext cx="0" cy="0"/>
+          <a:chOff x="0" y="0"/>
+          <a:chExt cx="0" cy="0"/>
+        </a:xfrm>
+      </p:grpSpPr>
+      <p:pic>
+        <p:nvPicPr>
+          <p:cNvPr id="5" name="Picture 4" descr="A cartoon of a green creature with a yellow hat&#10;&#10;AI-generated content may be incorrect.">
+            <a:extLst>
+              <a:ext uri="{FF2B5EF4-FFF2-40B4-BE49-F238E27FC236}">
+                <a16:creationId xmlns:a16="http://schemas.microsoft.com/office/drawing/2014/main" id="{199A0CAA-A91E-5384-5F07-0929EB805BB0}"/>
+              </a:ext>
+            </a:extLst>
+          </p:cNvPr>
+          <p:cNvPicPr>
+            <a:picLocks noChangeAspect="1"/>
+          </p:cNvPicPr>
+          <p:nvPr/>
+        </p:nvPicPr>
+        <p:blipFill>
+          <a:blip r:embed="rId2"/>
+          <a:stretch>
+            <a:fillRect/>
+          </a:stretch>
+        </p:blipFill>
+        <p:spPr>
+          <a:xfrm>
+            <a:off x="3642719" y="544840"/>
+            <a:ext cx="2768600" cy="1549400"/>
+          </a:xfrm>
+          <a:prstGeom prst="rect">
+            <a:avLst/>
+          </a:prstGeom>
+        </p:spPr>
+      </p:pic>
+      <p:pic>
+        <p:nvPicPr>
+          <p:cNvPr id="7" name="Picture 6" descr="A drawing of a blue ghost&#10;&#10;AI-generated content may be incorrect.">
+            <a:extLst>
+              <a:ext uri="{FF2B5EF4-FFF2-40B4-BE49-F238E27FC236}">
+                <a16:creationId xmlns:a16="http://schemas.microsoft.com/office/drawing/2014/main" id="{A599EF02-04EB-849F-E026-777ED72F821E}"/>
+              </a:ext>
+            </a:extLst>
+          </p:cNvPr>
+          <p:cNvPicPr>
+            <a:picLocks noChangeAspect="1"/>
+          </p:cNvPicPr>
+          <p:nvPr/>
+        </p:nvPicPr>
+        <p:blipFill>
+          <a:blip r:embed="rId3"/>
+          <a:stretch>
+            <a:fillRect/>
+          </a:stretch>
+        </p:blipFill>
+        <p:spPr>
+          <a:xfrm>
+            <a:off x="1233914" y="728835"/>
+            <a:ext cx="2768600" cy="1549400"/>
+          </a:xfrm>
+          <a:prstGeom prst="rect">
+            <a:avLst/>
+          </a:prstGeom>
+        </p:spPr>
+      </p:pic>
+      <p:pic>
+        <p:nvPicPr>
+          <p:cNvPr id="9" name="Picture 8" descr="A drawing of a triangle with pink flowers&#10;&#10;AI-generated content may be incorrect.">
+            <a:extLst>
+              <a:ext uri="{FF2B5EF4-FFF2-40B4-BE49-F238E27FC236}">
+                <a16:creationId xmlns:a16="http://schemas.microsoft.com/office/drawing/2014/main" id="{F9986131-FF00-9D45-51BC-2D9CBFBD6A2B}"/>
+              </a:ext>
+            </a:extLst>
+          </p:cNvPr>
+          <p:cNvPicPr>
+            <a:picLocks noChangeAspect="1"/>
+          </p:cNvPicPr>
+          <p:nvPr/>
+        </p:nvPicPr>
+        <p:blipFill>
+          <a:blip r:embed="rId4"/>
+          <a:stretch>
+            <a:fillRect/>
+          </a:stretch>
+        </p:blipFill>
+        <p:spPr>
+          <a:xfrm>
+            <a:off x="1109082" y="2568362"/>
+            <a:ext cx="2768600" cy="1549400"/>
+          </a:xfrm>
+          <a:prstGeom prst="rect">
+            <a:avLst/>
+          </a:prstGeom>
+        </p:spPr>
+      </p:pic>
+      <p:pic>
+        <p:nvPicPr>
+          <p:cNvPr id="11" name="Picture 10" descr="A green and pink cartoon&#10;&#10;AI-generated content may be incorrect.">
+            <a:extLst>
+              <a:ext uri="{FF2B5EF4-FFF2-40B4-BE49-F238E27FC236}">
+                <a16:creationId xmlns:a16="http://schemas.microsoft.com/office/drawing/2014/main" id="{4AA0DA96-1AF2-6728-0B1E-BCAECE257596}"/>
+              </a:ext>
+            </a:extLst>
+          </p:cNvPr>
+          <p:cNvPicPr>
+            <a:picLocks noChangeAspect="1"/>
+          </p:cNvPicPr>
+          <p:nvPr/>
+        </p:nvPicPr>
+        <p:blipFill>
+          <a:blip r:embed="rId5"/>
+          <a:stretch>
+            <a:fillRect/>
+          </a:stretch>
+        </p:blipFill>
+        <p:spPr>
+          <a:xfrm>
+            <a:off x="3877682" y="1984607"/>
+            <a:ext cx="3470972" cy="2423282"/>
+          </a:xfrm>
+          <a:prstGeom prst="rect">
+            <a:avLst/>
+          </a:prstGeom>
+        </p:spPr>
+      </p:pic>
+    </p:spTree>
+    <p:extLst>
+      <p:ext uri="{BB962C8B-B14F-4D97-AF65-F5344CB8AC3E}">
+        <p14:creationId xmlns:p14="http://schemas.microsoft.com/office/powerpoint/2010/main" val="3738183592"/>
+      </p:ext>
+    </p:extLst>
+  </p:cSld>
+  <p:clrMapOvr>
+    <a:masterClrMapping/>
+  </p:clrMapOvr>
+</p:sld>
+</file>
+
+<file path=ppt/slides/slide6.xml><?xml version="1.0" encoding="utf-8"?>
+<p:sld xmlns:a="http://schemas.openxmlformats.org/drawingml/2006/main" xmlns:r="http://schemas.openxmlformats.org/officeDocument/2006/relationships" xmlns:p="http://schemas.openxmlformats.org/presentationml/2006/main">
+  <p:cSld>
+    <p:spTree>
+      <p:nvGrpSpPr>
+        <p:cNvPr id="1" name=""/>
+        <p:cNvGrpSpPr/>
+        <p:nvPr/>
+      </p:nvGrpSpPr>
+      <p:grpSpPr>
+        <a:xfrm>
+          <a:off x="0" y="0"/>
+          <a:ext cx="0" cy="0"/>
+          <a:chOff x="0" y="0"/>
+          <a:chExt cx="0" cy="0"/>
+        </a:xfrm>
+      </p:grpSpPr>
+      <p:pic>
+        <p:nvPicPr>
+          <p:cNvPr id="5" name="Picture 4" descr="A drawing of a hat with flowers&#10;&#10;AI-generated content may be incorrect.">
+            <a:extLst>
+              <a:ext uri="{FF2B5EF4-FFF2-40B4-BE49-F238E27FC236}">
+                <a16:creationId xmlns:a16="http://schemas.microsoft.com/office/drawing/2014/main" id="{85E58EAD-1826-1040-7282-9F66FE290E9F}"/>
+              </a:ext>
+            </a:extLst>
+          </p:cNvPr>
+          <p:cNvPicPr>
+            <a:picLocks noChangeAspect="1"/>
+          </p:cNvPicPr>
+          <p:nvPr/>
+        </p:nvPicPr>
+        <p:blipFill>
+          <a:blip r:embed="rId2"/>
+          <a:stretch>
+            <a:fillRect/>
+          </a:stretch>
+        </p:blipFill>
+        <p:spPr>
+          <a:xfrm>
+            <a:off x="2938656" y="1081978"/>
+            <a:ext cx="2768600" cy="1549400"/>
+          </a:xfrm>
+          <a:prstGeom prst="rect">
+            <a:avLst/>
+          </a:prstGeom>
+        </p:spPr>
+      </p:pic>
+      <p:pic>
+        <p:nvPicPr>
+          <p:cNvPr id="7" name="Picture 6" descr="A drawing of a hat with flowers&#10;&#10;AI-generated content may be incorrect.">
+            <a:extLst>
+              <a:ext uri="{FF2B5EF4-FFF2-40B4-BE49-F238E27FC236}">
+                <a16:creationId xmlns:a16="http://schemas.microsoft.com/office/drawing/2014/main" id="{8AAEF16F-B0F0-7F6D-E174-65D5636601E5}"/>
+              </a:ext>
+            </a:extLst>
+          </p:cNvPr>
+          <p:cNvPicPr>
+            <a:picLocks noChangeAspect="1"/>
+          </p:cNvPicPr>
+          <p:nvPr/>
+        </p:nvPicPr>
+        <p:blipFill>
+          <a:blip r:embed="rId3"/>
+          <a:stretch>
+            <a:fillRect/>
+          </a:stretch>
+        </p:blipFill>
+        <p:spPr>
+          <a:xfrm>
+            <a:off x="5938334" y="1081978"/>
+            <a:ext cx="2768600" cy="1549400"/>
+          </a:xfrm>
+          <a:prstGeom prst="rect">
+            <a:avLst/>
+          </a:prstGeom>
+        </p:spPr>
+      </p:pic>
+    </p:spTree>
+    <p:extLst>
+      <p:ext uri="{BB962C8B-B14F-4D97-AF65-F5344CB8AC3E}">
+        <p14:creationId xmlns:p14="http://schemas.microsoft.com/office/powerpoint/2010/main" val="2518091737"/>
       </p:ext>
     </p:extLst>
   </p:cSld>

</xml_diff>

<commit_message>
added a flow state picture
</commit_message>
<xml_diff>
--- a/Scenery Layout.pptx
+++ b/Scenery Layout.pptx
@@ -5237,56 +5237,36 @@
           <a:chExt cx="0" cy="0"/>
         </a:xfrm>
       </p:grpSpPr>
-      <p:sp>
-        <p:nvSpPr>
-          <p:cNvPr id="2" name="Title 1">
-            <a:extLst>
-              <a:ext uri="{FF2B5EF4-FFF2-40B4-BE49-F238E27FC236}">
-                <a16:creationId xmlns:a16="http://schemas.microsoft.com/office/drawing/2014/main" id="{3B912A20-B7B7-D8A1-D08D-7B2038FDFE22}"/>
-              </a:ext>
-            </a:extLst>
-          </p:cNvPr>
-          <p:cNvSpPr>
-            <a:spLocks noGrp="1"/>
-          </p:cNvSpPr>
-          <p:nvPr>
-            <p:ph type="title"/>
-          </p:nvPr>
-        </p:nvSpPr>
-        <p:spPr/>
-        <p:txBody>
-          <a:bodyPr/>
-          <a:lstStyle/>
-          <a:p>
-            <a:endParaRPr lang="en-US"/>
-          </a:p>
-        </p:txBody>
-      </p:sp>
-      <p:sp>
-        <p:nvSpPr>
-          <p:cNvPr id="3" name="Content Placeholder 2">
-            <a:extLst>
-              <a:ext uri="{FF2B5EF4-FFF2-40B4-BE49-F238E27FC236}">
-                <a16:creationId xmlns:a16="http://schemas.microsoft.com/office/drawing/2014/main" id="{BEE091B3-64E1-5B13-B6CA-7F526421E172}"/>
-              </a:ext>
-            </a:extLst>
-          </p:cNvPr>
-          <p:cNvSpPr>
-            <a:spLocks noGrp="1"/>
-          </p:cNvSpPr>
-          <p:nvPr>
-            <p:ph idx="1"/>
-          </p:nvPr>
-        </p:nvSpPr>
-        <p:spPr/>
-        <p:txBody>
-          <a:bodyPr/>
-          <a:lstStyle/>
-          <a:p>
-            <a:endParaRPr lang="en-US"/>
-          </a:p>
-        </p:txBody>
-      </p:sp>
+      <p:pic>
+        <p:nvPicPr>
+          <p:cNvPr id="5" name="Picture 4" descr="A pixelated image of a bird&#10;&#10;AI-generated content may be incorrect.">
+            <a:extLst>
+              <a:ext uri="{FF2B5EF4-FFF2-40B4-BE49-F238E27FC236}">
+                <a16:creationId xmlns:a16="http://schemas.microsoft.com/office/drawing/2014/main" id="{2624B870-BF75-FB96-35DB-DB73F2587300}"/>
+              </a:ext>
+            </a:extLst>
+          </p:cNvPr>
+          <p:cNvPicPr>
+            <a:picLocks noChangeAspect="1"/>
+          </p:cNvPicPr>
+          <p:nvPr/>
+        </p:nvPicPr>
+        <p:blipFill>
+          <a:blip r:embed="rId2"/>
+          <a:stretch>
+            <a:fillRect/>
+          </a:stretch>
+        </p:blipFill>
+        <p:spPr>
+          <a:xfrm>
+            <a:off x="2976034" y="855133"/>
+            <a:ext cx="6815665" cy="1363133"/>
+          </a:xfrm>
+          <a:prstGeom prst="rect">
+            <a:avLst/>
+          </a:prstGeom>
+        </p:spPr>
+      </p:pic>
     </p:spTree>
     <p:extLst>
       <p:ext uri="{BB962C8B-B14F-4D97-AF65-F5344CB8AC3E}">

</xml_diff>

<commit_message>
moved gif import to powerpoint
</commit_message>
<xml_diff>
--- a/Scenery Layout.pptx
+++ b/Scenery Layout.pptx
@@ -266,7 +266,7 @@
           <a:p>
             <a:fld id="{856BFE26-3A45-154B-ADFD-2E8DA00B338B}" type="datetimeFigureOut">
               <a:rPr lang="en-US" smtClean="0"/>
-              <a:t>4/16/25</a:t>
+              <a:t>5/3/25</a:t>
             </a:fld>
             <a:endParaRPr lang="en-US"/>
           </a:p>
@@ -464,7 +464,7 @@
           <a:p>
             <a:fld id="{856BFE26-3A45-154B-ADFD-2E8DA00B338B}" type="datetimeFigureOut">
               <a:rPr lang="en-US" smtClean="0"/>
-              <a:t>4/16/25</a:t>
+              <a:t>5/3/25</a:t>
             </a:fld>
             <a:endParaRPr lang="en-US"/>
           </a:p>
@@ -672,7 +672,7 @@
           <a:p>
             <a:fld id="{856BFE26-3A45-154B-ADFD-2E8DA00B338B}" type="datetimeFigureOut">
               <a:rPr lang="en-US" smtClean="0"/>
-              <a:t>4/16/25</a:t>
+              <a:t>5/3/25</a:t>
             </a:fld>
             <a:endParaRPr lang="en-US"/>
           </a:p>
@@ -870,7 +870,7 @@
           <a:p>
             <a:fld id="{856BFE26-3A45-154B-ADFD-2E8DA00B338B}" type="datetimeFigureOut">
               <a:rPr lang="en-US" smtClean="0"/>
-              <a:t>4/16/25</a:t>
+              <a:t>5/3/25</a:t>
             </a:fld>
             <a:endParaRPr lang="en-US"/>
           </a:p>
@@ -1145,7 +1145,7 @@
           <a:p>
             <a:fld id="{856BFE26-3A45-154B-ADFD-2E8DA00B338B}" type="datetimeFigureOut">
               <a:rPr lang="en-US" smtClean="0"/>
-              <a:t>4/16/25</a:t>
+              <a:t>5/3/25</a:t>
             </a:fld>
             <a:endParaRPr lang="en-US"/>
           </a:p>
@@ -1410,7 +1410,7 @@
           <a:p>
             <a:fld id="{856BFE26-3A45-154B-ADFD-2E8DA00B338B}" type="datetimeFigureOut">
               <a:rPr lang="en-US" smtClean="0"/>
-              <a:t>4/16/25</a:t>
+              <a:t>5/3/25</a:t>
             </a:fld>
             <a:endParaRPr lang="en-US"/>
           </a:p>
@@ -1822,7 +1822,7 @@
           <a:p>
             <a:fld id="{856BFE26-3A45-154B-ADFD-2E8DA00B338B}" type="datetimeFigureOut">
               <a:rPr lang="en-US" smtClean="0"/>
-              <a:t>4/16/25</a:t>
+              <a:t>5/3/25</a:t>
             </a:fld>
             <a:endParaRPr lang="en-US"/>
           </a:p>
@@ -1963,7 +1963,7 @@
           <a:p>
             <a:fld id="{856BFE26-3A45-154B-ADFD-2E8DA00B338B}" type="datetimeFigureOut">
               <a:rPr lang="en-US" smtClean="0"/>
-              <a:t>4/16/25</a:t>
+              <a:t>5/3/25</a:t>
             </a:fld>
             <a:endParaRPr lang="en-US"/>
           </a:p>
@@ -2076,7 +2076,7 @@
           <a:p>
             <a:fld id="{856BFE26-3A45-154B-ADFD-2E8DA00B338B}" type="datetimeFigureOut">
               <a:rPr lang="en-US" smtClean="0"/>
-              <a:t>4/16/25</a:t>
+              <a:t>5/3/25</a:t>
             </a:fld>
             <a:endParaRPr lang="en-US"/>
           </a:p>
@@ -2387,7 +2387,7 @@
           <a:p>
             <a:fld id="{856BFE26-3A45-154B-ADFD-2E8DA00B338B}" type="datetimeFigureOut">
               <a:rPr lang="en-US" smtClean="0"/>
-              <a:t>4/16/25</a:t>
+              <a:t>5/3/25</a:t>
             </a:fld>
             <a:endParaRPr lang="en-US"/>
           </a:p>
@@ -2675,7 +2675,7 @@
           <a:p>
             <a:fld id="{856BFE26-3A45-154B-ADFD-2E8DA00B338B}" type="datetimeFigureOut">
               <a:rPr lang="en-US" smtClean="0"/>
-              <a:t>4/16/25</a:t>
+              <a:t>5/3/25</a:t>
             </a:fld>
             <a:endParaRPr lang="en-US"/>
           </a:p>
@@ -2916,7 +2916,7 @@
           <a:p>
             <a:fld id="{856BFE26-3A45-154B-ADFD-2E8DA00B338B}" type="datetimeFigureOut">
               <a:rPr lang="en-US" smtClean="0"/>
-              <a:t>4/16/25</a:t>
+              <a:t>5/3/25</a:t>
             </a:fld>
             <a:endParaRPr lang="en-US"/>
           </a:p>
@@ -3349,37 +3349,186 @@
             <p:ph type="ctrTitle"/>
           </p:nvPr>
         </p:nvSpPr>
+        <p:spPr>
+          <a:xfrm>
+            <a:off x="711200" y="899319"/>
+            <a:ext cx="11094720" cy="2356643"/>
+          </a:xfrm>
+        </p:spPr>
+        <p:txBody>
+          <a:bodyPr>
+            <a:normAutofit/>
+          </a:bodyPr>
+          <a:lstStyle/>
+          <a:p>
+            <a:pPr>
+              <a:lnSpc>
+                <a:spcPts val="1350"/>
+              </a:lnSpc>
+            </a:pPr>
+            <a:r>
+              <a:rPr lang="en-US" sz="2000" dirty="0"/>
+              <a:t>How to load GIFs</a:t>
+            </a:r>
+            <a:br>
+              <a:rPr lang="en-US" sz="2000"/>
+            </a:br>
+            <a:endParaRPr lang="en-US" sz="2000" dirty="0"/>
+          </a:p>
+        </p:txBody>
+      </p:sp>
+      <p:sp>
+        <p:nvSpPr>
+          <p:cNvPr id="3" name="Subtitle 2">
+            <a:extLst>
+              <a:ext uri="{FF2B5EF4-FFF2-40B4-BE49-F238E27FC236}">
+                <a16:creationId xmlns:a16="http://schemas.microsoft.com/office/drawing/2014/main" id="{A8E4B754-1EF8-33FB-DF33-3B3CF0DD7700}"/>
+              </a:ext>
+            </a:extLst>
+          </p:cNvPr>
+          <p:cNvSpPr>
+            <a:spLocks noGrp="1"/>
+          </p:cNvSpPr>
+          <p:nvPr>
+            <p:ph type="subTitle" idx="1"/>
+          </p:nvPr>
+        </p:nvSpPr>
         <p:spPr/>
         <p:txBody>
-          <a:bodyPr/>
+          <a:bodyPr>
+            <a:normAutofit lnSpcReduction="10000"/>
+          </a:bodyPr>
           <a:lstStyle/>
           <a:p>
-            <a:endParaRPr lang="en-US"/>
-          </a:p>
-        </p:txBody>
-      </p:sp>
-      <p:sp>
-        <p:nvSpPr>
-          <p:cNvPr id="3" name="Subtitle 2">
-            <a:extLst>
-              <a:ext uri="{FF2B5EF4-FFF2-40B4-BE49-F238E27FC236}">
-                <a16:creationId xmlns:a16="http://schemas.microsoft.com/office/drawing/2014/main" id="{A8E4B754-1EF8-33FB-DF33-3B3CF0DD7700}"/>
-              </a:ext>
-            </a:extLst>
-          </p:cNvPr>
-          <p:cNvSpPr>
-            <a:spLocks noGrp="1"/>
-          </p:cNvSpPr>
-          <p:nvPr>
-            <p:ph type="subTitle" idx="1"/>
-          </p:nvPr>
-        </p:nvSpPr>
-        <p:spPr/>
-        <p:txBody>
-          <a:bodyPr/>
-          <a:lstStyle/>
-          <a:p>
-            <a:endParaRPr lang="en-US"/>
+            <a:r>
+              <a:rPr lang="en-US" sz="2400" b="0" dirty="0">
+                <a:solidFill>
+                  <a:srgbClr val="008000"/>
+                </a:solidFill>
+                <a:effectLst/>
+                <a:latin typeface="Menlo" panose="020B0609030804020204" pitchFamily="49" charset="0"/>
+              </a:rPr>
+              <a:t>&lt;!-- &lt;span&gt;</a:t>
+            </a:r>
+            <a:br>
+              <a:rPr lang="en-US" sz="2400" b="0" dirty="0">
+                <a:solidFill>
+                  <a:srgbClr val="000000"/>
+                </a:solidFill>
+                <a:effectLst/>
+                <a:latin typeface="Menlo" panose="020B0609030804020204" pitchFamily="49" charset="0"/>
+              </a:rPr>
+            </a:br>
+            <a:r>
+              <a:rPr lang="en-US" sz="2400" b="0" dirty="0">
+                <a:solidFill>
+                  <a:srgbClr val="008000"/>
+                </a:solidFill>
+                <a:effectLst/>
+                <a:latin typeface="Menlo" panose="020B0609030804020204" pitchFamily="49" charset="0"/>
+              </a:rPr>
+              <a:t>&lt;</a:t>
+            </a:r>
+            <a:r>
+              <a:rPr lang="en-US" sz="2400" b="0" dirty="0" err="1">
+                <a:solidFill>
+                  <a:srgbClr val="008000"/>
+                </a:solidFill>
+                <a:effectLst/>
+                <a:latin typeface="Menlo" panose="020B0609030804020204" pitchFamily="49" charset="0"/>
+              </a:rPr>
+              <a:t>img</a:t>
+            </a:r>
+            <a:r>
+              <a:rPr lang="en-US" sz="2400" b="0" dirty="0">
+                <a:solidFill>
+                  <a:srgbClr val="008000"/>
+                </a:solidFill>
+                <a:effectLst/>
+                <a:latin typeface="Menlo" panose="020B0609030804020204" pitchFamily="49" charset="0"/>
+              </a:rPr>
+              <a:t> </a:t>
+            </a:r>
+            <a:r>
+              <a:rPr lang="en-US" sz="2400" b="0" dirty="0" err="1">
+                <a:solidFill>
+                  <a:srgbClr val="008000"/>
+                </a:solidFill>
+                <a:effectLst/>
+                <a:latin typeface="Menlo" panose="020B0609030804020204" pitchFamily="49" charset="0"/>
+              </a:rPr>
+              <a:t>src</a:t>
+            </a:r>
+            <a:r>
+              <a:rPr lang="en-US" sz="2400" b="0" dirty="0">
+                <a:solidFill>
+                  <a:srgbClr val="008000"/>
+                </a:solidFill>
+                <a:effectLst/>
+                <a:latin typeface="Menlo" panose="020B0609030804020204" pitchFamily="49" charset="0"/>
+              </a:rPr>
+              <a:t>="/</a:t>
+            </a:r>
+            <a:r>
+              <a:rPr lang="en-US" sz="2400" b="0" dirty="0" err="1">
+                <a:solidFill>
+                  <a:srgbClr val="008000"/>
+                </a:solidFill>
+                <a:effectLst/>
+                <a:latin typeface="Menlo" panose="020B0609030804020204" pitchFamily="49" charset="0"/>
+              </a:rPr>
+              <a:t>progress_pics</a:t>
+            </a:r>
+            <a:r>
+              <a:rPr lang="en-US" sz="2400" b="0" dirty="0">
+                <a:solidFill>
+                  <a:srgbClr val="008000"/>
+                </a:solidFill>
+                <a:effectLst/>
+                <a:latin typeface="Menlo" panose="020B0609030804020204" pitchFamily="49" charset="0"/>
+              </a:rPr>
+              <a:t>/playerAttackTest2.gif" width="300" height="300" style="</a:t>
+            </a:r>
+            <a:r>
+              <a:rPr lang="en-US" sz="2400" b="0" dirty="0" err="1">
+                <a:solidFill>
+                  <a:srgbClr val="008000"/>
+                </a:solidFill>
+                <a:effectLst/>
+                <a:latin typeface="Menlo" panose="020B0609030804020204" pitchFamily="49" charset="0"/>
+              </a:rPr>
+              <a:t>display:inline-block</a:t>
+            </a:r>
+            <a:r>
+              <a:rPr lang="en-US" sz="2400" b="0" dirty="0">
+                <a:solidFill>
+                  <a:srgbClr val="008000"/>
+                </a:solidFill>
+                <a:effectLst/>
+                <a:latin typeface="Menlo" panose="020B0609030804020204" pitchFamily="49" charset="0"/>
+              </a:rPr>
+              <a:t>; vertical-align: middle;" /&gt;</a:t>
+            </a:r>
+            <a:br>
+              <a:rPr lang="en-US" sz="2400" b="0" dirty="0">
+                <a:solidFill>
+                  <a:srgbClr val="000000"/>
+                </a:solidFill>
+                <a:effectLst/>
+                <a:latin typeface="Menlo" panose="020B0609030804020204" pitchFamily="49" charset="0"/>
+              </a:rPr>
+            </a:br>
+            <a:r>
+              <a:rPr lang="en-US" sz="2400" b="0" dirty="0">
+                <a:solidFill>
+                  <a:srgbClr val="008000"/>
+                </a:solidFill>
+                <a:effectLst/>
+                <a:latin typeface="Menlo" panose="020B0609030804020204" pitchFamily="49" charset="0"/>
+              </a:rPr>
+              <a:t>&lt;/span&gt; --&gt;</a:t>
+            </a:r>
+            <a:endParaRPr lang="en-US" dirty="0"/>
           </a:p>
         </p:txBody>
       </p:sp>

</xml_diff>

<commit_message>
we wrote blurb for background designs
</commit_message>
<xml_diff>
--- a/Scenery Layout.pptx
+++ b/Scenery Layout.pptx
@@ -5,7 +5,7 @@
     <p:sldMasterId id="2147483648" r:id="rId1"/>
   </p:sldMasterIdLst>
   <p:notesMasterIdLst>
-    <p:notesMasterId r:id="rId29"/>
+    <p:notesMasterId r:id="rId30"/>
   </p:notesMasterIdLst>
   <p:sldIdLst>
     <p:sldId id="256" r:id="rId2"/>
@@ -18,23 +18,24 @@
     <p:sldId id="263" r:id="rId9"/>
     <p:sldId id="266" r:id="rId10"/>
     <p:sldId id="280" r:id="rId11"/>
-    <p:sldId id="264" r:id="rId12"/>
-    <p:sldId id="265" r:id="rId13"/>
-    <p:sldId id="267" r:id="rId14"/>
-    <p:sldId id="268" r:id="rId15"/>
-    <p:sldId id="269" r:id="rId16"/>
-    <p:sldId id="281" r:id="rId17"/>
-    <p:sldId id="270" r:id="rId18"/>
-    <p:sldId id="271" r:id="rId19"/>
-    <p:sldId id="272" r:id="rId20"/>
-    <p:sldId id="273" r:id="rId21"/>
-    <p:sldId id="274" r:id="rId22"/>
-    <p:sldId id="282" r:id="rId23"/>
-    <p:sldId id="275" r:id="rId24"/>
-    <p:sldId id="276" r:id="rId25"/>
-    <p:sldId id="277" r:id="rId26"/>
-    <p:sldId id="278" r:id="rId27"/>
-    <p:sldId id="279" r:id="rId28"/>
+    <p:sldId id="283" r:id="rId12"/>
+    <p:sldId id="264" r:id="rId13"/>
+    <p:sldId id="265" r:id="rId14"/>
+    <p:sldId id="267" r:id="rId15"/>
+    <p:sldId id="268" r:id="rId16"/>
+    <p:sldId id="269" r:id="rId17"/>
+    <p:sldId id="281" r:id="rId18"/>
+    <p:sldId id="270" r:id="rId19"/>
+    <p:sldId id="271" r:id="rId20"/>
+    <p:sldId id="272" r:id="rId21"/>
+    <p:sldId id="273" r:id="rId22"/>
+    <p:sldId id="274" r:id="rId23"/>
+    <p:sldId id="282" r:id="rId24"/>
+    <p:sldId id="275" r:id="rId25"/>
+    <p:sldId id="276" r:id="rId26"/>
+    <p:sldId id="277" r:id="rId27"/>
+    <p:sldId id="278" r:id="rId28"/>
+    <p:sldId id="279" r:id="rId29"/>
   </p:sldIdLst>
   <p:sldSz cx="12192000" cy="6858000"/>
   <p:notesSz cx="6858000" cy="9144000"/>
@@ -558,7 +559,7 @@
           <a:p>
             <a:fld id="{4EE4FAE4-3B6F-E147-8637-30AB6E87A681}" type="slidenum">
               <a:rPr lang="en-US" smtClean="0"/>
-              <a:t>11</a:t>
+              <a:t>12</a:t>
             </a:fld>
             <a:endParaRPr lang="en-US"/>
           </a:p>
@@ -645,7 +646,7 @@
           <a:p>
             <a:fld id="{4EE4FAE4-3B6F-E147-8637-30AB6E87A681}" type="slidenum">
               <a:rPr lang="en-US" smtClean="0"/>
-              <a:t>23</a:t>
+              <a:t>24</a:t>
             </a:fld>
             <a:endParaRPr lang="en-US"/>
           </a:p>
@@ -732,7 +733,7 @@
           <a:p>
             <a:fld id="{4EE4FAE4-3B6F-E147-8637-30AB6E87A681}" type="slidenum">
               <a:rPr lang="en-US" smtClean="0"/>
-              <a:t>24</a:t>
+              <a:t>25</a:t>
             </a:fld>
             <a:endParaRPr lang="en-US"/>
           </a:p>
@@ -819,7 +820,7 @@
           <a:p>
             <a:fld id="{4EE4FAE4-3B6F-E147-8637-30AB6E87A681}" type="slidenum">
               <a:rPr lang="en-US" smtClean="0"/>
-              <a:t>25</a:t>
+              <a:t>26</a:t>
             </a:fld>
             <a:endParaRPr lang="en-US"/>
           </a:p>
@@ -906,7 +907,7 @@
           <a:p>
             <a:fld id="{4EE4FAE4-3B6F-E147-8637-30AB6E87A681}" type="slidenum">
               <a:rPr lang="en-US" smtClean="0"/>
-              <a:t>26</a:t>
+              <a:t>27</a:t>
             </a:fld>
             <a:endParaRPr lang="en-US"/>
           </a:p>
@@ -998,7 +999,7 @@
           <a:p>
             <a:fld id="{4EE4FAE4-3B6F-E147-8637-30AB6E87A681}" type="slidenum">
               <a:rPr lang="en-US" smtClean="0"/>
-              <a:t>27</a:t>
+              <a:t>28</a:t>
             </a:fld>
             <a:endParaRPr lang="en-US"/>
           </a:p>
@@ -1085,7 +1086,7 @@
           <a:p>
             <a:fld id="{4EE4FAE4-3B6F-E147-8637-30AB6E87A681}" type="slidenum">
               <a:rPr lang="en-US" smtClean="0"/>
-              <a:t>12</a:t>
+              <a:t>13</a:t>
             </a:fld>
             <a:endParaRPr lang="en-US"/>
           </a:p>
@@ -1172,7 +1173,7 @@
           <a:p>
             <a:fld id="{4EE4FAE4-3B6F-E147-8637-30AB6E87A681}" type="slidenum">
               <a:rPr lang="en-US" smtClean="0"/>
-              <a:t>13</a:t>
+              <a:t>14</a:t>
             </a:fld>
             <a:endParaRPr lang="en-US"/>
           </a:p>
@@ -1259,7 +1260,7 @@
           <a:p>
             <a:fld id="{4EE4FAE4-3B6F-E147-8637-30AB6E87A681}" type="slidenum">
               <a:rPr lang="en-US" smtClean="0"/>
-              <a:t>14</a:t>
+              <a:t>15</a:t>
             </a:fld>
             <a:endParaRPr lang="en-US"/>
           </a:p>
@@ -1346,7 +1347,7 @@
           <a:p>
             <a:fld id="{4EE4FAE4-3B6F-E147-8637-30AB6E87A681}" type="slidenum">
               <a:rPr lang="en-US" smtClean="0"/>
-              <a:t>15</a:t>
+              <a:t>16</a:t>
             </a:fld>
             <a:endParaRPr lang="en-US"/>
           </a:p>
@@ -1433,7 +1434,7 @@
           <a:p>
             <a:fld id="{4EE4FAE4-3B6F-E147-8637-30AB6E87A681}" type="slidenum">
               <a:rPr lang="en-US" smtClean="0"/>
-              <a:t>17</a:t>
+              <a:t>18</a:t>
             </a:fld>
             <a:endParaRPr lang="en-US"/>
           </a:p>
@@ -1520,7 +1521,7 @@
           <a:p>
             <a:fld id="{4EE4FAE4-3B6F-E147-8637-30AB6E87A681}" type="slidenum">
               <a:rPr lang="en-US" smtClean="0"/>
-              <a:t>18</a:t>
+              <a:t>19</a:t>
             </a:fld>
             <a:endParaRPr lang="en-US"/>
           </a:p>
@@ -1607,7 +1608,7 @@
           <a:p>
             <a:fld id="{4EE4FAE4-3B6F-E147-8637-30AB6E87A681}" type="slidenum">
               <a:rPr lang="en-US" smtClean="0"/>
-              <a:t>19</a:t>
+              <a:t>20</a:t>
             </a:fld>
             <a:endParaRPr lang="en-US"/>
           </a:p>
@@ -1694,7 +1695,7 @@
           <a:p>
             <a:fld id="{4EE4FAE4-3B6F-E147-8637-30AB6E87A681}" type="slidenum">
               <a:rPr lang="en-US" smtClean="0"/>
-              <a:t>20</a:t>
+              <a:t>21</a:t>
             </a:fld>
             <a:endParaRPr lang="en-US"/>
           </a:p>
@@ -5582,77 +5583,6 @@
           </a:p>
         </p:txBody>
       </p:sp>
-      <p:pic>
-        <p:nvPicPr>
-          <p:cNvPr id="17" name="Picture 16" descr="A screenshot of a video game&#10;&#10;AI-generated content may be incorrect.">
-            <a:extLst>
-              <a:ext uri="{FF2B5EF4-FFF2-40B4-BE49-F238E27FC236}">
-                <a16:creationId xmlns:a16="http://schemas.microsoft.com/office/drawing/2014/main" id="{77F36491-7440-1FC4-AC95-A9A4B149ABA9}"/>
-              </a:ext>
-            </a:extLst>
-          </p:cNvPr>
-          <p:cNvPicPr>
-            <a:picLocks noChangeAspect="1"/>
-          </p:cNvPicPr>
-          <p:nvPr/>
-        </p:nvPicPr>
-        <p:blipFill>
-          <a:blip r:embed="rId8"/>
-          <a:srcRect t="38300"/>
-          <a:stretch/>
-        </p:blipFill>
-        <p:spPr>
-          <a:xfrm>
-            <a:off x="3023554" y="3617567"/>
-            <a:ext cx="5851505" cy="902596"/>
-          </a:xfrm>
-          <a:prstGeom prst="rect">
-            <a:avLst/>
-          </a:prstGeom>
-        </p:spPr>
-      </p:pic>
-      <p:sp>
-        <p:nvSpPr>
-          <p:cNvPr id="18" name="TextBox 17">
-            <a:extLst>
-              <a:ext uri="{FF2B5EF4-FFF2-40B4-BE49-F238E27FC236}">
-                <a16:creationId xmlns:a16="http://schemas.microsoft.com/office/drawing/2014/main" id="{7598EADD-FCA5-D6A3-3FA7-F3CE681D0FB8}"/>
-              </a:ext>
-            </a:extLst>
-          </p:cNvPr>
-          <p:cNvSpPr txBox="1"/>
-          <p:nvPr/>
-        </p:nvSpPr>
-        <p:spPr>
-          <a:xfrm>
-            <a:off x="860613" y="4647252"/>
-            <a:ext cx="10273552" cy="369332"/>
-          </a:xfrm>
-          <a:prstGeom prst="rect">
-            <a:avLst/>
-          </a:prstGeom>
-          <a:solidFill>
-            <a:schemeClr val="accent2"/>
-          </a:solidFill>
-        </p:spPr>
-        <p:txBody>
-          <a:bodyPr wrap="square" rtlCol="0">
-            <a:spAutoFit/>
-          </a:bodyPr>
-          <a:lstStyle/>
-          <a:p>
-            <a:pPr algn="ctr"/>
-            <a:r>
-              <a:rPr lang="en-US" dirty="0">
-                <a:solidFill>
-                  <a:schemeClr val="bg1"/>
-                </a:solidFill>
-              </a:rPr>
-              <a:t>Attack</a:t>
-            </a:r>
-          </a:p>
-        </p:txBody>
-      </p:sp>
     </p:spTree>
     <p:extLst>
       <p:ext uri="{BB962C8B-B14F-4D97-AF65-F5344CB8AC3E}">
@@ -5671,7 +5601,13 @@
   <p:cSld>
     <p:spTree>
       <p:nvGrpSpPr>
-        <p:cNvPr id="1" name=""/>
+        <p:cNvPr id="1" name="">
+          <a:extLst>
+            <a:ext uri="{FF2B5EF4-FFF2-40B4-BE49-F238E27FC236}">
+              <a16:creationId xmlns:a16="http://schemas.microsoft.com/office/drawing/2014/main" id="{857AD921-9A54-F88F-FD65-11CF5E0AD07C}"/>
+            </a:ext>
+          </a:extLst>
+        </p:cNvPr>
         <p:cNvGrpSpPr/>
         <p:nvPr/>
       </p:nvGrpSpPr>
@@ -5685,10 +5621,10 @@
       </p:grpSpPr>
       <p:pic>
         <p:nvPicPr>
-          <p:cNvPr id="5" name="Picture 4" descr="A pixel art of two people&#10;&#10;AI-generated content may be incorrect.">
-            <a:extLst>
-              <a:ext uri="{FF2B5EF4-FFF2-40B4-BE49-F238E27FC236}">
-                <a16:creationId xmlns:a16="http://schemas.microsoft.com/office/drawing/2014/main" id="{FD663610-213C-2D70-12FD-FB156236A7DD}"/>
+          <p:cNvPr id="17" name="Picture 16" descr="A screenshot of a video game&#10;&#10;AI-generated content may be incorrect.">
+            <a:extLst>
+              <a:ext uri="{FF2B5EF4-FFF2-40B4-BE49-F238E27FC236}">
+                <a16:creationId xmlns:a16="http://schemas.microsoft.com/office/drawing/2014/main" id="{EDCE232B-6017-4F37-C204-7CED039E0E13}"/>
               </a:ext>
             </a:extLst>
           </p:cNvPr>
@@ -5698,24 +5634,66 @@
           <p:nvPr/>
         </p:nvPicPr>
         <p:blipFill>
-          <a:blip r:embed="rId3"/>
-          <a:srcRect t="36597"/>
+          <a:blip r:embed="rId2"/>
+          <a:srcRect t="38300"/>
           <a:stretch/>
         </p:blipFill>
         <p:spPr>
           <a:xfrm>
-            <a:off x="670560" y="2063930"/>
-            <a:ext cx="10850880" cy="859971"/>
+            <a:off x="3023554" y="3617567"/>
+            <a:ext cx="5851505" cy="902596"/>
           </a:xfrm>
           <a:prstGeom prst="rect">
             <a:avLst/>
           </a:prstGeom>
         </p:spPr>
       </p:pic>
+      <p:sp>
+        <p:nvSpPr>
+          <p:cNvPr id="18" name="TextBox 17">
+            <a:extLst>
+              <a:ext uri="{FF2B5EF4-FFF2-40B4-BE49-F238E27FC236}">
+                <a16:creationId xmlns:a16="http://schemas.microsoft.com/office/drawing/2014/main" id="{6FF78441-0514-8227-0F8E-C09957A51FF2}"/>
+              </a:ext>
+            </a:extLst>
+          </p:cNvPr>
+          <p:cNvSpPr txBox="1"/>
+          <p:nvPr/>
+        </p:nvSpPr>
+        <p:spPr>
+          <a:xfrm>
+            <a:off x="3023553" y="4647252"/>
+            <a:ext cx="5724207" cy="369332"/>
+          </a:xfrm>
+          <a:prstGeom prst="rect">
+            <a:avLst/>
+          </a:prstGeom>
+          <a:solidFill>
+            <a:schemeClr val="accent2"/>
+          </a:solidFill>
+        </p:spPr>
+        <p:txBody>
+          <a:bodyPr wrap="square" rtlCol="0">
+            <a:spAutoFit/>
+          </a:bodyPr>
+          <a:lstStyle/>
+          <a:p>
+            <a:pPr algn="ctr"/>
+            <a:r>
+              <a:rPr lang="en-US" dirty="0">
+                <a:solidFill>
+                  <a:schemeClr val="bg1"/>
+                </a:solidFill>
+              </a:rPr>
+              <a:t>Attack</a:t>
+            </a:r>
+          </a:p>
+        </p:txBody>
+      </p:sp>
     </p:spTree>
     <p:extLst>
       <p:ext uri="{BB962C8B-B14F-4D97-AF65-F5344CB8AC3E}">
-        <p14:creationId xmlns:p14="http://schemas.microsoft.com/office/powerpoint/2010/main" val="2203391896"/>
+        <p14:creationId xmlns:p14="http://schemas.microsoft.com/office/powerpoint/2010/main" val="2386851655"/>
       </p:ext>
     </p:extLst>
   </p:cSld>
@@ -5744,10 +5722,10 @@
       </p:grpSpPr>
       <p:pic>
         <p:nvPicPr>
-          <p:cNvPr id="5" name="Picture 4" descr="A pixel art of a person with a hat and a sword&#10;&#10;AI-generated content may be incorrect.">
-            <a:extLst>
-              <a:ext uri="{FF2B5EF4-FFF2-40B4-BE49-F238E27FC236}">
-                <a16:creationId xmlns:a16="http://schemas.microsoft.com/office/drawing/2014/main" id="{B7737339-6691-B51F-2F02-809680482B0B}"/>
+          <p:cNvPr id="5" name="Picture 4" descr="A pixel art of two people&#10;&#10;AI-generated content may be incorrect.">
+            <a:extLst>
+              <a:ext uri="{FF2B5EF4-FFF2-40B4-BE49-F238E27FC236}">
+                <a16:creationId xmlns:a16="http://schemas.microsoft.com/office/drawing/2014/main" id="{FD663610-213C-2D70-12FD-FB156236A7DD}"/>
               </a:ext>
             </a:extLst>
           </p:cNvPr>
@@ -5758,14 +5736,13 @@
         </p:nvPicPr>
         <p:blipFill>
           <a:blip r:embed="rId3"/>
-          <a:stretch>
-            <a:fillRect/>
-          </a:stretch>
+          <a:srcRect t="36597"/>
+          <a:stretch/>
         </p:blipFill>
         <p:spPr>
           <a:xfrm>
-            <a:off x="4374606" y="1097281"/>
-            <a:ext cx="4274759" cy="3786400"/>
+            <a:off x="670560" y="2063930"/>
+            <a:ext cx="10850880" cy="859971"/>
           </a:xfrm>
           <a:prstGeom prst="rect">
             <a:avLst/>
@@ -5775,7 +5752,7 @@
     </p:spTree>
     <p:extLst>
       <p:ext uri="{BB962C8B-B14F-4D97-AF65-F5344CB8AC3E}">
-        <p14:creationId xmlns:p14="http://schemas.microsoft.com/office/powerpoint/2010/main" val="2519188414"/>
+        <p14:creationId xmlns:p14="http://schemas.microsoft.com/office/powerpoint/2010/main" val="2203391896"/>
       </p:ext>
     </p:extLst>
   </p:cSld>
@@ -5804,10 +5781,10 @@
       </p:grpSpPr>
       <p:pic>
         <p:nvPicPr>
-          <p:cNvPr id="5" name="Picture 4" descr="A pixel art of a person in a hat&#10;&#10;AI-generated content may be incorrect.">
-            <a:extLst>
-              <a:ext uri="{FF2B5EF4-FFF2-40B4-BE49-F238E27FC236}">
-                <a16:creationId xmlns:a16="http://schemas.microsoft.com/office/drawing/2014/main" id="{5226F2BF-8C70-03DC-A0B5-2D1805E69020}"/>
+          <p:cNvPr id="5" name="Picture 4" descr="A pixel art of a person with a hat and a sword&#10;&#10;AI-generated content may be incorrect.">
+            <a:extLst>
+              <a:ext uri="{FF2B5EF4-FFF2-40B4-BE49-F238E27FC236}">
+                <a16:creationId xmlns:a16="http://schemas.microsoft.com/office/drawing/2014/main" id="{B7737339-6691-B51F-2F02-809680482B0B}"/>
               </a:ext>
             </a:extLst>
           </p:cNvPr>
@@ -5824,8 +5801,8 @@
         </p:blipFill>
         <p:spPr>
           <a:xfrm>
-            <a:off x="4191724" y="1550850"/>
-            <a:ext cx="3201851" cy="3201851"/>
+            <a:off x="4374606" y="1097281"/>
+            <a:ext cx="4274759" cy="3786400"/>
           </a:xfrm>
           <a:prstGeom prst="rect">
             <a:avLst/>
@@ -5835,7 +5812,7 @@
     </p:spTree>
     <p:extLst>
       <p:ext uri="{BB962C8B-B14F-4D97-AF65-F5344CB8AC3E}">
-        <p14:creationId xmlns:p14="http://schemas.microsoft.com/office/powerpoint/2010/main" val="1243193261"/>
+        <p14:creationId xmlns:p14="http://schemas.microsoft.com/office/powerpoint/2010/main" val="2519188414"/>
       </p:ext>
     </p:extLst>
   </p:cSld>
@@ -5864,10 +5841,10 @@
       </p:grpSpPr>
       <p:pic>
         <p:nvPicPr>
-          <p:cNvPr id="5" name="Picture 4" descr="A pixel art of two people&#10;&#10;AI-generated content may be incorrect.">
-            <a:extLst>
-              <a:ext uri="{FF2B5EF4-FFF2-40B4-BE49-F238E27FC236}">
-                <a16:creationId xmlns:a16="http://schemas.microsoft.com/office/drawing/2014/main" id="{DA30E99C-4CAC-F7C3-BA5D-F9651A9A3992}"/>
+          <p:cNvPr id="5" name="Picture 4" descr="A pixel art of a person in a hat&#10;&#10;AI-generated content may be incorrect.">
+            <a:extLst>
+              <a:ext uri="{FF2B5EF4-FFF2-40B4-BE49-F238E27FC236}">
+                <a16:creationId xmlns:a16="http://schemas.microsoft.com/office/drawing/2014/main" id="{5226F2BF-8C70-03DC-A0B5-2D1805E69020}"/>
               </a:ext>
             </a:extLst>
           </p:cNvPr>
@@ -5884,8 +5861,8 @@
         </p:blipFill>
         <p:spPr>
           <a:xfrm>
-            <a:off x="3071223" y="1161868"/>
-            <a:ext cx="6820262" cy="3410131"/>
+            <a:off x="4191724" y="1550850"/>
+            <a:ext cx="3201851" cy="3201851"/>
           </a:xfrm>
           <a:prstGeom prst="rect">
             <a:avLst/>
@@ -5895,7 +5872,7 @@
     </p:spTree>
     <p:extLst>
       <p:ext uri="{BB962C8B-B14F-4D97-AF65-F5344CB8AC3E}">
-        <p14:creationId xmlns:p14="http://schemas.microsoft.com/office/powerpoint/2010/main" val="2197821054"/>
+        <p14:creationId xmlns:p14="http://schemas.microsoft.com/office/powerpoint/2010/main" val="1243193261"/>
       </p:ext>
     </p:extLst>
   </p:cSld>
@@ -5924,6 +5901,66 @@
       </p:grpSpPr>
       <p:pic>
         <p:nvPicPr>
+          <p:cNvPr id="5" name="Picture 4" descr="A pixel art of two people&#10;&#10;AI-generated content may be incorrect.">
+            <a:extLst>
+              <a:ext uri="{FF2B5EF4-FFF2-40B4-BE49-F238E27FC236}">
+                <a16:creationId xmlns:a16="http://schemas.microsoft.com/office/drawing/2014/main" id="{DA30E99C-4CAC-F7C3-BA5D-F9651A9A3992}"/>
+              </a:ext>
+            </a:extLst>
+          </p:cNvPr>
+          <p:cNvPicPr>
+            <a:picLocks noChangeAspect="1"/>
+          </p:cNvPicPr>
+          <p:nvPr/>
+        </p:nvPicPr>
+        <p:blipFill>
+          <a:blip r:embed="rId3"/>
+          <a:stretch>
+            <a:fillRect/>
+          </a:stretch>
+        </p:blipFill>
+        <p:spPr>
+          <a:xfrm>
+            <a:off x="3071223" y="1161868"/>
+            <a:ext cx="6820262" cy="3410131"/>
+          </a:xfrm>
+          <a:prstGeom prst="rect">
+            <a:avLst/>
+          </a:prstGeom>
+        </p:spPr>
+      </p:pic>
+    </p:spTree>
+    <p:extLst>
+      <p:ext uri="{BB962C8B-B14F-4D97-AF65-F5344CB8AC3E}">
+        <p14:creationId xmlns:p14="http://schemas.microsoft.com/office/powerpoint/2010/main" val="2197821054"/>
+      </p:ext>
+    </p:extLst>
+  </p:cSld>
+  <p:clrMapOvr>
+    <a:masterClrMapping/>
+  </p:clrMapOvr>
+</p:sld>
+</file>
+
+<file path=ppt/slides/slide16.xml><?xml version="1.0" encoding="utf-8"?>
+<p:sld xmlns:a="http://schemas.openxmlformats.org/drawingml/2006/main" xmlns:r="http://schemas.openxmlformats.org/officeDocument/2006/relationships" xmlns:p="http://schemas.openxmlformats.org/presentationml/2006/main">
+  <p:cSld>
+    <p:spTree>
+      <p:nvGrpSpPr>
+        <p:cNvPr id="1" name=""/>
+        <p:cNvGrpSpPr/>
+        <p:nvPr/>
+      </p:nvGrpSpPr>
+      <p:grpSpPr>
+        <a:xfrm>
+          <a:off x="0" y="0"/>
+          <a:ext cx="0" cy="0"/>
+          <a:chOff x="0" y="0"/>
+          <a:chExt cx="0" cy="0"/>
+        </a:xfrm>
+      </p:grpSpPr>
+      <p:pic>
+        <p:nvPicPr>
           <p:cNvPr id="5" name="Picture 4" descr="A pixel art of a person with a hat and sword&#10;&#10;AI-generated content may be incorrect.">
             <a:extLst>
               <a:ext uri="{FF2B5EF4-FFF2-40B4-BE49-F238E27FC236}">
@@ -5965,7 +6002,7 @@
 </p:sld>
 </file>
 
-<file path=ppt/slides/slide16.xml><?xml version="1.0" encoding="utf-8"?>
+<file path=ppt/slides/slide17.xml><?xml version="1.0" encoding="utf-8"?>
 <p:sld xmlns:a="http://schemas.openxmlformats.org/drawingml/2006/main" xmlns:r="http://schemas.openxmlformats.org/officeDocument/2006/relationships" xmlns:p="http://schemas.openxmlformats.org/presentationml/2006/main">
   <p:cSld>
     <p:spTree>
@@ -6136,66 +6173,6 @@
     <p:extLst>
       <p:ext uri="{BB962C8B-B14F-4D97-AF65-F5344CB8AC3E}">
         <p14:creationId xmlns:p14="http://schemas.microsoft.com/office/powerpoint/2010/main" val="2260527765"/>
-      </p:ext>
-    </p:extLst>
-  </p:cSld>
-  <p:clrMapOvr>
-    <a:masterClrMapping/>
-  </p:clrMapOvr>
-</p:sld>
-</file>
-
-<file path=ppt/slides/slide17.xml><?xml version="1.0" encoding="utf-8"?>
-<p:sld xmlns:a="http://schemas.openxmlformats.org/drawingml/2006/main" xmlns:r="http://schemas.openxmlformats.org/officeDocument/2006/relationships" xmlns:p="http://schemas.openxmlformats.org/presentationml/2006/main">
-  <p:cSld>
-    <p:spTree>
-      <p:nvGrpSpPr>
-        <p:cNvPr id="1" name=""/>
-        <p:cNvGrpSpPr/>
-        <p:nvPr/>
-      </p:nvGrpSpPr>
-      <p:grpSpPr>
-        <a:xfrm>
-          <a:off x="0" y="0"/>
-          <a:ext cx="0" cy="0"/>
-          <a:chOff x="0" y="0"/>
-          <a:chExt cx="0" cy="0"/>
-        </a:xfrm>
-      </p:grpSpPr>
-      <p:pic>
-        <p:nvPicPr>
-          <p:cNvPr id="5" name="Picture 4" descr="A pixel art of a couple of faces&#10;&#10;AI-generated content may be incorrect.">
-            <a:extLst>
-              <a:ext uri="{FF2B5EF4-FFF2-40B4-BE49-F238E27FC236}">
-                <a16:creationId xmlns:a16="http://schemas.microsoft.com/office/drawing/2014/main" id="{7E0429B7-FB2A-3145-9A54-609226872C90}"/>
-              </a:ext>
-            </a:extLst>
-          </p:cNvPr>
-          <p:cNvPicPr>
-            <a:picLocks noChangeAspect="1"/>
-          </p:cNvPicPr>
-          <p:nvPr/>
-        </p:nvPicPr>
-        <p:blipFill>
-          <a:blip r:embed="rId3"/>
-          <a:stretch>
-            <a:fillRect/>
-          </a:stretch>
-        </p:blipFill>
-        <p:spPr>
-          <a:xfrm>
-            <a:off x="2554514" y="2014946"/>
-            <a:ext cx="7772400" cy="1943100"/>
-          </a:xfrm>
-          <a:prstGeom prst="rect">
-            <a:avLst/>
-          </a:prstGeom>
-        </p:spPr>
-      </p:pic>
-    </p:spTree>
-    <p:extLst>
-      <p:ext uri="{BB962C8B-B14F-4D97-AF65-F5344CB8AC3E}">
-        <p14:creationId xmlns:p14="http://schemas.microsoft.com/office/powerpoint/2010/main" val="2832568323"/>
       </p:ext>
     </p:extLst>
   </p:cSld>
@@ -6224,10 +6201,10 @@
       </p:grpSpPr>
       <p:pic>
         <p:nvPicPr>
-          <p:cNvPr id="5" name="Picture 4" descr="A pixel art of a person with a sword&#10;&#10;AI-generated content may be incorrect.">
-            <a:extLst>
-              <a:ext uri="{FF2B5EF4-FFF2-40B4-BE49-F238E27FC236}">
-                <a16:creationId xmlns:a16="http://schemas.microsoft.com/office/drawing/2014/main" id="{38A27494-9D8E-D6D9-2008-C52D5ECD00F9}"/>
+          <p:cNvPr id="5" name="Picture 4" descr="A pixel art of a couple of faces&#10;&#10;AI-generated content may be incorrect.">
+            <a:extLst>
+              <a:ext uri="{FF2B5EF4-FFF2-40B4-BE49-F238E27FC236}">
+                <a16:creationId xmlns:a16="http://schemas.microsoft.com/office/drawing/2014/main" id="{7E0429B7-FB2A-3145-9A54-609226872C90}"/>
               </a:ext>
             </a:extLst>
           </p:cNvPr>
@@ -6244,8 +6221,8 @@
         </p:blipFill>
         <p:spPr>
           <a:xfrm>
-            <a:off x="783771" y="2497183"/>
-            <a:ext cx="11181804" cy="1863634"/>
+            <a:off x="2554514" y="2014946"/>
+            <a:ext cx="7772400" cy="1943100"/>
           </a:xfrm>
           <a:prstGeom prst="rect">
             <a:avLst/>
@@ -6255,7 +6232,7 @@
     </p:spTree>
     <p:extLst>
       <p:ext uri="{BB962C8B-B14F-4D97-AF65-F5344CB8AC3E}">
-        <p14:creationId xmlns:p14="http://schemas.microsoft.com/office/powerpoint/2010/main" val="3599083202"/>
+        <p14:creationId xmlns:p14="http://schemas.microsoft.com/office/powerpoint/2010/main" val="2832568323"/>
       </p:ext>
     </p:extLst>
   </p:cSld>
@@ -6284,10 +6261,10 @@
       </p:grpSpPr>
       <p:pic>
         <p:nvPicPr>
-          <p:cNvPr id="5" name="Picture 4" descr="A pixelated video game of a person lying on the ground&#10;&#10;AI-generated content may be incorrect.">
-            <a:extLst>
-              <a:ext uri="{FF2B5EF4-FFF2-40B4-BE49-F238E27FC236}">
-                <a16:creationId xmlns:a16="http://schemas.microsoft.com/office/drawing/2014/main" id="{C9EE4E8C-506D-EF3A-014F-2211801C04D0}"/>
+          <p:cNvPr id="5" name="Picture 4" descr="A pixel art of a person with a sword&#10;&#10;AI-generated content may be incorrect.">
+            <a:extLst>
+              <a:ext uri="{FF2B5EF4-FFF2-40B4-BE49-F238E27FC236}">
+                <a16:creationId xmlns:a16="http://schemas.microsoft.com/office/drawing/2014/main" id="{38A27494-9D8E-D6D9-2008-C52D5ECD00F9}"/>
               </a:ext>
             </a:extLst>
           </p:cNvPr>
@@ -6304,8 +6281,8 @@
         </p:blipFill>
         <p:spPr>
           <a:xfrm>
-            <a:off x="3684088" y="375193"/>
-            <a:ext cx="4823824" cy="4823824"/>
+            <a:off x="783771" y="2497183"/>
+            <a:ext cx="11181804" cy="1863634"/>
           </a:xfrm>
           <a:prstGeom prst="rect">
             <a:avLst/>
@@ -6315,7 +6292,7 @@
     </p:spTree>
     <p:extLst>
       <p:ext uri="{BB962C8B-B14F-4D97-AF65-F5344CB8AC3E}">
-        <p14:creationId xmlns:p14="http://schemas.microsoft.com/office/powerpoint/2010/main" val="3798418715"/>
+        <p14:creationId xmlns:p14="http://schemas.microsoft.com/office/powerpoint/2010/main" val="3599083202"/>
       </p:ext>
     </p:extLst>
   </p:cSld>
@@ -6644,10 +6621,10 @@
       </p:grpSpPr>
       <p:pic>
         <p:nvPicPr>
-          <p:cNvPr id="5" name="Picture 4" descr="A screenshot of a video game&#10;&#10;AI-generated content may be incorrect.">
-            <a:extLst>
-              <a:ext uri="{FF2B5EF4-FFF2-40B4-BE49-F238E27FC236}">
-                <a16:creationId xmlns:a16="http://schemas.microsoft.com/office/drawing/2014/main" id="{2CE74E9C-16F4-0C03-D68D-B79FBE15EFE0}"/>
+          <p:cNvPr id="5" name="Picture 4" descr="A pixelated video game of a person lying on the ground&#10;&#10;AI-generated content may be incorrect.">
+            <a:extLst>
+              <a:ext uri="{FF2B5EF4-FFF2-40B4-BE49-F238E27FC236}">
+                <a16:creationId xmlns:a16="http://schemas.microsoft.com/office/drawing/2014/main" id="{C9EE4E8C-506D-EF3A-014F-2211801C04D0}"/>
               </a:ext>
             </a:extLst>
           </p:cNvPr>
@@ -6664,8 +6641,8 @@
         </p:blipFill>
         <p:spPr>
           <a:xfrm>
-            <a:off x="1129211" y="1785983"/>
-            <a:ext cx="9933577" cy="2483394"/>
+            <a:off x="3684088" y="375193"/>
+            <a:ext cx="4823824" cy="4823824"/>
           </a:xfrm>
           <a:prstGeom prst="rect">
             <a:avLst/>
@@ -6675,7 +6652,7 @@
     </p:spTree>
     <p:extLst>
       <p:ext uri="{BB962C8B-B14F-4D97-AF65-F5344CB8AC3E}">
-        <p14:creationId xmlns:p14="http://schemas.microsoft.com/office/powerpoint/2010/main" val="1304492956"/>
+        <p14:creationId xmlns:p14="http://schemas.microsoft.com/office/powerpoint/2010/main" val="3798418715"/>
       </p:ext>
     </p:extLst>
   </p:cSld>
@@ -6702,6 +6679,66 @@
           <a:chExt cx="0" cy="0"/>
         </a:xfrm>
       </p:grpSpPr>
+      <p:pic>
+        <p:nvPicPr>
+          <p:cNvPr id="5" name="Picture 4" descr="A screenshot of a video game&#10;&#10;AI-generated content may be incorrect.">
+            <a:extLst>
+              <a:ext uri="{FF2B5EF4-FFF2-40B4-BE49-F238E27FC236}">
+                <a16:creationId xmlns:a16="http://schemas.microsoft.com/office/drawing/2014/main" id="{2CE74E9C-16F4-0C03-D68D-B79FBE15EFE0}"/>
+              </a:ext>
+            </a:extLst>
+          </p:cNvPr>
+          <p:cNvPicPr>
+            <a:picLocks noChangeAspect="1"/>
+          </p:cNvPicPr>
+          <p:nvPr/>
+        </p:nvPicPr>
+        <p:blipFill>
+          <a:blip r:embed="rId3"/>
+          <a:stretch>
+            <a:fillRect/>
+          </a:stretch>
+        </p:blipFill>
+        <p:spPr>
+          <a:xfrm>
+            <a:off x="1129211" y="1785983"/>
+            <a:ext cx="9933577" cy="2483394"/>
+          </a:xfrm>
+          <a:prstGeom prst="rect">
+            <a:avLst/>
+          </a:prstGeom>
+        </p:spPr>
+      </p:pic>
+    </p:spTree>
+    <p:extLst>
+      <p:ext uri="{BB962C8B-B14F-4D97-AF65-F5344CB8AC3E}">
+        <p14:creationId xmlns:p14="http://schemas.microsoft.com/office/powerpoint/2010/main" val="1304492956"/>
+      </p:ext>
+    </p:extLst>
+  </p:cSld>
+  <p:clrMapOvr>
+    <a:masterClrMapping/>
+  </p:clrMapOvr>
+</p:sld>
+</file>
+
+<file path=ppt/slides/slide22.xml><?xml version="1.0" encoding="utf-8"?>
+<p:sld xmlns:a="http://schemas.openxmlformats.org/drawingml/2006/main" xmlns:r="http://schemas.openxmlformats.org/officeDocument/2006/relationships" xmlns:p="http://schemas.openxmlformats.org/presentationml/2006/main">
+  <p:cSld>
+    <p:spTree>
+      <p:nvGrpSpPr>
+        <p:cNvPr id="1" name=""/>
+        <p:cNvGrpSpPr/>
+        <p:nvPr/>
+      </p:nvGrpSpPr>
+      <p:grpSpPr>
+        <a:xfrm>
+          <a:off x="0" y="0"/>
+          <a:ext cx="0" cy="0"/>
+          <a:chOff x="0" y="0"/>
+          <a:chExt cx="0" cy="0"/>
+        </a:xfrm>
+      </p:grpSpPr>
       <p:sp>
         <p:nvSpPr>
           <p:cNvPr id="2" name="Title 1">
@@ -6768,7 +6805,7 @@
 </p:sld>
 </file>
 
-<file path=ppt/slides/slide22.xml><?xml version="1.0" encoding="utf-8"?>
+<file path=ppt/slides/slide23.xml><?xml version="1.0" encoding="utf-8"?>
 <p:sld xmlns:a="http://schemas.openxmlformats.org/drawingml/2006/main" xmlns:r="http://schemas.openxmlformats.org/officeDocument/2006/relationships" xmlns:p="http://schemas.openxmlformats.org/presentationml/2006/main">
   <p:cSld>
     <p:spTree>
@@ -7159,7 +7196,7 @@
 </p:sld>
 </file>
 
-<file path=ppt/slides/slide23.xml><?xml version="1.0" encoding="utf-8"?>
+<file path=ppt/slides/slide24.xml><?xml version="1.0" encoding="utf-8"?>
 <p:sld xmlns:a="http://schemas.openxmlformats.org/drawingml/2006/main" xmlns:r="http://schemas.openxmlformats.org/officeDocument/2006/relationships" xmlns:p="http://schemas.openxmlformats.org/presentationml/2006/main">
   <p:cSld>
     <p:spTree>
@@ -7219,7 +7256,7 @@
 </p:sld>
 </file>
 
-<file path=ppt/slides/slide24.xml><?xml version="1.0" encoding="utf-8"?>
+<file path=ppt/slides/slide25.xml><?xml version="1.0" encoding="utf-8"?>
 <p:sld xmlns:a="http://schemas.openxmlformats.org/drawingml/2006/main" xmlns:r="http://schemas.openxmlformats.org/officeDocument/2006/relationships" xmlns:p="http://schemas.openxmlformats.org/presentationml/2006/main">
   <p:cSld>
     <p:bg>
@@ -7441,7 +7478,7 @@
 </p:sld>
 </file>
 
-<file path=ppt/slides/slide25.xml><?xml version="1.0" encoding="utf-8"?>
+<file path=ppt/slides/slide26.xml><?xml version="1.0" encoding="utf-8"?>
 <p:sld xmlns:a="http://schemas.openxmlformats.org/drawingml/2006/main" xmlns:r="http://schemas.openxmlformats.org/officeDocument/2006/relationships" xmlns:p="http://schemas.openxmlformats.org/presentationml/2006/main">
   <p:cSld>
     <p:spTree>
@@ -7501,7 +7538,7 @@
 </p:sld>
 </file>
 
-<file path=ppt/slides/slide26.xml><?xml version="1.0" encoding="utf-8"?>
+<file path=ppt/slides/slide27.xml><?xml version="1.0" encoding="utf-8"?>
 <p:sld xmlns:a="http://schemas.openxmlformats.org/drawingml/2006/main" xmlns:r="http://schemas.openxmlformats.org/officeDocument/2006/relationships" xmlns:p="http://schemas.openxmlformats.org/presentationml/2006/main">
   <p:cSld>
     <p:spTree>
@@ -7561,7 +7598,7 @@
 </p:sld>
 </file>
 
-<file path=ppt/slides/slide27.xml><?xml version="1.0" encoding="utf-8"?>
+<file path=ppt/slides/slide28.xml><?xml version="1.0" encoding="utf-8"?>
 <p:sld xmlns:a="http://schemas.openxmlformats.org/drawingml/2006/main" xmlns:r="http://schemas.openxmlformats.org/officeDocument/2006/relationships" xmlns:p="http://schemas.openxmlformats.org/presentationml/2006/main">
   <p:cSld>
     <p:spTree>

</xml_diff>

<commit_message>
started to add flow state animations
</commit_message>
<xml_diff>
--- a/Scenery Layout.pptx
+++ b/Scenery Layout.pptx
@@ -5,7 +5,7 @@
     <p:sldMasterId id="2147483648" r:id="rId1"/>
   </p:sldMasterIdLst>
   <p:notesMasterIdLst>
-    <p:notesMasterId r:id="rId31"/>
+    <p:notesMasterId r:id="rId32"/>
   </p:notesMasterIdLst>
   <p:sldIdLst>
     <p:sldId id="256" r:id="rId2"/>
@@ -37,6 +37,7 @@
     <p:sldId id="278" r:id="rId28"/>
     <p:sldId id="279" r:id="rId29"/>
     <p:sldId id="284" r:id="rId30"/>
+    <p:sldId id="285" r:id="rId31"/>
   </p:sldIdLst>
   <p:sldSz cx="12192000" cy="6858000"/>
   <p:notesSz cx="6858000" cy="9144000"/>
@@ -8315,6 +8316,83 @@
     <p:extLst>
       <p:ext uri="{BB962C8B-B14F-4D97-AF65-F5344CB8AC3E}">
         <p14:creationId xmlns:p14="http://schemas.microsoft.com/office/powerpoint/2010/main" val="1839365695"/>
+      </p:ext>
+    </p:extLst>
+  </p:cSld>
+  <p:clrMapOvr>
+    <a:masterClrMapping/>
+  </p:clrMapOvr>
+</p:sld>
+</file>
+
+<file path=ppt/slides/slide30.xml><?xml version="1.0" encoding="utf-8"?>
+<p:sld xmlns:a="http://schemas.openxmlformats.org/drawingml/2006/main" xmlns:r="http://schemas.openxmlformats.org/officeDocument/2006/relationships" xmlns:p="http://schemas.openxmlformats.org/presentationml/2006/main">
+  <p:cSld>
+    <p:spTree>
+      <p:nvGrpSpPr>
+        <p:cNvPr id="1" name=""/>
+        <p:cNvGrpSpPr/>
+        <p:nvPr/>
+      </p:nvGrpSpPr>
+      <p:grpSpPr>
+        <a:xfrm>
+          <a:off x="0" y="0"/>
+          <a:ext cx="0" cy="0"/>
+          <a:chOff x="0" y="0"/>
+          <a:chExt cx="0" cy="0"/>
+        </a:xfrm>
+      </p:grpSpPr>
+      <p:pic>
+        <p:nvPicPr>
+          <p:cNvPr id="1026" name="Picture 2">
+            <a:extLst>
+              <a:ext uri="{FF2B5EF4-FFF2-40B4-BE49-F238E27FC236}">
+                <a16:creationId xmlns:a16="http://schemas.microsoft.com/office/drawing/2014/main" id="{8BA8A61E-C486-EF8C-00C8-9E901815C85D}"/>
+              </a:ext>
+            </a:extLst>
+          </p:cNvPr>
+          <p:cNvPicPr>
+            <a:picLocks noChangeAspect="1" noChangeArrowheads="1"/>
+          </p:cNvPicPr>
+          <p:nvPr/>
+        </p:nvPicPr>
+        <p:blipFill>
+          <a:blip r:embed="rId2">
+            <a:extLst>
+              <a:ext uri="{28A0092B-C50C-407E-A947-70E740481C1C}">
+                <a14:useLocalDpi xmlns:a14="http://schemas.microsoft.com/office/drawing/2010/main" val="0"/>
+              </a:ext>
+            </a:extLst>
+          </a:blip>
+          <a:srcRect/>
+          <a:stretch>
+            <a:fillRect/>
+          </a:stretch>
+        </p:blipFill>
+        <p:spPr bwMode="auto">
+          <a:xfrm>
+            <a:off x="8837281" y="230518"/>
+            <a:ext cx="3149600" cy="787400"/>
+          </a:xfrm>
+          <a:prstGeom prst="rect">
+            <a:avLst/>
+          </a:prstGeom>
+          <a:noFill/>
+          <a:extLst>
+            <a:ext uri="{909E8E84-426E-40DD-AFC4-6F175D3DCCD1}">
+              <a14:hiddenFill xmlns:a14="http://schemas.microsoft.com/office/drawing/2010/main">
+                <a:solidFill>
+                  <a:srgbClr val="FFFFFF"/>
+                </a:solidFill>
+              </a14:hiddenFill>
+            </a:ext>
+          </a:extLst>
+        </p:spPr>
+      </p:pic>
+    </p:spTree>
+    <p:extLst>
+      <p:ext uri="{BB962C8B-B14F-4D97-AF65-F5344CB8AC3E}">
+        <p14:creationId xmlns:p14="http://schemas.microsoft.com/office/powerpoint/2010/main" val="3703832999"/>
       </p:ext>
     </p:extLst>
   </p:cSld>

</xml_diff>

<commit_message>
added flow state bar
</commit_message>
<xml_diff>
--- a/Scenery Layout.pptx
+++ b/Scenery Layout.pptx
@@ -8371,8 +8371,8 @@
         </p:blipFill>
         <p:spPr bwMode="auto">
           <a:xfrm>
-            <a:off x="5876367" y="1362632"/>
-            <a:ext cx="3149600" cy="787400"/>
+            <a:off x="6706372" y="1273733"/>
+            <a:ext cx="4506272" cy="1126568"/>
           </a:xfrm>
           <a:prstGeom prst="rect">
             <a:avLst/>
@@ -8389,6 +8389,190 @@
           </a:extLst>
         </p:spPr>
       </p:pic>
+      <p:pic>
+        <p:nvPicPr>
+          <p:cNvPr id="3" name="Picture 2" descr="A screenshot of a video game&#10;&#10;AI-generated content may be incorrect.">
+            <a:extLst>
+              <a:ext uri="{FF2B5EF4-FFF2-40B4-BE49-F238E27FC236}">
+                <a16:creationId xmlns:a16="http://schemas.microsoft.com/office/drawing/2014/main" id="{437D4C0B-485B-279E-F589-03495BB4C196}"/>
+              </a:ext>
+            </a:extLst>
+          </p:cNvPr>
+          <p:cNvPicPr>
+            <a:picLocks noChangeAspect="1"/>
+          </p:cNvPicPr>
+          <p:nvPr/>
+        </p:nvPicPr>
+        <p:blipFill>
+          <a:blip r:embed="rId3"/>
+          <a:srcRect b="28450"/>
+          <a:stretch/>
+        </p:blipFill>
+        <p:spPr>
+          <a:xfrm>
+            <a:off x="558048" y="3623985"/>
+            <a:ext cx="11075904" cy="1320800"/>
+          </a:xfrm>
+          <a:prstGeom prst="rect">
+            <a:avLst/>
+          </a:prstGeom>
+        </p:spPr>
+      </p:pic>
+      <p:pic>
+        <p:nvPicPr>
+          <p:cNvPr id="5" name="Picture 4" descr="A pixel art of a knife&#10;&#10;AI-generated content may be incorrect.">
+            <a:extLst>
+              <a:ext uri="{FF2B5EF4-FFF2-40B4-BE49-F238E27FC236}">
+                <a16:creationId xmlns:a16="http://schemas.microsoft.com/office/drawing/2014/main" id="{E4CEB174-29F4-0B86-9DDF-B7E7B996959A}"/>
+              </a:ext>
+            </a:extLst>
+          </p:cNvPr>
+          <p:cNvPicPr>
+            <a:picLocks noChangeAspect="1"/>
+          </p:cNvPicPr>
+          <p:nvPr/>
+        </p:nvPicPr>
+        <p:blipFill>
+          <a:blip r:embed="rId4"/>
+          <a:srcRect t="23878" b="31482"/>
+          <a:stretch/>
+        </p:blipFill>
+        <p:spPr>
+          <a:xfrm>
+            <a:off x="1116711" y="786648"/>
+            <a:ext cx="4736374" cy="2114346"/>
+          </a:xfrm>
+          <a:prstGeom prst="rect">
+            <a:avLst/>
+          </a:prstGeom>
+        </p:spPr>
+      </p:pic>
+      <p:sp>
+        <p:nvSpPr>
+          <p:cNvPr id="6" name="TextBox 5">
+            <a:extLst>
+              <a:ext uri="{FF2B5EF4-FFF2-40B4-BE49-F238E27FC236}">
+                <a16:creationId xmlns:a16="http://schemas.microsoft.com/office/drawing/2014/main" id="{2E630B21-D8EC-E272-9E93-44F9A8B507FC}"/>
+              </a:ext>
+            </a:extLst>
+          </p:cNvPr>
+          <p:cNvSpPr txBox="1"/>
+          <p:nvPr/>
+        </p:nvSpPr>
+        <p:spPr>
+          <a:xfrm>
+            <a:off x="558048" y="4944785"/>
+            <a:ext cx="11075904" cy="369332"/>
+          </a:xfrm>
+          <a:prstGeom prst="rect">
+            <a:avLst/>
+          </a:prstGeom>
+          <a:solidFill>
+            <a:schemeClr val="accent2"/>
+          </a:solidFill>
+        </p:spPr>
+        <p:txBody>
+          <a:bodyPr wrap="square" rtlCol="0">
+            <a:spAutoFit/>
+          </a:bodyPr>
+          <a:lstStyle/>
+          <a:p>
+            <a:pPr algn="ctr"/>
+            <a:r>
+              <a:rPr lang="en-US" dirty="0">
+                <a:solidFill>
+                  <a:schemeClr val="bg1"/>
+                </a:solidFill>
+              </a:rPr>
+              <a:t>Flow State Activate</a:t>
+            </a:r>
+          </a:p>
+        </p:txBody>
+      </p:sp>
+      <p:sp>
+        <p:nvSpPr>
+          <p:cNvPr id="7" name="TextBox 6">
+            <a:extLst>
+              <a:ext uri="{FF2B5EF4-FFF2-40B4-BE49-F238E27FC236}">
+                <a16:creationId xmlns:a16="http://schemas.microsoft.com/office/drawing/2014/main" id="{5F58D9DB-9883-26E8-0B03-ED99D4B7FC78}"/>
+              </a:ext>
+            </a:extLst>
+          </p:cNvPr>
+          <p:cNvSpPr txBox="1"/>
+          <p:nvPr/>
+        </p:nvSpPr>
+        <p:spPr>
+          <a:xfrm>
+            <a:off x="6706372" y="2392464"/>
+            <a:ext cx="4927580" cy="369332"/>
+          </a:xfrm>
+          <a:prstGeom prst="rect">
+            <a:avLst/>
+          </a:prstGeom>
+          <a:solidFill>
+            <a:schemeClr val="accent2"/>
+          </a:solidFill>
+        </p:spPr>
+        <p:txBody>
+          <a:bodyPr wrap="square" rtlCol="0">
+            <a:spAutoFit/>
+          </a:bodyPr>
+          <a:lstStyle/>
+          <a:p>
+            <a:pPr algn="ctr"/>
+            <a:r>
+              <a:rPr lang="en-US" dirty="0">
+                <a:solidFill>
+                  <a:schemeClr val="bg1"/>
+                </a:solidFill>
+              </a:rPr>
+              <a:t>Fire on Right of Flow Bar</a:t>
+            </a:r>
+          </a:p>
+        </p:txBody>
+      </p:sp>
+      <p:sp>
+        <p:nvSpPr>
+          <p:cNvPr id="8" name="TextBox 7">
+            <a:extLst>
+              <a:ext uri="{FF2B5EF4-FFF2-40B4-BE49-F238E27FC236}">
+                <a16:creationId xmlns:a16="http://schemas.microsoft.com/office/drawing/2014/main" id="{6ECD460D-C83B-F2F7-5ECB-1FEE3A6630B5}"/>
+              </a:ext>
+            </a:extLst>
+          </p:cNvPr>
+          <p:cNvSpPr txBox="1"/>
+          <p:nvPr/>
+        </p:nvSpPr>
+        <p:spPr>
+          <a:xfrm>
+            <a:off x="1229965" y="2814659"/>
+            <a:ext cx="4927580" cy="369332"/>
+          </a:xfrm>
+          <a:prstGeom prst="rect">
+            <a:avLst/>
+          </a:prstGeom>
+          <a:solidFill>
+            <a:schemeClr val="accent2"/>
+          </a:solidFill>
+        </p:spPr>
+        <p:txBody>
+          <a:bodyPr wrap="square" rtlCol="0">
+            <a:spAutoFit/>
+          </a:bodyPr>
+          <a:lstStyle/>
+          <a:p>
+            <a:pPr algn="ctr"/>
+            <a:r>
+              <a:rPr lang="en-US" dirty="0">
+                <a:solidFill>
+                  <a:schemeClr val="bg1"/>
+                </a:solidFill>
+              </a:rPr>
+              <a:t>Flow Bar</a:t>
+            </a:r>
+          </a:p>
+        </p:txBody>
+      </p:sp>
     </p:spTree>
     <p:extLst>
       <p:ext uri="{BB962C8B-B14F-4D97-AF65-F5344CB8AC3E}">

</xml_diff>

<commit_message>
updated readme with including more precise version
</commit_message>
<xml_diff>
--- a/Scenery Layout.pptx
+++ b/Scenery Layout.pptx
@@ -5,7 +5,7 @@
     <p:sldMasterId id="2147483648" r:id="rId1"/>
   </p:sldMasterIdLst>
   <p:notesMasterIdLst>
-    <p:notesMasterId r:id="rId32"/>
+    <p:notesMasterId r:id="rId33"/>
   </p:notesMasterIdLst>
   <p:sldIdLst>
     <p:sldId id="256" r:id="rId2"/>
@@ -38,6 +38,7 @@
     <p:sldId id="279" r:id="rId29"/>
     <p:sldId id="284" r:id="rId30"/>
     <p:sldId id="285" r:id="rId31"/>
+    <p:sldId id="286" r:id="rId32"/>
   </p:sldIdLst>
   <p:sldSz cx="12192000" cy="6858000"/>
   <p:notesSz cx="6858000" cy="9144000"/>
@@ -226,7 +227,7 @@
           <a:p>
             <a:fld id="{902169C4-2CE8-3045-BD4E-B2C95498600D}" type="datetimeFigureOut">
               <a:rPr lang="en-US" smtClean="0"/>
-              <a:t>5/5/25</a:t>
+              <a:t>5/6/25</a:t>
             </a:fld>
             <a:endParaRPr lang="en-US"/>
           </a:p>
@@ -1863,7 +1864,7 @@
           <a:p>
             <a:fld id="{856BFE26-3A45-154B-ADFD-2E8DA00B338B}" type="datetimeFigureOut">
               <a:rPr lang="en-US" smtClean="0"/>
-              <a:t>5/5/25</a:t>
+              <a:t>5/6/25</a:t>
             </a:fld>
             <a:endParaRPr lang="en-US"/>
           </a:p>
@@ -2061,7 +2062,7 @@
           <a:p>
             <a:fld id="{856BFE26-3A45-154B-ADFD-2E8DA00B338B}" type="datetimeFigureOut">
               <a:rPr lang="en-US" smtClean="0"/>
-              <a:t>5/5/25</a:t>
+              <a:t>5/6/25</a:t>
             </a:fld>
             <a:endParaRPr lang="en-US"/>
           </a:p>
@@ -2269,7 +2270,7 @@
           <a:p>
             <a:fld id="{856BFE26-3A45-154B-ADFD-2E8DA00B338B}" type="datetimeFigureOut">
               <a:rPr lang="en-US" smtClean="0"/>
-              <a:t>5/5/25</a:t>
+              <a:t>5/6/25</a:t>
             </a:fld>
             <a:endParaRPr lang="en-US"/>
           </a:p>
@@ -2467,7 +2468,7 @@
           <a:p>
             <a:fld id="{856BFE26-3A45-154B-ADFD-2E8DA00B338B}" type="datetimeFigureOut">
               <a:rPr lang="en-US" smtClean="0"/>
-              <a:t>5/5/25</a:t>
+              <a:t>5/6/25</a:t>
             </a:fld>
             <a:endParaRPr lang="en-US"/>
           </a:p>
@@ -2742,7 +2743,7 @@
           <a:p>
             <a:fld id="{856BFE26-3A45-154B-ADFD-2E8DA00B338B}" type="datetimeFigureOut">
               <a:rPr lang="en-US" smtClean="0"/>
-              <a:t>5/5/25</a:t>
+              <a:t>5/6/25</a:t>
             </a:fld>
             <a:endParaRPr lang="en-US"/>
           </a:p>
@@ -3007,7 +3008,7 @@
           <a:p>
             <a:fld id="{856BFE26-3A45-154B-ADFD-2E8DA00B338B}" type="datetimeFigureOut">
               <a:rPr lang="en-US" smtClean="0"/>
-              <a:t>5/5/25</a:t>
+              <a:t>5/6/25</a:t>
             </a:fld>
             <a:endParaRPr lang="en-US"/>
           </a:p>
@@ -3419,7 +3420,7 @@
           <a:p>
             <a:fld id="{856BFE26-3A45-154B-ADFD-2E8DA00B338B}" type="datetimeFigureOut">
               <a:rPr lang="en-US" smtClean="0"/>
-              <a:t>5/5/25</a:t>
+              <a:t>5/6/25</a:t>
             </a:fld>
             <a:endParaRPr lang="en-US"/>
           </a:p>
@@ -3560,7 +3561,7 @@
           <a:p>
             <a:fld id="{856BFE26-3A45-154B-ADFD-2E8DA00B338B}" type="datetimeFigureOut">
               <a:rPr lang="en-US" smtClean="0"/>
-              <a:t>5/5/25</a:t>
+              <a:t>5/6/25</a:t>
             </a:fld>
             <a:endParaRPr lang="en-US"/>
           </a:p>
@@ -3673,7 +3674,7 @@
           <a:p>
             <a:fld id="{856BFE26-3A45-154B-ADFD-2E8DA00B338B}" type="datetimeFigureOut">
               <a:rPr lang="en-US" smtClean="0"/>
-              <a:t>5/5/25</a:t>
+              <a:t>5/6/25</a:t>
             </a:fld>
             <a:endParaRPr lang="en-US"/>
           </a:p>
@@ -3984,7 +3985,7 @@
           <a:p>
             <a:fld id="{856BFE26-3A45-154B-ADFD-2E8DA00B338B}" type="datetimeFigureOut">
               <a:rPr lang="en-US" smtClean="0"/>
-              <a:t>5/5/25</a:t>
+              <a:t>5/6/25</a:t>
             </a:fld>
             <a:endParaRPr lang="en-US"/>
           </a:p>
@@ -4272,7 +4273,7 @@
           <a:p>
             <a:fld id="{856BFE26-3A45-154B-ADFD-2E8DA00B338B}" type="datetimeFigureOut">
               <a:rPr lang="en-US" smtClean="0"/>
-              <a:t>5/5/25</a:t>
+              <a:t>5/6/25</a:t>
             </a:fld>
             <a:endParaRPr lang="en-US"/>
           </a:p>
@@ -4513,7 +4514,7 @@
           <a:p>
             <a:fld id="{856BFE26-3A45-154B-ADFD-2E8DA00B338B}" type="datetimeFigureOut">
               <a:rPr lang="en-US" smtClean="0"/>
-              <a:t>5/5/25</a:t>
+              <a:t>5/6/25</a:t>
             </a:fld>
             <a:endParaRPr lang="en-US"/>
           </a:p>
@@ -8577,6 +8578,469 @@
     <p:extLst>
       <p:ext uri="{BB962C8B-B14F-4D97-AF65-F5344CB8AC3E}">
         <p14:creationId xmlns:p14="http://schemas.microsoft.com/office/powerpoint/2010/main" val="3703832999"/>
+      </p:ext>
+    </p:extLst>
+  </p:cSld>
+  <p:clrMapOvr>
+    <a:masterClrMapping/>
+  </p:clrMapOvr>
+</p:sld>
+</file>
+
+<file path=ppt/slides/slide31.xml><?xml version="1.0" encoding="utf-8"?>
+<p:sld xmlns:a="http://schemas.openxmlformats.org/drawingml/2006/main" xmlns:r="http://schemas.openxmlformats.org/officeDocument/2006/relationships" xmlns:p="http://schemas.openxmlformats.org/presentationml/2006/main">
+  <p:cSld>
+    <p:bg>
+      <p:bgPr>
+        <a:solidFill>
+          <a:schemeClr val="bg1"/>
+        </a:solidFill>
+        <a:effectLst/>
+      </p:bgPr>
+    </p:bg>
+    <p:spTree>
+      <p:nvGrpSpPr>
+        <p:cNvPr id="1" name=""/>
+        <p:cNvGrpSpPr/>
+        <p:nvPr/>
+      </p:nvGrpSpPr>
+      <p:grpSpPr>
+        <a:xfrm>
+          <a:off x="0" y="0"/>
+          <a:ext cx="0" cy="0"/>
+          <a:chOff x="0" y="0"/>
+          <a:chExt cx="0" cy="0"/>
+        </a:xfrm>
+      </p:grpSpPr>
+      <p:sp>
+        <p:nvSpPr>
+          <p:cNvPr id="10" name="Rectangle 9">
+            <a:extLst>
+              <a:ext uri="{FF2B5EF4-FFF2-40B4-BE49-F238E27FC236}">
+                <a16:creationId xmlns:a16="http://schemas.microsoft.com/office/drawing/2014/main" id="{42A4FC2C-047E-45A5-965D-8E1E3BF09BC6}"/>
+              </a:ext>
+              <a:ext uri="{C183D7F6-B498-43B3-948B-1728B52AA6E4}">
+                <adec:decorative xmlns:adec="http://schemas.microsoft.com/office/drawing/2017/decorative" val="1"/>
+              </a:ext>
+            </a:extLst>
+          </p:cNvPr>
+          <p:cNvSpPr>
+            <a:spLocks noGrp="1" noRot="1" noChangeAspect="1" noMove="1" noResize="1" noEditPoints="1" noAdjustHandles="1" noChangeArrowheads="1" noChangeShapeType="1" noTextEdit="1"/>
+          </p:cNvSpPr>
+          <p:nvPr>
+            <p:extLst>
+              <p:ext uri="{386F3935-93C4-4BCD-93E2-E3B085C9AB24}">
+                <p16:designElem xmlns:p16="http://schemas.microsoft.com/office/powerpoint/2015/main" val="1"/>
+              </p:ext>
+            </p:extLst>
+          </p:nvPr>
+        </p:nvSpPr>
+        <p:spPr bwMode="white">
+          <a:xfrm>
+            <a:off x="1524" y="0"/>
+            <a:ext cx="12188952" cy="6858000"/>
+          </a:xfrm>
+          <a:prstGeom prst="rect">
+            <a:avLst/>
+          </a:prstGeom>
+          <a:noFill/>
+          <a:ln>
+            <a:noFill/>
+          </a:ln>
+        </p:spPr>
+        <p:style>
+          <a:lnRef idx="2">
+            <a:schemeClr val="accent1">
+              <a:shade val="50000"/>
+            </a:schemeClr>
+          </a:lnRef>
+          <a:fillRef idx="1">
+            <a:schemeClr val="accent1"/>
+          </a:fillRef>
+          <a:effectRef idx="0">
+            <a:schemeClr val="accent1"/>
+          </a:effectRef>
+          <a:fontRef idx="minor">
+            <a:schemeClr val="lt1"/>
+          </a:fontRef>
+        </p:style>
+        <p:txBody>
+          <a:bodyPr rtlCol="0" anchor="ctr"/>
+          <a:lstStyle>
+            <a:defPPr>
+              <a:defRPr lang="en-US"/>
+            </a:defPPr>
+            <a:lvl1pPr marL="0" algn="l" defTabSz="914400" rtl="0" eaLnBrk="1" latinLnBrk="0" hangingPunct="1">
+              <a:defRPr sz="1800" kern="1200">
+                <a:solidFill>
+                  <a:schemeClr val="lt1"/>
+                </a:solidFill>
+                <a:latin typeface="+mn-lt"/>
+                <a:ea typeface="+mn-ea"/>
+                <a:cs typeface="+mn-cs"/>
+              </a:defRPr>
+            </a:lvl1pPr>
+            <a:lvl2pPr marL="457200" algn="l" defTabSz="914400" rtl="0" eaLnBrk="1" latinLnBrk="0" hangingPunct="1">
+              <a:defRPr sz="1800" kern="1200">
+                <a:solidFill>
+                  <a:schemeClr val="lt1"/>
+                </a:solidFill>
+                <a:latin typeface="+mn-lt"/>
+                <a:ea typeface="+mn-ea"/>
+                <a:cs typeface="+mn-cs"/>
+              </a:defRPr>
+            </a:lvl2pPr>
+            <a:lvl3pPr marL="914400" algn="l" defTabSz="914400" rtl="0" eaLnBrk="1" latinLnBrk="0" hangingPunct="1">
+              <a:defRPr sz="1800" kern="1200">
+                <a:solidFill>
+                  <a:schemeClr val="lt1"/>
+                </a:solidFill>
+                <a:latin typeface="+mn-lt"/>
+                <a:ea typeface="+mn-ea"/>
+                <a:cs typeface="+mn-cs"/>
+              </a:defRPr>
+            </a:lvl3pPr>
+            <a:lvl4pPr marL="1371600" algn="l" defTabSz="914400" rtl="0" eaLnBrk="1" latinLnBrk="0" hangingPunct="1">
+              <a:defRPr sz="1800" kern="1200">
+                <a:solidFill>
+                  <a:schemeClr val="lt1"/>
+                </a:solidFill>
+                <a:latin typeface="+mn-lt"/>
+                <a:ea typeface="+mn-ea"/>
+                <a:cs typeface="+mn-cs"/>
+              </a:defRPr>
+            </a:lvl4pPr>
+            <a:lvl5pPr marL="1828800" algn="l" defTabSz="914400" rtl="0" eaLnBrk="1" latinLnBrk="0" hangingPunct="1">
+              <a:defRPr sz="1800" kern="1200">
+                <a:solidFill>
+                  <a:schemeClr val="lt1"/>
+                </a:solidFill>
+                <a:latin typeface="+mn-lt"/>
+                <a:ea typeface="+mn-ea"/>
+                <a:cs typeface="+mn-cs"/>
+              </a:defRPr>
+            </a:lvl5pPr>
+            <a:lvl6pPr marL="2286000" algn="l" defTabSz="914400" rtl="0" eaLnBrk="1" latinLnBrk="0" hangingPunct="1">
+              <a:defRPr sz="1800" kern="1200">
+                <a:solidFill>
+                  <a:schemeClr val="lt1"/>
+                </a:solidFill>
+                <a:latin typeface="+mn-lt"/>
+                <a:ea typeface="+mn-ea"/>
+                <a:cs typeface="+mn-cs"/>
+              </a:defRPr>
+            </a:lvl6pPr>
+            <a:lvl7pPr marL="2743200" algn="l" defTabSz="914400" rtl="0" eaLnBrk="1" latinLnBrk="0" hangingPunct="1">
+              <a:defRPr sz="1800" kern="1200">
+                <a:solidFill>
+                  <a:schemeClr val="lt1"/>
+                </a:solidFill>
+                <a:latin typeface="+mn-lt"/>
+                <a:ea typeface="+mn-ea"/>
+                <a:cs typeface="+mn-cs"/>
+              </a:defRPr>
+            </a:lvl7pPr>
+            <a:lvl8pPr marL="3200400" algn="l" defTabSz="914400" rtl="0" eaLnBrk="1" latinLnBrk="0" hangingPunct="1">
+              <a:defRPr sz="1800" kern="1200">
+                <a:solidFill>
+                  <a:schemeClr val="lt1"/>
+                </a:solidFill>
+                <a:latin typeface="+mn-lt"/>
+                <a:ea typeface="+mn-ea"/>
+                <a:cs typeface="+mn-cs"/>
+              </a:defRPr>
+            </a:lvl8pPr>
+            <a:lvl9pPr marL="3657600" algn="l" defTabSz="914400" rtl="0" eaLnBrk="1" latinLnBrk="0" hangingPunct="1">
+              <a:defRPr sz="1800" kern="1200">
+                <a:solidFill>
+                  <a:schemeClr val="lt1"/>
+                </a:solidFill>
+                <a:latin typeface="+mn-lt"/>
+                <a:ea typeface="+mn-ea"/>
+                <a:cs typeface="+mn-cs"/>
+              </a:defRPr>
+            </a:lvl9pPr>
+          </a:lstStyle>
+          <a:p>
+            <a:pPr algn="ctr"/>
+            <a:endParaRPr lang="en-US"/>
+          </a:p>
+        </p:txBody>
+      </p:sp>
+      <p:pic>
+        <p:nvPicPr>
+          <p:cNvPr id="5" name="Picture 4" descr="A pixelated image of a beach&#10;&#10;AI-generated content may be incorrect.">
+            <a:extLst>
+              <a:ext uri="{FF2B5EF4-FFF2-40B4-BE49-F238E27FC236}">
+                <a16:creationId xmlns:a16="http://schemas.microsoft.com/office/drawing/2014/main" id="{841F5BA6-31F4-3DCD-2F8B-0E7461C41CB6}"/>
+              </a:ext>
+            </a:extLst>
+          </p:cNvPr>
+          <p:cNvPicPr>
+            <a:picLocks noChangeAspect="1"/>
+          </p:cNvPicPr>
+          <p:nvPr/>
+        </p:nvPicPr>
+        <p:blipFill>
+          <a:blip r:embed="rId2"/>
+          <a:srcRect r="425" b="-1"/>
+          <a:stretch/>
+        </p:blipFill>
+        <p:spPr>
+          <a:xfrm>
+            <a:off x="20" y="1282"/>
+            <a:ext cx="12191980" cy="6856718"/>
+          </a:xfrm>
+          <a:prstGeom prst="rect">
+            <a:avLst/>
+          </a:prstGeom>
+        </p:spPr>
+      </p:pic>
+      <p:pic>
+        <p:nvPicPr>
+          <p:cNvPr id="6" name="Picture 5">
+            <a:extLst>
+              <a:ext uri="{FF2B5EF4-FFF2-40B4-BE49-F238E27FC236}">
+                <a16:creationId xmlns:a16="http://schemas.microsoft.com/office/drawing/2014/main" id="{5CAFDDE3-3D72-4229-4BA5-66FBE23E1111}"/>
+              </a:ext>
+            </a:extLst>
+          </p:cNvPr>
+          <p:cNvPicPr>
+            <a:picLocks noChangeAspect="1"/>
+          </p:cNvPicPr>
+          <p:nvPr/>
+        </p:nvPicPr>
+        <p:blipFill>
+          <a:blip r:embed="rId3"/>
+          <a:srcRect t="34438"/>
+          <a:stretch/>
+        </p:blipFill>
+        <p:spPr>
+          <a:xfrm>
+            <a:off x="10659" y="2380510"/>
+            <a:ext cx="12191980" cy="4476208"/>
+          </a:xfrm>
+          <a:prstGeom prst="rect">
+            <a:avLst/>
+          </a:prstGeom>
+        </p:spPr>
+      </p:pic>
+      <p:pic>
+        <p:nvPicPr>
+          <p:cNvPr id="7" name="Picture 6" descr="A tree with pink flowers&#10;&#10;AI-generated content may be incorrect.">
+            <a:extLst>
+              <a:ext uri="{FF2B5EF4-FFF2-40B4-BE49-F238E27FC236}">
+                <a16:creationId xmlns:a16="http://schemas.microsoft.com/office/drawing/2014/main" id="{6C4FABEF-3E46-12C6-FB5E-0B5C3716D529}"/>
+              </a:ext>
+            </a:extLst>
+          </p:cNvPr>
+          <p:cNvPicPr>
+            <a:picLocks noChangeAspect="1"/>
+          </p:cNvPicPr>
+          <p:nvPr/>
+        </p:nvPicPr>
+        <p:blipFill>
+          <a:blip r:embed="rId4"/>
+          <a:srcRect r="64768"/>
+          <a:stretch/>
+        </p:blipFill>
+        <p:spPr>
+          <a:xfrm>
+            <a:off x="0" y="3073400"/>
+            <a:ext cx="2953177" cy="2794000"/>
+          </a:xfrm>
+          <a:prstGeom prst="rect">
+            <a:avLst/>
+          </a:prstGeom>
+        </p:spPr>
+      </p:pic>
+      <p:pic>
+        <p:nvPicPr>
+          <p:cNvPr id="8" name="Picture 7" descr="A tree with pink flowers&#10;&#10;AI-generated content may be incorrect.">
+            <a:extLst>
+              <a:ext uri="{FF2B5EF4-FFF2-40B4-BE49-F238E27FC236}">
+                <a16:creationId xmlns:a16="http://schemas.microsoft.com/office/drawing/2014/main" id="{1DACD867-47B4-FE58-C369-1354F56618E4}"/>
+              </a:ext>
+            </a:extLst>
+          </p:cNvPr>
+          <p:cNvPicPr>
+            <a:picLocks noChangeAspect="1"/>
+          </p:cNvPicPr>
+          <p:nvPr/>
+        </p:nvPicPr>
+        <p:blipFill>
+          <a:blip r:embed="rId4"/>
+          <a:srcRect r="64768"/>
+          <a:stretch/>
+        </p:blipFill>
+        <p:spPr>
+          <a:xfrm>
+            <a:off x="9139672" y="3073400"/>
+            <a:ext cx="2953177" cy="2794000"/>
+          </a:xfrm>
+          <a:prstGeom prst="rect">
+            <a:avLst/>
+          </a:prstGeom>
+        </p:spPr>
+      </p:pic>
+      <p:pic>
+        <p:nvPicPr>
+          <p:cNvPr id="9" name="Picture 8" descr="A tree with pink flowers&#10;&#10;AI-generated content may be incorrect.">
+            <a:extLst>
+              <a:ext uri="{FF2B5EF4-FFF2-40B4-BE49-F238E27FC236}">
+                <a16:creationId xmlns:a16="http://schemas.microsoft.com/office/drawing/2014/main" id="{CC636671-E788-5902-2493-FC0302CCFA78}"/>
+              </a:ext>
+            </a:extLst>
+          </p:cNvPr>
+          <p:cNvPicPr>
+            <a:picLocks noChangeAspect="1"/>
+          </p:cNvPicPr>
+          <p:nvPr/>
+        </p:nvPicPr>
+        <p:blipFill>
+          <a:blip r:embed="rId4"/>
+          <a:srcRect l="35179" t="16767" r="33406"/>
+          <a:stretch/>
+        </p:blipFill>
+        <p:spPr>
+          <a:xfrm>
+            <a:off x="3065029" y="2959100"/>
+            <a:ext cx="2070100" cy="1828248"/>
+          </a:xfrm>
+          <a:prstGeom prst="rect">
+            <a:avLst/>
+          </a:prstGeom>
+        </p:spPr>
+      </p:pic>
+      <p:pic>
+        <p:nvPicPr>
+          <p:cNvPr id="11" name="Picture 10" descr="A tree with pink flowers&#10;&#10;AI-generated content may be incorrect.">
+            <a:extLst>
+              <a:ext uri="{FF2B5EF4-FFF2-40B4-BE49-F238E27FC236}">
+                <a16:creationId xmlns:a16="http://schemas.microsoft.com/office/drawing/2014/main" id="{922B9E47-F927-25FE-D4CD-C29EA918B838}"/>
+              </a:ext>
+            </a:extLst>
+          </p:cNvPr>
+          <p:cNvPicPr>
+            <a:picLocks noChangeAspect="1"/>
+          </p:cNvPicPr>
+          <p:nvPr/>
+        </p:nvPicPr>
+        <p:blipFill>
+          <a:blip r:embed="rId4"/>
+          <a:srcRect l="35179" t="16767" r="33406"/>
+          <a:stretch/>
+        </p:blipFill>
+        <p:spPr>
+          <a:xfrm>
+            <a:off x="7627752" y="2790366"/>
+            <a:ext cx="2070100" cy="1828248"/>
+          </a:xfrm>
+          <a:prstGeom prst="rect">
+            <a:avLst/>
+          </a:prstGeom>
+        </p:spPr>
+      </p:pic>
+      <p:sp>
+        <p:nvSpPr>
+          <p:cNvPr id="12" name="TextBox 11">
+            <a:extLst>
+              <a:ext uri="{FF2B5EF4-FFF2-40B4-BE49-F238E27FC236}">
+                <a16:creationId xmlns:a16="http://schemas.microsoft.com/office/drawing/2014/main" id="{C9A5C7BE-7F25-7D68-2365-653DCF2D4EA0}"/>
+              </a:ext>
+            </a:extLst>
+          </p:cNvPr>
+          <p:cNvSpPr txBox="1"/>
+          <p:nvPr/>
+        </p:nvSpPr>
+        <p:spPr>
+          <a:xfrm>
+            <a:off x="1092200" y="1039672"/>
+            <a:ext cx="9613900" cy="1384995"/>
+          </a:xfrm>
+          <a:prstGeom prst="rect">
+            <a:avLst/>
+          </a:prstGeom>
+          <a:solidFill>
+            <a:schemeClr val="accent2">
+              <a:lumMod val="20000"/>
+              <a:lumOff val="80000"/>
+            </a:schemeClr>
+          </a:solidFill>
+        </p:spPr>
+        <p:txBody>
+          <a:bodyPr wrap="square" rtlCol="0">
+            <a:spAutoFit/>
+          </a:bodyPr>
+          <a:lstStyle/>
+          <a:p>
+            <a:pPr algn="ctr"/>
+            <a:r>
+              <a:rPr lang="en-US" sz="4400" b="1" dirty="0">
+                <a:solidFill>
+                  <a:schemeClr val="tx2"/>
+                </a:solidFill>
+              </a:rPr>
+              <a:t>Reap </a:t>
+            </a:r>
+          </a:p>
+          <a:p>
+            <a:pPr algn="ctr"/>
+            <a:r>
+              <a:rPr lang="en-US" sz="2000" b="1" dirty="0">
+                <a:solidFill>
+                  <a:schemeClr val="tx2"/>
+                </a:solidFill>
+              </a:rPr>
+              <a:t>Kurt Kimura, Amanda Nitta, Lloyd Sanderson</a:t>
+            </a:r>
+          </a:p>
+          <a:p>
+            <a:pPr algn="ctr"/>
+            <a:r>
+              <a:rPr lang="en-US" sz="2000" b="1" dirty="0">
+                <a:solidFill>
+                  <a:schemeClr val="tx2"/>
+                </a:solidFill>
+              </a:rPr>
+              <a:t>https://ics485-project-reap.github.io/</a:t>
+            </a:r>
+          </a:p>
+        </p:txBody>
+      </p:sp>
+      <p:pic>
+        <p:nvPicPr>
+          <p:cNvPr id="13" name="Picture 12" descr="A pixel art of two people&#10;&#10;AI-generated content may be incorrect.">
+            <a:extLst>
+              <a:ext uri="{FF2B5EF4-FFF2-40B4-BE49-F238E27FC236}">
+                <a16:creationId xmlns:a16="http://schemas.microsoft.com/office/drawing/2014/main" id="{8E23DB02-E58F-5BA0-1D16-E0C35E84C709}"/>
+              </a:ext>
+            </a:extLst>
+          </p:cNvPr>
+          <p:cNvPicPr>
+            <a:picLocks noChangeAspect="1"/>
+          </p:cNvPicPr>
+          <p:nvPr/>
+        </p:nvPicPr>
+        <p:blipFill>
+          <a:blip r:embed="rId5"/>
+          <a:srcRect l="1" t="35795" r="59485"/>
+          <a:stretch/>
+        </p:blipFill>
+        <p:spPr>
+          <a:xfrm>
+            <a:off x="3236538" y="4225402"/>
+            <a:ext cx="2209262" cy="1750530"/>
+          </a:xfrm>
+          <a:prstGeom prst="rect">
+            <a:avLst/>
+          </a:prstGeom>
+        </p:spPr>
+      </p:pic>
+    </p:spTree>
+    <p:extLst>
+      <p:ext uri="{BB962C8B-B14F-4D97-AF65-F5344CB8AC3E}">
+        <p14:creationId xmlns:p14="http://schemas.microsoft.com/office/powerpoint/2010/main" val="2824108225"/>
       </p:ext>
     </p:extLst>
   </p:cSld>

</xml_diff>

<commit_message>
updated readme on powerpoint
</commit_message>
<xml_diff>
--- a/Scenery Layout.pptx
+++ b/Scenery Layout.pptx
@@ -5,40 +5,41 @@
     <p:sldMasterId id="2147483648" r:id="rId1"/>
   </p:sldMasterIdLst>
   <p:notesMasterIdLst>
-    <p:notesMasterId r:id="rId33"/>
+    <p:notesMasterId r:id="rId34"/>
   </p:notesMasterIdLst>
   <p:sldIdLst>
     <p:sldId id="256" r:id="rId2"/>
-    <p:sldId id="257" r:id="rId3"/>
-    <p:sldId id="258" r:id="rId4"/>
-    <p:sldId id="259" r:id="rId5"/>
-    <p:sldId id="260" r:id="rId6"/>
-    <p:sldId id="261" r:id="rId7"/>
-    <p:sldId id="262" r:id="rId8"/>
-    <p:sldId id="263" r:id="rId9"/>
-    <p:sldId id="266" r:id="rId10"/>
-    <p:sldId id="280" r:id="rId11"/>
-    <p:sldId id="283" r:id="rId12"/>
-    <p:sldId id="264" r:id="rId13"/>
-    <p:sldId id="265" r:id="rId14"/>
-    <p:sldId id="267" r:id="rId15"/>
-    <p:sldId id="268" r:id="rId16"/>
-    <p:sldId id="269" r:id="rId17"/>
-    <p:sldId id="281" r:id="rId18"/>
-    <p:sldId id="270" r:id="rId19"/>
-    <p:sldId id="271" r:id="rId20"/>
-    <p:sldId id="272" r:id="rId21"/>
-    <p:sldId id="273" r:id="rId22"/>
-    <p:sldId id="274" r:id="rId23"/>
-    <p:sldId id="282" r:id="rId24"/>
-    <p:sldId id="275" r:id="rId25"/>
-    <p:sldId id="276" r:id="rId26"/>
-    <p:sldId id="277" r:id="rId27"/>
-    <p:sldId id="278" r:id="rId28"/>
-    <p:sldId id="279" r:id="rId29"/>
-    <p:sldId id="284" r:id="rId30"/>
-    <p:sldId id="285" r:id="rId31"/>
-    <p:sldId id="286" r:id="rId32"/>
+    <p:sldId id="287" r:id="rId3"/>
+    <p:sldId id="257" r:id="rId4"/>
+    <p:sldId id="258" r:id="rId5"/>
+    <p:sldId id="259" r:id="rId6"/>
+    <p:sldId id="260" r:id="rId7"/>
+    <p:sldId id="261" r:id="rId8"/>
+    <p:sldId id="262" r:id="rId9"/>
+    <p:sldId id="263" r:id="rId10"/>
+    <p:sldId id="266" r:id="rId11"/>
+    <p:sldId id="280" r:id="rId12"/>
+    <p:sldId id="283" r:id="rId13"/>
+    <p:sldId id="264" r:id="rId14"/>
+    <p:sldId id="265" r:id="rId15"/>
+    <p:sldId id="267" r:id="rId16"/>
+    <p:sldId id="268" r:id="rId17"/>
+    <p:sldId id="269" r:id="rId18"/>
+    <p:sldId id="281" r:id="rId19"/>
+    <p:sldId id="270" r:id="rId20"/>
+    <p:sldId id="271" r:id="rId21"/>
+    <p:sldId id="272" r:id="rId22"/>
+    <p:sldId id="273" r:id="rId23"/>
+    <p:sldId id="274" r:id="rId24"/>
+    <p:sldId id="282" r:id="rId25"/>
+    <p:sldId id="275" r:id="rId26"/>
+    <p:sldId id="276" r:id="rId27"/>
+    <p:sldId id="277" r:id="rId28"/>
+    <p:sldId id="278" r:id="rId29"/>
+    <p:sldId id="279" r:id="rId30"/>
+    <p:sldId id="284" r:id="rId31"/>
+    <p:sldId id="285" r:id="rId32"/>
+    <p:sldId id="286" r:id="rId33"/>
   </p:sldIdLst>
   <p:sldSz cx="12192000" cy="6858000"/>
   <p:notesSz cx="6858000" cy="9144000"/>
@@ -562,7 +563,7 @@
           <a:p>
             <a:fld id="{4EE4FAE4-3B6F-E147-8637-30AB6E87A681}" type="slidenum">
               <a:rPr lang="en-US" smtClean="0"/>
-              <a:t>12</a:t>
+              <a:t>13</a:t>
             </a:fld>
             <a:endParaRPr lang="en-US"/>
           </a:p>
@@ -649,7 +650,7 @@
           <a:p>
             <a:fld id="{4EE4FAE4-3B6F-E147-8637-30AB6E87A681}" type="slidenum">
               <a:rPr lang="en-US" smtClean="0"/>
-              <a:t>24</a:t>
+              <a:t>25</a:t>
             </a:fld>
             <a:endParaRPr lang="en-US"/>
           </a:p>
@@ -736,7 +737,7 @@
           <a:p>
             <a:fld id="{4EE4FAE4-3B6F-E147-8637-30AB6E87A681}" type="slidenum">
               <a:rPr lang="en-US" smtClean="0"/>
-              <a:t>25</a:t>
+              <a:t>26</a:t>
             </a:fld>
             <a:endParaRPr lang="en-US"/>
           </a:p>
@@ -823,7 +824,7 @@
           <a:p>
             <a:fld id="{4EE4FAE4-3B6F-E147-8637-30AB6E87A681}" type="slidenum">
               <a:rPr lang="en-US" smtClean="0"/>
-              <a:t>26</a:t>
+              <a:t>27</a:t>
             </a:fld>
             <a:endParaRPr lang="en-US"/>
           </a:p>
@@ -910,7 +911,7 @@
           <a:p>
             <a:fld id="{4EE4FAE4-3B6F-E147-8637-30AB6E87A681}" type="slidenum">
               <a:rPr lang="en-US" smtClean="0"/>
-              <a:t>27</a:t>
+              <a:t>28</a:t>
             </a:fld>
             <a:endParaRPr lang="en-US"/>
           </a:p>
@@ -1002,7 +1003,7 @@
           <a:p>
             <a:fld id="{4EE4FAE4-3B6F-E147-8637-30AB6E87A681}" type="slidenum">
               <a:rPr lang="en-US" smtClean="0"/>
-              <a:t>28</a:t>
+              <a:t>29</a:t>
             </a:fld>
             <a:endParaRPr lang="en-US"/>
           </a:p>
@@ -1089,7 +1090,7 @@
           <a:p>
             <a:fld id="{4EE4FAE4-3B6F-E147-8637-30AB6E87A681}" type="slidenum">
               <a:rPr lang="en-US" smtClean="0"/>
-              <a:t>13</a:t>
+              <a:t>14</a:t>
             </a:fld>
             <a:endParaRPr lang="en-US"/>
           </a:p>
@@ -1176,7 +1177,7 @@
           <a:p>
             <a:fld id="{4EE4FAE4-3B6F-E147-8637-30AB6E87A681}" type="slidenum">
               <a:rPr lang="en-US" smtClean="0"/>
-              <a:t>14</a:t>
+              <a:t>15</a:t>
             </a:fld>
             <a:endParaRPr lang="en-US"/>
           </a:p>
@@ -1263,7 +1264,7 @@
           <a:p>
             <a:fld id="{4EE4FAE4-3B6F-E147-8637-30AB6E87A681}" type="slidenum">
               <a:rPr lang="en-US" smtClean="0"/>
-              <a:t>15</a:t>
+              <a:t>16</a:t>
             </a:fld>
             <a:endParaRPr lang="en-US"/>
           </a:p>
@@ -1350,7 +1351,7 @@
           <a:p>
             <a:fld id="{4EE4FAE4-3B6F-E147-8637-30AB6E87A681}" type="slidenum">
               <a:rPr lang="en-US" smtClean="0"/>
-              <a:t>16</a:t>
+              <a:t>17</a:t>
             </a:fld>
             <a:endParaRPr lang="en-US"/>
           </a:p>
@@ -1437,7 +1438,7 @@
           <a:p>
             <a:fld id="{4EE4FAE4-3B6F-E147-8637-30AB6E87A681}" type="slidenum">
               <a:rPr lang="en-US" smtClean="0"/>
-              <a:t>18</a:t>
+              <a:t>19</a:t>
             </a:fld>
             <a:endParaRPr lang="en-US"/>
           </a:p>
@@ -1524,7 +1525,7 @@
           <a:p>
             <a:fld id="{4EE4FAE4-3B6F-E147-8637-30AB6E87A681}" type="slidenum">
               <a:rPr lang="en-US" smtClean="0"/>
-              <a:t>19</a:t>
+              <a:t>20</a:t>
             </a:fld>
             <a:endParaRPr lang="en-US"/>
           </a:p>
@@ -1611,7 +1612,7 @@
           <a:p>
             <a:fld id="{4EE4FAE4-3B6F-E147-8637-30AB6E87A681}" type="slidenum">
               <a:rPr lang="en-US" smtClean="0"/>
-              <a:t>20</a:t>
+              <a:t>21</a:t>
             </a:fld>
             <a:endParaRPr lang="en-US"/>
           </a:p>
@@ -1698,7 +1699,7 @@
           <a:p>
             <a:fld id="{4EE4FAE4-3B6F-E147-8637-30AB6E87A681}" type="slidenum">
               <a:rPr lang="en-US" smtClean="0"/>
-              <a:t>21</a:t>
+              <a:t>22</a:t>
             </a:fld>
             <a:endParaRPr lang="en-US"/>
           </a:p>
@@ -5160,6 +5161,89 @@
           <a:chExt cx="0" cy="0"/>
         </a:xfrm>
       </p:grpSpPr>
+      <p:sp>
+        <p:nvSpPr>
+          <p:cNvPr id="2" name="Title 1">
+            <a:extLst>
+              <a:ext uri="{FF2B5EF4-FFF2-40B4-BE49-F238E27FC236}">
+                <a16:creationId xmlns:a16="http://schemas.microsoft.com/office/drawing/2014/main" id="{49B2ED90-812E-898F-8A8E-D1657D3C04D6}"/>
+              </a:ext>
+            </a:extLst>
+          </p:cNvPr>
+          <p:cNvSpPr>
+            <a:spLocks noGrp="1"/>
+          </p:cNvSpPr>
+          <p:nvPr>
+            <p:ph type="ctrTitle"/>
+          </p:nvPr>
+        </p:nvSpPr>
+        <p:spPr/>
+        <p:txBody>
+          <a:bodyPr/>
+          <a:lstStyle/>
+          <a:p>
+            <a:r>
+              <a:rPr lang="en-US" dirty="0"/>
+              <a:t>PLAYER</a:t>
+            </a:r>
+          </a:p>
+        </p:txBody>
+      </p:sp>
+      <p:sp>
+        <p:nvSpPr>
+          <p:cNvPr id="3" name="Subtitle 2">
+            <a:extLst>
+              <a:ext uri="{FF2B5EF4-FFF2-40B4-BE49-F238E27FC236}">
+                <a16:creationId xmlns:a16="http://schemas.microsoft.com/office/drawing/2014/main" id="{AED40BF7-86BE-3517-B91D-E84D7E18EB78}"/>
+              </a:ext>
+            </a:extLst>
+          </p:cNvPr>
+          <p:cNvSpPr>
+            <a:spLocks noGrp="1"/>
+          </p:cNvSpPr>
+          <p:nvPr>
+            <p:ph type="subTitle" idx="1"/>
+          </p:nvPr>
+        </p:nvSpPr>
+        <p:spPr/>
+        <p:txBody>
+          <a:bodyPr/>
+          <a:lstStyle/>
+          <a:p>
+            <a:endParaRPr lang="en-US"/>
+          </a:p>
+        </p:txBody>
+      </p:sp>
+    </p:spTree>
+    <p:extLst>
+      <p:ext uri="{BB962C8B-B14F-4D97-AF65-F5344CB8AC3E}">
+        <p14:creationId xmlns:p14="http://schemas.microsoft.com/office/powerpoint/2010/main" val="3886958778"/>
+      </p:ext>
+    </p:extLst>
+  </p:cSld>
+  <p:clrMapOvr>
+    <a:masterClrMapping/>
+  </p:clrMapOvr>
+</p:sld>
+</file>
+
+<file path=ppt/slides/slide11.xml><?xml version="1.0" encoding="utf-8"?>
+<p:sld xmlns:a="http://schemas.openxmlformats.org/drawingml/2006/main" xmlns:r="http://schemas.openxmlformats.org/officeDocument/2006/relationships" xmlns:p="http://schemas.openxmlformats.org/presentationml/2006/main">
+  <p:cSld>
+    <p:spTree>
+      <p:nvGrpSpPr>
+        <p:cNvPr id="1" name=""/>
+        <p:cNvGrpSpPr/>
+        <p:nvPr/>
+      </p:nvGrpSpPr>
+      <p:grpSpPr>
+        <a:xfrm>
+          <a:off x="0" y="0"/>
+          <a:ext cx="0" cy="0"/>
+          <a:chOff x="0" y="0"/>
+          <a:chExt cx="0" cy="0"/>
+        </a:xfrm>
+      </p:grpSpPr>
       <p:pic>
         <p:nvPicPr>
           <p:cNvPr id="4" name="Picture 3" descr="A pixel art of two people&#10;&#10;AI-generated content may be incorrect.">
@@ -5599,7 +5683,7 @@
 </p:sld>
 </file>
 
-<file path=ppt/slides/slide11.xml><?xml version="1.0" encoding="utf-8"?>
+<file path=ppt/slides/slide12.xml><?xml version="1.0" encoding="utf-8"?>
 <p:sld xmlns:a="http://schemas.openxmlformats.org/drawingml/2006/main" xmlns:r="http://schemas.openxmlformats.org/officeDocument/2006/relationships" xmlns:p="http://schemas.openxmlformats.org/presentationml/2006/main">
   <p:cSld>
     <p:spTree>
@@ -5697,65 +5781,6 @@
     <p:extLst>
       <p:ext uri="{BB962C8B-B14F-4D97-AF65-F5344CB8AC3E}">
         <p14:creationId xmlns:p14="http://schemas.microsoft.com/office/powerpoint/2010/main" val="2386851655"/>
-      </p:ext>
-    </p:extLst>
-  </p:cSld>
-  <p:clrMapOvr>
-    <a:masterClrMapping/>
-  </p:clrMapOvr>
-</p:sld>
-</file>
-
-<file path=ppt/slides/slide12.xml><?xml version="1.0" encoding="utf-8"?>
-<p:sld xmlns:a="http://schemas.openxmlformats.org/drawingml/2006/main" xmlns:r="http://schemas.openxmlformats.org/officeDocument/2006/relationships" xmlns:p="http://schemas.openxmlformats.org/presentationml/2006/main">
-  <p:cSld>
-    <p:spTree>
-      <p:nvGrpSpPr>
-        <p:cNvPr id="1" name=""/>
-        <p:cNvGrpSpPr/>
-        <p:nvPr/>
-      </p:nvGrpSpPr>
-      <p:grpSpPr>
-        <a:xfrm>
-          <a:off x="0" y="0"/>
-          <a:ext cx="0" cy="0"/>
-          <a:chOff x="0" y="0"/>
-          <a:chExt cx="0" cy="0"/>
-        </a:xfrm>
-      </p:grpSpPr>
-      <p:pic>
-        <p:nvPicPr>
-          <p:cNvPr id="5" name="Picture 4" descr="A pixel art of two people&#10;&#10;AI-generated content may be incorrect.">
-            <a:extLst>
-              <a:ext uri="{FF2B5EF4-FFF2-40B4-BE49-F238E27FC236}">
-                <a16:creationId xmlns:a16="http://schemas.microsoft.com/office/drawing/2014/main" id="{FD663610-213C-2D70-12FD-FB156236A7DD}"/>
-              </a:ext>
-            </a:extLst>
-          </p:cNvPr>
-          <p:cNvPicPr>
-            <a:picLocks noChangeAspect="1"/>
-          </p:cNvPicPr>
-          <p:nvPr/>
-        </p:nvPicPr>
-        <p:blipFill>
-          <a:blip r:embed="rId3"/>
-          <a:srcRect t="36597"/>
-          <a:stretch/>
-        </p:blipFill>
-        <p:spPr>
-          <a:xfrm>
-            <a:off x="670560" y="2063930"/>
-            <a:ext cx="10850880" cy="859971"/>
-          </a:xfrm>
-          <a:prstGeom prst="rect">
-            <a:avLst/>
-          </a:prstGeom>
-        </p:spPr>
-      </p:pic>
-    </p:spTree>
-    <p:extLst>
-      <p:ext uri="{BB962C8B-B14F-4D97-AF65-F5344CB8AC3E}">
-        <p14:creationId xmlns:p14="http://schemas.microsoft.com/office/powerpoint/2010/main" val="2203391896"/>
       </p:ext>
     </p:extLst>
   </p:cSld>
@@ -5784,10 +5809,10 @@
       </p:grpSpPr>
       <p:pic>
         <p:nvPicPr>
-          <p:cNvPr id="5" name="Picture 4" descr="A pixel art of a person with a hat and a sword&#10;&#10;AI-generated content may be incorrect.">
-            <a:extLst>
-              <a:ext uri="{FF2B5EF4-FFF2-40B4-BE49-F238E27FC236}">
-                <a16:creationId xmlns:a16="http://schemas.microsoft.com/office/drawing/2014/main" id="{B7737339-6691-B51F-2F02-809680482B0B}"/>
+          <p:cNvPr id="5" name="Picture 4" descr="A pixel art of two people&#10;&#10;AI-generated content may be incorrect.">
+            <a:extLst>
+              <a:ext uri="{FF2B5EF4-FFF2-40B4-BE49-F238E27FC236}">
+                <a16:creationId xmlns:a16="http://schemas.microsoft.com/office/drawing/2014/main" id="{FD663610-213C-2D70-12FD-FB156236A7DD}"/>
               </a:ext>
             </a:extLst>
           </p:cNvPr>
@@ -5798,14 +5823,13 @@
         </p:nvPicPr>
         <p:blipFill>
           <a:blip r:embed="rId3"/>
-          <a:stretch>
-            <a:fillRect/>
-          </a:stretch>
+          <a:srcRect t="36597"/>
+          <a:stretch/>
         </p:blipFill>
         <p:spPr>
           <a:xfrm>
-            <a:off x="4374606" y="1097281"/>
-            <a:ext cx="4274759" cy="3786400"/>
+            <a:off x="670560" y="2063930"/>
+            <a:ext cx="10850880" cy="859971"/>
           </a:xfrm>
           <a:prstGeom prst="rect">
             <a:avLst/>
@@ -5815,7 +5839,7 @@
     </p:spTree>
     <p:extLst>
       <p:ext uri="{BB962C8B-B14F-4D97-AF65-F5344CB8AC3E}">
-        <p14:creationId xmlns:p14="http://schemas.microsoft.com/office/powerpoint/2010/main" val="2519188414"/>
+        <p14:creationId xmlns:p14="http://schemas.microsoft.com/office/powerpoint/2010/main" val="2203391896"/>
       </p:ext>
     </p:extLst>
   </p:cSld>
@@ -5844,10 +5868,10 @@
       </p:grpSpPr>
       <p:pic>
         <p:nvPicPr>
-          <p:cNvPr id="5" name="Picture 4" descr="A pixel art of a person in a hat&#10;&#10;AI-generated content may be incorrect.">
-            <a:extLst>
-              <a:ext uri="{FF2B5EF4-FFF2-40B4-BE49-F238E27FC236}">
-                <a16:creationId xmlns:a16="http://schemas.microsoft.com/office/drawing/2014/main" id="{5226F2BF-8C70-03DC-A0B5-2D1805E69020}"/>
+          <p:cNvPr id="5" name="Picture 4" descr="A pixel art of a person with a hat and a sword&#10;&#10;AI-generated content may be incorrect.">
+            <a:extLst>
+              <a:ext uri="{FF2B5EF4-FFF2-40B4-BE49-F238E27FC236}">
+                <a16:creationId xmlns:a16="http://schemas.microsoft.com/office/drawing/2014/main" id="{B7737339-6691-B51F-2F02-809680482B0B}"/>
               </a:ext>
             </a:extLst>
           </p:cNvPr>
@@ -5864,8 +5888,8 @@
         </p:blipFill>
         <p:spPr>
           <a:xfrm>
-            <a:off x="4191724" y="1550850"/>
-            <a:ext cx="3201851" cy="3201851"/>
+            <a:off x="4374606" y="1097281"/>
+            <a:ext cx="4274759" cy="3786400"/>
           </a:xfrm>
           <a:prstGeom prst="rect">
             <a:avLst/>
@@ -5875,7 +5899,7 @@
     </p:spTree>
     <p:extLst>
       <p:ext uri="{BB962C8B-B14F-4D97-AF65-F5344CB8AC3E}">
-        <p14:creationId xmlns:p14="http://schemas.microsoft.com/office/powerpoint/2010/main" val="1243193261"/>
+        <p14:creationId xmlns:p14="http://schemas.microsoft.com/office/powerpoint/2010/main" val="2519188414"/>
       </p:ext>
     </p:extLst>
   </p:cSld>
@@ -5904,10 +5928,10 @@
       </p:grpSpPr>
       <p:pic>
         <p:nvPicPr>
-          <p:cNvPr id="5" name="Picture 4" descr="A pixel art of two people&#10;&#10;AI-generated content may be incorrect.">
-            <a:extLst>
-              <a:ext uri="{FF2B5EF4-FFF2-40B4-BE49-F238E27FC236}">
-                <a16:creationId xmlns:a16="http://schemas.microsoft.com/office/drawing/2014/main" id="{DA30E99C-4CAC-F7C3-BA5D-F9651A9A3992}"/>
+          <p:cNvPr id="5" name="Picture 4" descr="A pixel art of a person in a hat&#10;&#10;AI-generated content may be incorrect.">
+            <a:extLst>
+              <a:ext uri="{FF2B5EF4-FFF2-40B4-BE49-F238E27FC236}">
+                <a16:creationId xmlns:a16="http://schemas.microsoft.com/office/drawing/2014/main" id="{5226F2BF-8C70-03DC-A0B5-2D1805E69020}"/>
               </a:ext>
             </a:extLst>
           </p:cNvPr>
@@ -5924,8 +5948,8 @@
         </p:blipFill>
         <p:spPr>
           <a:xfrm>
-            <a:off x="3071223" y="1161868"/>
-            <a:ext cx="6820262" cy="3410131"/>
+            <a:off x="4191724" y="1550850"/>
+            <a:ext cx="3201851" cy="3201851"/>
           </a:xfrm>
           <a:prstGeom prst="rect">
             <a:avLst/>
@@ -5935,7 +5959,7 @@
     </p:spTree>
     <p:extLst>
       <p:ext uri="{BB962C8B-B14F-4D97-AF65-F5344CB8AC3E}">
-        <p14:creationId xmlns:p14="http://schemas.microsoft.com/office/powerpoint/2010/main" val="2197821054"/>
+        <p14:creationId xmlns:p14="http://schemas.microsoft.com/office/powerpoint/2010/main" val="1243193261"/>
       </p:ext>
     </p:extLst>
   </p:cSld>
@@ -5964,6 +5988,66 @@
       </p:grpSpPr>
       <p:pic>
         <p:nvPicPr>
+          <p:cNvPr id="5" name="Picture 4" descr="A pixel art of two people&#10;&#10;AI-generated content may be incorrect.">
+            <a:extLst>
+              <a:ext uri="{FF2B5EF4-FFF2-40B4-BE49-F238E27FC236}">
+                <a16:creationId xmlns:a16="http://schemas.microsoft.com/office/drawing/2014/main" id="{DA30E99C-4CAC-F7C3-BA5D-F9651A9A3992}"/>
+              </a:ext>
+            </a:extLst>
+          </p:cNvPr>
+          <p:cNvPicPr>
+            <a:picLocks noChangeAspect="1"/>
+          </p:cNvPicPr>
+          <p:nvPr/>
+        </p:nvPicPr>
+        <p:blipFill>
+          <a:blip r:embed="rId3"/>
+          <a:stretch>
+            <a:fillRect/>
+          </a:stretch>
+        </p:blipFill>
+        <p:spPr>
+          <a:xfrm>
+            <a:off x="3071223" y="1161868"/>
+            <a:ext cx="6820262" cy="3410131"/>
+          </a:xfrm>
+          <a:prstGeom prst="rect">
+            <a:avLst/>
+          </a:prstGeom>
+        </p:spPr>
+      </p:pic>
+    </p:spTree>
+    <p:extLst>
+      <p:ext uri="{BB962C8B-B14F-4D97-AF65-F5344CB8AC3E}">
+        <p14:creationId xmlns:p14="http://schemas.microsoft.com/office/powerpoint/2010/main" val="2197821054"/>
+      </p:ext>
+    </p:extLst>
+  </p:cSld>
+  <p:clrMapOvr>
+    <a:masterClrMapping/>
+  </p:clrMapOvr>
+</p:sld>
+</file>
+
+<file path=ppt/slides/slide17.xml><?xml version="1.0" encoding="utf-8"?>
+<p:sld xmlns:a="http://schemas.openxmlformats.org/drawingml/2006/main" xmlns:r="http://schemas.openxmlformats.org/officeDocument/2006/relationships" xmlns:p="http://schemas.openxmlformats.org/presentationml/2006/main">
+  <p:cSld>
+    <p:spTree>
+      <p:nvGrpSpPr>
+        <p:cNvPr id="1" name=""/>
+        <p:cNvGrpSpPr/>
+        <p:nvPr/>
+      </p:nvGrpSpPr>
+      <p:grpSpPr>
+        <a:xfrm>
+          <a:off x="0" y="0"/>
+          <a:ext cx="0" cy="0"/>
+          <a:chOff x="0" y="0"/>
+          <a:chExt cx="0" cy="0"/>
+        </a:xfrm>
+      </p:grpSpPr>
+      <p:pic>
+        <p:nvPicPr>
           <p:cNvPr id="5" name="Picture 4" descr="A pixel art of a person with a hat and sword&#10;&#10;AI-generated content may be incorrect.">
             <a:extLst>
               <a:ext uri="{FF2B5EF4-FFF2-40B4-BE49-F238E27FC236}">
@@ -6005,7 +6089,7 @@
 </p:sld>
 </file>
 
-<file path=ppt/slides/slide17.xml><?xml version="1.0" encoding="utf-8"?>
+<file path=ppt/slides/slide18.xml><?xml version="1.0" encoding="utf-8"?>
 <p:sld xmlns:a="http://schemas.openxmlformats.org/drawingml/2006/main" xmlns:r="http://schemas.openxmlformats.org/officeDocument/2006/relationships" xmlns:p="http://schemas.openxmlformats.org/presentationml/2006/main">
   <p:cSld>
     <p:spTree>
@@ -6176,66 +6260,6 @@
     <p:extLst>
       <p:ext uri="{BB962C8B-B14F-4D97-AF65-F5344CB8AC3E}">
         <p14:creationId xmlns:p14="http://schemas.microsoft.com/office/powerpoint/2010/main" val="2260527765"/>
-      </p:ext>
-    </p:extLst>
-  </p:cSld>
-  <p:clrMapOvr>
-    <a:masterClrMapping/>
-  </p:clrMapOvr>
-</p:sld>
-</file>
-
-<file path=ppt/slides/slide18.xml><?xml version="1.0" encoding="utf-8"?>
-<p:sld xmlns:a="http://schemas.openxmlformats.org/drawingml/2006/main" xmlns:r="http://schemas.openxmlformats.org/officeDocument/2006/relationships" xmlns:p="http://schemas.openxmlformats.org/presentationml/2006/main">
-  <p:cSld>
-    <p:spTree>
-      <p:nvGrpSpPr>
-        <p:cNvPr id="1" name=""/>
-        <p:cNvGrpSpPr/>
-        <p:nvPr/>
-      </p:nvGrpSpPr>
-      <p:grpSpPr>
-        <a:xfrm>
-          <a:off x="0" y="0"/>
-          <a:ext cx="0" cy="0"/>
-          <a:chOff x="0" y="0"/>
-          <a:chExt cx="0" cy="0"/>
-        </a:xfrm>
-      </p:grpSpPr>
-      <p:pic>
-        <p:nvPicPr>
-          <p:cNvPr id="5" name="Picture 4" descr="A pixel art of a couple of faces&#10;&#10;AI-generated content may be incorrect.">
-            <a:extLst>
-              <a:ext uri="{FF2B5EF4-FFF2-40B4-BE49-F238E27FC236}">
-                <a16:creationId xmlns:a16="http://schemas.microsoft.com/office/drawing/2014/main" id="{7E0429B7-FB2A-3145-9A54-609226872C90}"/>
-              </a:ext>
-            </a:extLst>
-          </p:cNvPr>
-          <p:cNvPicPr>
-            <a:picLocks noChangeAspect="1"/>
-          </p:cNvPicPr>
-          <p:nvPr/>
-        </p:nvPicPr>
-        <p:blipFill>
-          <a:blip r:embed="rId3"/>
-          <a:stretch>
-            <a:fillRect/>
-          </a:stretch>
-        </p:blipFill>
-        <p:spPr>
-          <a:xfrm>
-            <a:off x="2554514" y="2014946"/>
-            <a:ext cx="7772400" cy="1943100"/>
-          </a:xfrm>
-          <a:prstGeom prst="rect">
-            <a:avLst/>
-          </a:prstGeom>
-        </p:spPr>
-      </p:pic>
-    </p:spTree>
-    <p:extLst>
-      <p:ext uri="{BB962C8B-B14F-4D97-AF65-F5344CB8AC3E}">
-        <p14:creationId xmlns:p14="http://schemas.microsoft.com/office/powerpoint/2010/main" val="2832568323"/>
       </p:ext>
     </p:extLst>
   </p:cSld>
@@ -6264,10 +6288,10 @@
       </p:grpSpPr>
       <p:pic>
         <p:nvPicPr>
-          <p:cNvPr id="5" name="Picture 4" descr="A pixel art of a person with a sword&#10;&#10;AI-generated content may be incorrect.">
-            <a:extLst>
-              <a:ext uri="{FF2B5EF4-FFF2-40B4-BE49-F238E27FC236}">
-                <a16:creationId xmlns:a16="http://schemas.microsoft.com/office/drawing/2014/main" id="{38A27494-9D8E-D6D9-2008-C52D5ECD00F9}"/>
+          <p:cNvPr id="5" name="Picture 4" descr="A pixel art of a couple of faces&#10;&#10;AI-generated content may be incorrect.">
+            <a:extLst>
+              <a:ext uri="{FF2B5EF4-FFF2-40B4-BE49-F238E27FC236}">
+                <a16:creationId xmlns:a16="http://schemas.microsoft.com/office/drawing/2014/main" id="{7E0429B7-FB2A-3145-9A54-609226872C90}"/>
               </a:ext>
             </a:extLst>
           </p:cNvPr>
@@ -6284,8 +6308,8 @@
         </p:blipFill>
         <p:spPr>
           <a:xfrm>
-            <a:off x="783771" y="2497183"/>
-            <a:ext cx="11181804" cy="1863634"/>
+            <a:off x="2554514" y="2014946"/>
+            <a:ext cx="7772400" cy="1943100"/>
           </a:xfrm>
           <a:prstGeom prst="rect">
             <a:avLst/>
@@ -6295,7 +6319,7 @@
     </p:spTree>
     <p:extLst>
       <p:ext uri="{BB962C8B-B14F-4D97-AF65-F5344CB8AC3E}">
-        <p14:creationId xmlns:p14="http://schemas.microsoft.com/office/powerpoint/2010/main" val="3599083202"/>
+        <p14:creationId xmlns:p14="http://schemas.microsoft.com/office/powerpoint/2010/main" val="2832568323"/>
       </p:ext>
     </p:extLst>
   </p:cSld>
@@ -6322,280 +6346,110 @@
           <a:chExt cx="0" cy="0"/>
         </a:xfrm>
       </p:grpSpPr>
-      <p:pic>
-        <p:nvPicPr>
-          <p:cNvPr id="5" name="Picture 4" descr="A green grass and black sky&#10;&#10;AI-generated content may be incorrect.">
-            <a:extLst>
-              <a:ext uri="{FF2B5EF4-FFF2-40B4-BE49-F238E27FC236}">
-                <a16:creationId xmlns:a16="http://schemas.microsoft.com/office/drawing/2014/main" id="{033B831B-31A4-0FDD-857F-9DEC128D4B2F}"/>
-              </a:ext>
-            </a:extLst>
-          </p:cNvPr>
-          <p:cNvPicPr>
-            <a:picLocks noChangeAspect="1"/>
-          </p:cNvPicPr>
-          <p:nvPr/>
-        </p:nvPicPr>
-        <p:blipFill>
-          <a:blip r:embed="rId2"/>
-          <a:stretch>
-            <a:fillRect/>
-          </a:stretch>
-        </p:blipFill>
-        <p:spPr>
-          <a:xfrm>
-            <a:off x="4711700" y="2654300"/>
-            <a:ext cx="2768600" cy="1549400"/>
-          </a:xfrm>
-          <a:prstGeom prst="rect">
-            <a:avLst/>
-          </a:prstGeom>
-        </p:spPr>
-      </p:pic>
-      <p:pic>
-        <p:nvPicPr>
-          <p:cNvPr id="7" name="Picture 6" descr="A sunset over a beach&#10;&#10;AI-generated content may be incorrect.">
-            <a:extLst>
-              <a:ext uri="{FF2B5EF4-FFF2-40B4-BE49-F238E27FC236}">
-                <a16:creationId xmlns:a16="http://schemas.microsoft.com/office/drawing/2014/main" id="{C51E8054-B9CC-65AE-3B89-97630F46A0F5}"/>
-              </a:ext>
-            </a:extLst>
-          </p:cNvPr>
-          <p:cNvPicPr>
-            <a:picLocks noChangeAspect="1"/>
-          </p:cNvPicPr>
-          <p:nvPr/>
-        </p:nvPicPr>
-        <p:blipFill>
-          <a:blip r:embed="rId3"/>
-          <a:stretch>
-            <a:fillRect/>
-          </a:stretch>
-        </p:blipFill>
-        <p:spPr>
-          <a:xfrm>
-            <a:off x="4159250" y="2654300"/>
-            <a:ext cx="3873500" cy="1549400"/>
-          </a:xfrm>
-          <a:prstGeom prst="rect">
-            <a:avLst/>
-          </a:prstGeom>
-        </p:spPr>
-      </p:pic>
-      <p:pic>
-        <p:nvPicPr>
-          <p:cNvPr id="9" name="Picture 8" descr="A drawing of a wall and grass&#10;&#10;AI-generated content may be incorrect.">
-            <a:extLst>
-              <a:ext uri="{FF2B5EF4-FFF2-40B4-BE49-F238E27FC236}">
-                <a16:creationId xmlns:a16="http://schemas.microsoft.com/office/drawing/2014/main" id="{1BD325F3-8F79-A7D8-2CE1-C92ABA0973FD}"/>
-              </a:ext>
-            </a:extLst>
-          </p:cNvPr>
-          <p:cNvPicPr>
-            <a:picLocks noChangeAspect="1"/>
-          </p:cNvPicPr>
-          <p:nvPr/>
-        </p:nvPicPr>
-        <p:blipFill>
-          <a:blip r:embed="rId4"/>
-          <a:stretch>
-            <a:fillRect/>
-          </a:stretch>
-        </p:blipFill>
-        <p:spPr>
-          <a:xfrm>
-            <a:off x="8032750" y="2654300"/>
-            <a:ext cx="3873500" cy="1549400"/>
-          </a:xfrm>
-          <a:prstGeom prst="rect">
-            <a:avLst/>
-          </a:prstGeom>
-        </p:spPr>
-      </p:pic>
-      <p:pic>
-        <p:nvPicPr>
-          <p:cNvPr id="11" name="Picture 10" descr="A green mountains with blue sky&#10;&#10;AI-generated content may be incorrect.">
-            <a:extLst>
-              <a:ext uri="{FF2B5EF4-FFF2-40B4-BE49-F238E27FC236}">
-                <a16:creationId xmlns:a16="http://schemas.microsoft.com/office/drawing/2014/main" id="{E51B1948-ED02-418C-49B0-26742191C732}"/>
-              </a:ext>
-            </a:extLst>
-          </p:cNvPr>
-          <p:cNvPicPr>
-            <a:picLocks noChangeAspect="1"/>
-          </p:cNvPicPr>
-          <p:nvPr/>
-        </p:nvPicPr>
-        <p:blipFill>
-          <a:blip r:embed="rId5"/>
-          <a:stretch>
-            <a:fillRect/>
-          </a:stretch>
-        </p:blipFill>
-        <p:spPr>
-          <a:xfrm>
-            <a:off x="6096000" y="4203700"/>
-            <a:ext cx="3873500" cy="1549400"/>
-          </a:xfrm>
-          <a:prstGeom prst="rect">
-            <a:avLst/>
-          </a:prstGeom>
-        </p:spPr>
-      </p:pic>
-      <p:pic>
-        <p:nvPicPr>
-          <p:cNvPr id="13" name="Picture 12" descr="A green grass field with white dots and black sky&#10;&#10;AI-generated content may be incorrect.">
-            <a:extLst>
-              <a:ext uri="{FF2B5EF4-FFF2-40B4-BE49-F238E27FC236}">
-                <a16:creationId xmlns:a16="http://schemas.microsoft.com/office/drawing/2014/main" id="{DD03E9AA-7BE5-015F-8F8F-88CB2D7FDE31}"/>
-              </a:ext>
-            </a:extLst>
-          </p:cNvPr>
-          <p:cNvPicPr>
-            <a:picLocks noChangeAspect="1"/>
-          </p:cNvPicPr>
-          <p:nvPr/>
-        </p:nvPicPr>
-        <p:blipFill>
-          <a:blip r:embed="rId6"/>
-          <a:stretch>
-            <a:fillRect/>
-          </a:stretch>
-        </p:blipFill>
-        <p:spPr>
-          <a:xfrm>
-            <a:off x="3327400" y="4203700"/>
-            <a:ext cx="2768600" cy="1549400"/>
-          </a:xfrm>
-          <a:prstGeom prst="rect">
-            <a:avLst/>
-          </a:prstGeom>
-        </p:spPr>
-      </p:pic>
-      <p:pic>
-        <p:nvPicPr>
-          <p:cNvPr id="15" name="Picture 14" descr="A green and brown grass&#10;&#10;AI-generated content may be incorrect.">
-            <a:extLst>
-              <a:ext uri="{FF2B5EF4-FFF2-40B4-BE49-F238E27FC236}">
-                <a16:creationId xmlns:a16="http://schemas.microsoft.com/office/drawing/2014/main" id="{0982CCEC-DCCF-236B-47B1-1A0F73405AEF}"/>
-              </a:ext>
-            </a:extLst>
-          </p:cNvPr>
-          <p:cNvPicPr>
-            <a:picLocks noChangeAspect="1"/>
-          </p:cNvPicPr>
-          <p:nvPr/>
-        </p:nvPicPr>
-        <p:blipFill>
-          <a:blip r:embed="rId7"/>
-          <a:stretch>
-            <a:fillRect/>
-          </a:stretch>
-        </p:blipFill>
-        <p:spPr>
-          <a:xfrm>
-            <a:off x="285750" y="2654300"/>
-            <a:ext cx="3873500" cy="1549400"/>
-          </a:xfrm>
-          <a:prstGeom prst="rect">
-            <a:avLst/>
-          </a:prstGeom>
-        </p:spPr>
-      </p:pic>
-      <p:pic>
-        <p:nvPicPr>
-          <p:cNvPr id="17" name="Picture 16" descr="A drawing of trees and flowers&#10;&#10;AI-generated content may be incorrect.">
-            <a:extLst>
-              <a:ext uri="{FF2B5EF4-FFF2-40B4-BE49-F238E27FC236}">
-                <a16:creationId xmlns:a16="http://schemas.microsoft.com/office/drawing/2014/main" id="{F6B25DF6-537E-753F-3B3B-3673F4721A3A}"/>
-              </a:ext>
-            </a:extLst>
-          </p:cNvPr>
-          <p:cNvPicPr>
-            <a:picLocks noChangeAspect="1"/>
-          </p:cNvPicPr>
-          <p:nvPr/>
-        </p:nvPicPr>
-        <p:blipFill>
-          <a:blip r:embed="rId8"/>
-          <a:stretch>
-            <a:fillRect/>
-          </a:stretch>
-        </p:blipFill>
-        <p:spPr>
-          <a:xfrm>
-            <a:off x="4159250" y="1104900"/>
-            <a:ext cx="3873500" cy="1549400"/>
-          </a:xfrm>
-          <a:prstGeom prst="rect">
-            <a:avLst/>
-          </a:prstGeom>
-        </p:spPr>
-      </p:pic>
-      <p:pic>
-        <p:nvPicPr>
-          <p:cNvPr id="19" name="Picture 18" descr="A field of flowers and rocks&#10;&#10;AI-generated content may be incorrect.">
-            <a:extLst>
-              <a:ext uri="{FF2B5EF4-FFF2-40B4-BE49-F238E27FC236}">
-                <a16:creationId xmlns:a16="http://schemas.microsoft.com/office/drawing/2014/main" id="{1AEC06AD-E480-DC36-FB6F-AE3FD314A312}"/>
-              </a:ext>
-            </a:extLst>
-          </p:cNvPr>
-          <p:cNvPicPr>
-            <a:picLocks noChangeAspect="1"/>
-          </p:cNvPicPr>
-          <p:nvPr/>
-        </p:nvPicPr>
-        <p:blipFill>
-          <a:blip r:embed="rId9"/>
-          <a:stretch>
-            <a:fillRect/>
-          </a:stretch>
-        </p:blipFill>
-        <p:spPr>
-          <a:xfrm>
-            <a:off x="285750" y="1104900"/>
-            <a:ext cx="3873500" cy="1549400"/>
-          </a:xfrm>
-          <a:prstGeom prst="rect">
-            <a:avLst/>
-          </a:prstGeom>
-        </p:spPr>
-      </p:pic>
-      <p:pic>
-        <p:nvPicPr>
-          <p:cNvPr id="21" name="Picture 20" descr="A drawing of fireworks on a black background&#10;&#10;AI-generated content may be incorrect.">
-            <a:extLst>
-              <a:ext uri="{FF2B5EF4-FFF2-40B4-BE49-F238E27FC236}">
-                <a16:creationId xmlns:a16="http://schemas.microsoft.com/office/drawing/2014/main" id="{BD799648-44DC-FF8D-FAA9-A3ECFF5659C8}"/>
-              </a:ext>
-            </a:extLst>
-          </p:cNvPr>
-          <p:cNvPicPr>
-            <a:picLocks noChangeAspect="1"/>
-          </p:cNvPicPr>
-          <p:nvPr/>
-        </p:nvPicPr>
-        <p:blipFill>
-          <a:blip r:embed="rId10"/>
-          <a:stretch>
-            <a:fillRect/>
-          </a:stretch>
-        </p:blipFill>
-        <p:spPr>
-          <a:xfrm>
-            <a:off x="8032750" y="1104900"/>
-            <a:ext cx="3873500" cy="1549400"/>
-          </a:xfrm>
-          <a:prstGeom prst="rect">
-            <a:avLst/>
-          </a:prstGeom>
-        </p:spPr>
-      </p:pic>
+      <p:sp>
+        <p:nvSpPr>
+          <p:cNvPr id="2" name="Title 1">
+            <a:extLst>
+              <a:ext uri="{FF2B5EF4-FFF2-40B4-BE49-F238E27FC236}">
+                <a16:creationId xmlns:a16="http://schemas.microsoft.com/office/drawing/2014/main" id="{941FB71E-D5BD-7D48-2EA0-22AFC165512A}"/>
+              </a:ext>
+            </a:extLst>
+          </p:cNvPr>
+          <p:cNvSpPr>
+            <a:spLocks noGrp="1"/>
+          </p:cNvSpPr>
+          <p:nvPr>
+            <p:ph type="title"/>
+          </p:nvPr>
+        </p:nvSpPr>
+        <p:spPr/>
+        <p:txBody>
+          <a:bodyPr/>
+          <a:lstStyle/>
+          <a:p>
+            <a:r>
+              <a:rPr lang="en-US" dirty="0"/>
+              <a:t>ReadMe</a:t>
+            </a:r>
+          </a:p>
+        </p:txBody>
+      </p:sp>
+      <p:sp>
+        <p:nvSpPr>
+          <p:cNvPr id="3" name="Content Placeholder 2">
+            <a:extLst>
+              <a:ext uri="{FF2B5EF4-FFF2-40B4-BE49-F238E27FC236}">
+                <a16:creationId xmlns:a16="http://schemas.microsoft.com/office/drawing/2014/main" id="{586277F7-42D5-64A0-B11F-F003D54E925E}"/>
+              </a:ext>
+            </a:extLst>
+          </p:cNvPr>
+          <p:cNvSpPr>
+            <a:spLocks noGrp="1"/>
+          </p:cNvSpPr>
+          <p:nvPr>
+            <p:ph idx="1"/>
+          </p:nvPr>
+        </p:nvSpPr>
+        <p:spPr/>
+        <p:txBody>
+          <a:bodyPr/>
+          <a:lstStyle/>
+          <a:p>
+            <a:pPr marL="0" indent="0">
+              <a:buNone/>
+            </a:pPr>
+            <a:r>
+              <a:rPr lang="en-US" dirty="0"/>
+              <a:t>Includes figures displaying progress</a:t>
+            </a:r>
+          </a:p>
+          <a:p>
+            <a:pPr>
+              <a:buFontTx/>
+              <a:buChar char="-"/>
+            </a:pPr>
+            <a:r>
+              <a:rPr lang="en-US" dirty="0"/>
+              <a:t>Backgrounds </a:t>
+            </a:r>
+          </a:p>
+          <a:p>
+            <a:pPr>
+              <a:buFontTx/>
+              <a:buChar char="-"/>
+            </a:pPr>
+            <a:r>
+              <a:rPr lang="en-US" dirty="0"/>
+              <a:t>Player Sprites</a:t>
+            </a:r>
+          </a:p>
+          <a:p>
+            <a:pPr>
+              <a:buFontTx/>
+              <a:buChar char="-"/>
+            </a:pPr>
+            <a:r>
+              <a:rPr lang="en-US" dirty="0"/>
+              <a:t>Enemy Sprites</a:t>
+            </a:r>
+          </a:p>
+          <a:p>
+            <a:pPr>
+              <a:buFontTx/>
+              <a:buChar char="-"/>
+            </a:pPr>
+            <a:r>
+              <a:rPr lang="en-US"/>
+              <a:t>Boss Sprites</a:t>
+            </a:r>
+            <a:endParaRPr lang="en-US" dirty="0"/>
+          </a:p>
+        </p:txBody>
+      </p:sp>
     </p:spTree>
     <p:extLst>
       <p:ext uri="{BB962C8B-B14F-4D97-AF65-F5344CB8AC3E}">
-        <p14:creationId xmlns:p14="http://schemas.microsoft.com/office/powerpoint/2010/main" val="3656435372"/>
+        <p14:creationId xmlns:p14="http://schemas.microsoft.com/office/powerpoint/2010/main" val="2101199083"/>
       </p:ext>
     </p:extLst>
   </p:cSld>
@@ -6624,10 +6478,10 @@
       </p:grpSpPr>
       <p:pic>
         <p:nvPicPr>
-          <p:cNvPr id="5" name="Picture 4" descr="A pixelated video game of a person lying on the ground&#10;&#10;AI-generated content may be incorrect.">
-            <a:extLst>
-              <a:ext uri="{FF2B5EF4-FFF2-40B4-BE49-F238E27FC236}">
-                <a16:creationId xmlns:a16="http://schemas.microsoft.com/office/drawing/2014/main" id="{C9EE4E8C-506D-EF3A-014F-2211801C04D0}"/>
+          <p:cNvPr id="5" name="Picture 4" descr="A pixel art of a person with a sword&#10;&#10;AI-generated content may be incorrect.">
+            <a:extLst>
+              <a:ext uri="{FF2B5EF4-FFF2-40B4-BE49-F238E27FC236}">
+                <a16:creationId xmlns:a16="http://schemas.microsoft.com/office/drawing/2014/main" id="{38A27494-9D8E-D6D9-2008-C52D5ECD00F9}"/>
               </a:ext>
             </a:extLst>
           </p:cNvPr>
@@ -6644,8 +6498,8 @@
         </p:blipFill>
         <p:spPr>
           <a:xfrm>
-            <a:off x="3684088" y="375193"/>
-            <a:ext cx="4823824" cy="4823824"/>
+            <a:off x="783771" y="2497183"/>
+            <a:ext cx="11181804" cy="1863634"/>
           </a:xfrm>
           <a:prstGeom prst="rect">
             <a:avLst/>
@@ -6655,7 +6509,7 @@
     </p:spTree>
     <p:extLst>
       <p:ext uri="{BB962C8B-B14F-4D97-AF65-F5344CB8AC3E}">
-        <p14:creationId xmlns:p14="http://schemas.microsoft.com/office/powerpoint/2010/main" val="3798418715"/>
+        <p14:creationId xmlns:p14="http://schemas.microsoft.com/office/powerpoint/2010/main" val="3599083202"/>
       </p:ext>
     </p:extLst>
   </p:cSld>
@@ -6684,10 +6538,10 @@
       </p:grpSpPr>
       <p:pic>
         <p:nvPicPr>
-          <p:cNvPr id="5" name="Picture 4" descr="A screenshot of a video game&#10;&#10;AI-generated content may be incorrect.">
-            <a:extLst>
-              <a:ext uri="{FF2B5EF4-FFF2-40B4-BE49-F238E27FC236}">
-                <a16:creationId xmlns:a16="http://schemas.microsoft.com/office/drawing/2014/main" id="{2CE74E9C-16F4-0C03-D68D-B79FBE15EFE0}"/>
+          <p:cNvPr id="5" name="Picture 4" descr="A pixelated video game of a person lying on the ground&#10;&#10;AI-generated content may be incorrect.">
+            <a:extLst>
+              <a:ext uri="{FF2B5EF4-FFF2-40B4-BE49-F238E27FC236}">
+                <a16:creationId xmlns:a16="http://schemas.microsoft.com/office/drawing/2014/main" id="{C9EE4E8C-506D-EF3A-014F-2211801C04D0}"/>
               </a:ext>
             </a:extLst>
           </p:cNvPr>
@@ -6704,8 +6558,8 @@
         </p:blipFill>
         <p:spPr>
           <a:xfrm>
-            <a:off x="1129211" y="1785983"/>
-            <a:ext cx="9933577" cy="2483394"/>
+            <a:off x="3684088" y="375193"/>
+            <a:ext cx="4823824" cy="4823824"/>
           </a:xfrm>
           <a:prstGeom prst="rect">
             <a:avLst/>
@@ -6715,7 +6569,7 @@
     </p:spTree>
     <p:extLst>
       <p:ext uri="{BB962C8B-B14F-4D97-AF65-F5344CB8AC3E}">
-        <p14:creationId xmlns:p14="http://schemas.microsoft.com/office/powerpoint/2010/main" val="1304492956"/>
+        <p14:creationId xmlns:p14="http://schemas.microsoft.com/office/powerpoint/2010/main" val="3798418715"/>
       </p:ext>
     </p:extLst>
   </p:cSld>
@@ -6742,6 +6596,66 @@
           <a:chExt cx="0" cy="0"/>
         </a:xfrm>
       </p:grpSpPr>
+      <p:pic>
+        <p:nvPicPr>
+          <p:cNvPr id="5" name="Picture 4" descr="A screenshot of a video game&#10;&#10;AI-generated content may be incorrect.">
+            <a:extLst>
+              <a:ext uri="{FF2B5EF4-FFF2-40B4-BE49-F238E27FC236}">
+                <a16:creationId xmlns:a16="http://schemas.microsoft.com/office/drawing/2014/main" id="{2CE74E9C-16F4-0C03-D68D-B79FBE15EFE0}"/>
+              </a:ext>
+            </a:extLst>
+          </p:cNvPr>
+          <p:cNvPicPr>
+            <a:picLocks noChangeAspect="1"/>
+          </p:cNvPicPr>
+          <p:nvPr/>
+        </p:nvPicPr>
+        <p:blipFill>
+          <a:blip r:embed="rId3"/>
+          <a:stretch>
+            <a:fillRect/>
+          </a:stretch>
+        </p:blipFill>
+        <p:spPr>
+          <a:xfrm>
+            <a:off x="1129211" y="1785983"/>
+            <a:ext cx="9933577" cy="2483394"/>
+          </a:xfrm>
+          <a:prstGeom prst="rect">
+            <a:avLst/>
+          </a:prstGeom>
+        </p:spPr>
+      </p:pic>
+    </p:spTree>
+    <p:extLst>
+      <p:ext uri="{BB962C8B-B14F-4D97-AF65-F5344CB8AC3E}">
+        <p14:creationId xmlns:p14="http://schemas.microsoft.com/office/powerpoint/2010/main" val="1304492956"/>
+      </p:ext>
+    </p:extLst>
+  </p:cSld>
+  <p:clrMapOvr>
+    <a:masterClrMapping/>
+  </p:clrMapOvr>
+</p:sld>
+</file>
+
+<file path=ppt/slides/slide23.xml><?xml version="1.0" encoding="utf-8"?>
+<p:sld xmlns:a="http://schemas.openxmlformats.org/drawingml/2006/main" xmlns:r="http://schemas.openxmlformats.org/officeDocument/2006/relationships" xmlns:p="http://schemas.openxmlformats.org/presentationml/2006/main">
+  <p:cSld>
+    <p:spTree>
+      <p:nvGrpSpPr>
+        <p:cNvPr id="1" name=""/>
+        <p:cNvGrpSpPr/>
+        <p:nvPr/>
+      </p:nvGrpSpPr>
+      <p:grpSpPr>
+        <a:xfrm>
+          <a:off x="0" y="0"/>
+          <a:ext cx="0" cy="0"/>
+          <a:chOff x="0" y="0"/>
+          <a:chExt cx="0" cy="0"/>
+        </a:xfrm>
+      </p:grpSpPr>
       <p:sp>
         <p:nvSpPr>
           <p:cNvPr id="2" name="Title 1">
@@ -6808,7 +6722,7 @@
 </p:sld>
 </file>
 
-<file path=ppt/slides/slide23.xml><?xml version="1.0" encoding="utf-8"?>
+<file path=ppt/slides/slide24.xml><?xml version="1.0" encoding="utf-8"?>
 <p:sld xmlns:a="http://schemas.openxmlformats.org/drawingml/2006/main" xmlns:r="http://schemas.openxmlformats.org/officeDocument/2006/relationships" xmlns:p="http://schemas.openxmlformats.org/presentationml/2006/main">
   <p:cSld>
     <p:spTree>
@@ -7199,7 +7113,7 @@
 </p:sld>
 </file>
 
-<file path=ppt/slides/slide24.xml><?xml version="1.0" encoding="utf-8"?>
+<file path=ppt/slides/slide25.xml><?xml version="1.0" encoding="utf-8"?>
 <p:sld xmlns:a="http://schemas.openxmlformats.org/drawingml/2006/main" xmlns:r="http://schemas.openxmlformats.org/officeDocument/2006/relationships" xmlns:p="http://schemas.openxmlformats.org/presentationml/2006/main">
   <p:cSld>
     <p:spTree>
@@ -7259,7 +7173,7 @@
 </p:sld>
 </file>
 
-<file path=ppt/slides/slide25.xml><?xml version="1.0" encoding="utf-8"?>
+<file path=ppt/slides/slide26.xml><?xml version="1.0" encoding="utf-8"?>
 <p:sld xmlns:a="http://schemas.openxmlformats.org/drawingml/2006/main" xmlns:r="http://schemas.openxmlformats.org/officeDocument/2006/relationships" xmlns:p="http://schemas.openxmlformats.org/presentationml/2006/main">
   <p:cSld>
     <p:bg>
@@ -7481,7 +7395,7 @@
 </p:sld>
 </file>
 
-<file path=ppt/slides/slide26.xml><?xml version="1.0" encoding="utf-8"?>
+<file path=ppt/slides/slide27.xml><?xml version="1.0" encoding="utf-8"?>
 <p:sld xmlns:a="http://schemas.openxmlformats.org/drawingml/2006/main" xmlns:r="http://schemas.openxmlformats.org/officeDocument/2006/relationships" xmlns:p="http://schemas.openxmlformats.org/presentationml/2006/main">
   <p:cSld>
     <p:spTree>
@@ -7532,66 +7446,6 @@
     <p:extLst>
       <p:ext uri="{BB962C8B-B14F-4D97-AF65-F5344CB8AC3E}">
         <p14:creationId xmlns:p14="http://schemas.microsoft.com/office/powerpoint/2010/main" val="3592726356"/>
-      </p:ext>
-    </p:extLst>
-  </p:cSld>
-  <p:clrMapOvr>
-    <a:masterClrMapping/>
-  </p:clrMapOvr>
-</p:sld>
-</file>
-
-<file path=ppt/slides/slide27.xml><?xml version="1.0" encoding="utf-8"?>
-<p:sld xmlns:a="http://schemas.openxmlformats.org/drawingml/2006/main" xmlns:r="http://schemas.openxmlformats.org/officeDocument/2006/relationships" xmlns:p="http://schemas.openxmlformats.org/presentationml/2006/main">
-  <p:cSld>
-    <p:spTree>
-      <p:nvGrpSpPr>
-        <p:cNvPr id="1" name=""/>
-        <p:cNvGrpSpPr/>
-        <p:nvPr/>
-      </p:nvGrpSpPr>
-      <p:grpSpPr>
-        <a:xfrm>
-          <a:off x="0" y="0"/>
-          <a:ext cx="0" cy="0"/>
-          <a:chOff x="0" y="0"/>
-          <a:chExt cx="0" cy="0"/>
-        </a:xfrm>
-      </p:grpSpPr>
-      <p:pic>
-        <p:nvPicPr>
-          <p:cNvPr id="5" name="Picture 4">
-            <a:extLst>
-              <a:ext uri="{FF2B5EF4-FFF2-40B4-BE49-F238E27FC236}">
-                <a16:creationId xmlns:a16="http://schemas.microsoft.com/office/drawing/2014/main" id="{5037ABE9-EE43-1687-80A3-F74AAF7A19F1}"/>
-              </a:ext>
-            </a:extLst>
-          </p:cNvPr>
-          <p:cNvPicPr>
-            <a:picLocks noChangeAspect="1"/>
-          </p:cNvPicPr>
-          <p:nvPr/>
-        </p:nvPicPr>
-        <p:blipFill>
-          <a:blip r:embed="rId3"/>
-          <a:stretch>
-            <a:fillRect/>
-          </a:stretch>
-        </p:blipFill>
-        <p:spPr>
-          <a:xfrm>
-            <a:off x="3710215" y="992777"/>
-            <a:ext cx="4389120" cy="4389120"/>
-          </a:xfrm>
-          <a:prstGeom prst="rect">
-            <a:avLst/>
-          </a:prstGeom>
-        </p:spPr>
-      </p:pic>
-    </p:spTree>
-    <p:extLst>
-      <p:ext uri="{BB962C8B-B14F-4D97-AF65-F5344CB8AC3E}">
-        <p14:creationId xmlns:p14="http://schemas.microsoft.com/office/powerpoint/2010/main" val="3828849511"/>
       </p:ext>
     </p:extLst>
   </p:cSld>
@@ -7620,10 +7474,10 @@
       </p:grpSpPr>
       <p:pic>
         <p:nvPicPr>
-          <p:cNvPr id="5" name="Picture 4" descr="A pixel art of two people holding a sword&#10;&#10;AI-generated content may be incorrect.">
-            <a:extLst>
-              <a:ext uri="{FF2B5EF4-FFF2-40B4-BE49-F238E27FC236}">
-                <a16:creationId xmlns:a16="http://schemas.microsoft.com/office/drawing/2014/main" id="{A1E222EC-2C1F-4FCF-C884-E3577C32AA85}"/>
+          <p:cNvPr id="5" name="Picture 4">
+            <a:extLst>
+              <a:ext uri="{FF2B5EF4-FFF2-40B4-BE49-F238E27FC236}">
+                <a16:creationId xmlns:a16="http://schemas.microsoft.com/office/drawing/2014/main" id="{5037ABE9-EE43-1687-80A3-F74AAF7A19F1}"/>
               </a:ext>
             </a:extLst>
           </p:cNvPr>
@@ -7640,8 +7494,8 @@
         </p:blipFill>
         <p:spPr>
           <a:xfrm>
-            <a:off x="1404981" y="1485899"/>
-            <a:ext cx="9829075" cy="2457269"/>
+            <a:off x="3710215" y="992777"/>
+            <a:ext cx="4389120" cy="4389120"/>
           </a:xfrm>
           <a:prstGeom prst="rect">
             <a:avLst/>
@@ -7651,7 +7505,7 @@
     </p:spTree>
     <p:extLst>
       <p:ext uri="{BB962C8B-B14F-4D97-AF65-F5344CB8AC3E}">
-        <p14:creationId xmlns:p14="http://schemas.microsoft.com/office/powerpoint/2010/main" val="2552396498"/>
+        <p14:creationId xmlns:p14="http://schemas.microsoft.com/office/powerpoint/2010/main" val="3828849511"/>
       </p:ext>
     </p:extLst>
   </p:cSld>
@@ -7680,39 +7534,10 @@
       </p:grpSpPr>
       <p:pic>
         <p:nvPicPr>
-          <p:cNvPr id="5" name="Picture 4">
-            <a:extLst>
-              <a:ext uri="{FF2B5EF4-FFF2-40B4-BE49-F238E27FC236}">
-                <a16:creationId xmlns:a16="http://schemas.microsoft.com/office/drawing/2014/main" id="{20953D05-7C6C-642A-B2B4-6DE7BEC7ABC6}"/>
-              </a:ext>
-            </a:extLst>
-          </p:cNvPr>
-          <p:cNvPicPr>
-            <a:picLocks noChangeAspect="1"/>
-          </p:cNvPicPr>
-          <p:nvPr/>
-        </p:nvPicPr>
-        <p:blipFill>
-          <a:blip r:embed="rId2"/>
-          <a:srcRect t="34438"/>
-          <a:stretch/>
-        </p:blipFill>
-        <p:spPr>
-          <a:xfrm>
-            <a:off x="886987" y="896730"/>
-            <a:ext cx="5245858" cy="1925983"/>
-          </a:xfrm>
-          <a:prstGeom prst="rect">
-            <a:avLst/>
-          </a:prstGeom>
-        </p:spPr>
-      </p:pic>
-      <p:pic>
-        <p:nvPicPr>
-          <p:cNvPr id="7" name="Picture 6" descr="A tree with pink flowers&#10;&#10;AI-generated content may be incorrect.">
-            <a:extLst>
-              <a:ext uri="{FF2B5EF4-FFF2-40B4-BE49-F238E27FC236}">
-                <a16:creationId xmlns:a16="http://schemas.microsoft.com/office/drawing/2014/main" id="{B23B2697-2CE3-A8F5-30AB-3B483943ED22}"/>
+          <p:cNvPr id="5" name="Picture 4" descr="A pixel art of two people holding a sword&#10;&#10;AI-generated content may be incorrect.">
+            <a:extLst>
+              <a:ext uri="{FF2B5EF4-FFF2-40B4-BE49-F238E27FC236}">
+                <a16:creationId xmlns:a16="http://schemas.microsoft.com/office/drawing/2014/main" id="{A1E222EC-2C1F-4FCF-C884-E3577C32AA85}"/>
               </a:ext>
             </a:extLst>
           </p:cNvPr>
@@ -7729,174 +7554,18 @@
         </p:blipFill>
         <p:spPr>
           <a:xfrm>
-            <a:off x="2838023" y="3429000"/>
-            <a:ext cx="6589644" cy="2196548"/>
+            <a:off x="1404981" y="1485899"/>
+            <a:ext cx="9829075" cy="2457269"/>
           </a:xfrm>
           <a:prstGeom prst="rect">
             <a:avLst/>
           </a:prstGeom>
         </p:spPr>
       </p:pic>
-      <p:pic>
-        <p:nvPicPr>
-          <p:cNvPr id="9" name="Picture 8" descr="A pixelated image of a beach&#10;&#10;AI-generated content may be incorrect.">
-            <a:extLst>
-              <a:ext uri="{FF2B5EF4-FFF2-40B4-BE49-F238E27FC236}">
-                <a16:creationId xmlns:a16="http://schemas.microsoft.com/office/drawing/2014/main" id="{5E783867-FCFB-4880-C442-42648349D88E}"/>
-              </a:ext>
-            </a:extLst>
-          </p:cNvPr>
-          <p:cNvPicPr>
-            <a:picLocks noChangeAspect="1"/>
-          </p:cNvPicPr>
-          <p:nvPr/>
-        </p:nvPicPr>
-        <p:blipFill>
-          <a:blip r:embed="rId4"/>
-          <a:stretch>
-            <a:fillRect/>
-          </a:stretch>
-        </p:blipFill>
-        <p:spPr>
-          <a:xfrm>
-            <a:off x="7330662" y="896730"/>
-            <a:ext cx="3667538" cy="2053822"/>
-          </a:xfrm>
-          <a:prstGeom prst="rect">
-            <a:avLst/>
-          </a:prstGeom>
-        </p:spPr>
-      </p:pic>
-      <p:sp>
-        <p:nvSpPr>
-          <p:cNvPr id="11" name="TextBox 10">
-            <a:extLst>
-              <a:ext uri="{FF2B5EF4-FFF2-40B4-BE49-F238E27FC236}">
-                <a16:creationId xmlns:a16="http://schemas.microsoft.com/office/drawing/2014/main" id="{1AB50995-4D1B-2C41-8754-B64E8745A4A6}"/>
-              </a:ext>
-            </a:extLst>
-          </p:cNvPr>
-          <p:cNvSpPr txBox="1"/>
-          <p:nvPr/>
-        </p:nvSpPr>
-        <p:spPr>
-          <a:xfrm>
-            <a:off x="850142" y="3003345"/>
-            <a:ext cx="5245858" cy="369332"/>
-          </a:xfrm>
-          <a:prstGeom prst="rect">
-            <a:avLst/>
-          </a:prstGeom>
-          <a:solidFill>
-            <a:schemeClr val="accent2"/>
-          </a:solidFill>
-        </p:spPr>
-        <p:txBody>
-          <a:bodyPr wrap="square" rtlCol="0">
-            <a:spAutoFit/>
-          </a:bodyPr>
-          <a:lstStyle/>
-          <a:p>
-            <a:pPr algn="ctr"/>
-            <a:r>
-              <a:rPr lang="en-US" dirty="0">
-                <a:solidFill>
-                  <a:schemeClr val="bg1"/>
-                </a:solidFill>
-              </a:rPr>
-              <a:t>Mountains</a:t>
-            </a:r>
-          </a:p>
-        </p:txBody>
-      </p:sp>
-      <p:sp>
-        <p:nvSpPr>
-          <p:cNvPr id="13" name="TextBox 12">
-            <a:extLst>
-              <a:ext uri="{FF2B5EF4-FFF2-40B4-BE49-F238E27FC236}">
-                <a16:creationId xmlns:a16="http://schemas.microsoft.com/office/drawing/2014/main" id="{DBC18466-DAB1-280B-00F2-E50FD90D36D0}"/>
-              </a:ext>
-            </a:extLst>
-          </p:cNvPr>
-          <p:cNvSpPr txBox="1"/>
-          <p:nvPr/>
-        </p:nvSpPr>
-        <p:spPr>
-          <a:xfrm>
-            <a:off x="7330662" y="3039262"/>
-            <a:ext cx="3667538" cy="369332"/>
-          </a:xfrm>
-          <a:prstGeom prst="rect">
-            <a:avLst/>
-          </a:prstGeom>
-          <a:solidFill>
-            <a:schemeClr val="accent2"/>
-          </a:solidFill>
-        </p:spPr>
-        <p:txBody>
-          <a:bodyPr wrap="square" rtlCol="0">
-            <a:spAutoFit/>
-          </a:bodyPr>
-          <a:lstStyle/>
-          <a:p>
-            <a:pPr algn="ctr"/>
-            <a:r>
-              <a:rPr lang="en-US" dirty="0">
-                <a:solidFill>
-                  <a:schemeClr val="bg1"/>
-                </a:solidFill>
-              </a:rPr>
-              <a:t>Sky</a:t>
-            </a:r>
-          </a:p>
-        </p:txBody>
-      </p:sp>
-      <p:sp>
-        <p:nvSpPr>
-          <p:cNvPr id="15" name="TextBox 14">
-            <a:extLst>
-              <a:ext uri="{FF2B5EF4-FFF2-40B4-BE49-F238E27FC236}">
-                <a16:creationId xmlns:a16="http://schemas.microsoft.com/office/drawing/2014/main" id="{9AF93C03-036F-83C4-2448-3FD98D3CB0E6}"/>
-              </a:ext>
-            </a:extLst>
-          </p:cNvPr>
-          <p:cNvSpPr txBox="1"/>
-          <p:nvPr/>
-        </p:nvSpPr>
-        <p:spPr>
-          <a:xfrm>
-            <a:off x="3308627" y="5776604"/>
-            <a:ext cx="5782363" cy="369332"/>
-          </a:xfrm>
-          <a:prstGeom prst="rect">
-            <a:avLst/>
-          </a:prstGeom>
-          <a:solidFill>
-            <a:schemeClr val="accent2"/>
-          </a:solidFill>
-        </p:spPr>
-        <p:txBody>
-          <a:bodyPr wrap="square" rtlCol="0">
-            <a:spAutoFit/>
-          </a:bodyPr>
-          <a:lstStyle/>
-          <a:p>
-            <a:pPr algn="ctr"/>
-            <a:r>
-              <a:rPr lang="en-US" dirty="0">
-                <a:solidFill>
-                  <a:schemeClr val="bg1"/>
-                </a:solidFill>
-              </a:rPr>
-              <a:t>Cherry Blossoms</a:t>
-            </a:r>
-          </a:p>
-        </p:txBody>
-      </p:sp>
     </p:spTree>
     <p:extLst>
       <p:ext uri="{BB962C8B-B14F-4D97-AF65-F5344CB8AC3E}">
-        <p14:creationId xmlns:p14="http://schemas.microsoft.com/office/powerpoint/2010/main" val="2980248134"/>
+        <p14:creationId xmlns:p14="http://schemas.microsoft.com/office/powerpoint/2010/main" val="2552396498"/>
       </p:ext>
     </p:extLst>
   </p:cSld>
@@ -7925,10 +7594,10 @@
       </p:grpSpPr>
       <p:pic>
         <p:nvPicPr>
-          <p:cNvPr id="5" name="Picture 4" descr="A green and grey landscape&#10;&#10;AI-generated content may be incorrect.">
-            <a:extLst>
-              <a:ext uri="{FF2B5EF4-FFF2-40B4-BE49-F238E27FC236}">
-                <a16:creationId xmlns:a16="http://schemas.microsoft.com/office/drawing/2014/main" id="{FC1C84A4-96DB-0179-78AF-5F7D33BF3F0E}"/>
+          <p:cNvPr id="5" name="Picture 4" descr="A green grass and black sky&#10;&#10;AI-generated content may be incorrect.">
+            <a:extLst>
+              <a:ext uri="{FF2B5EF4-FFF2-40B4-BE49-F238E27FC236}">
+                <a16:creationId xmlns:a16="http://schemas.microsoft.com/office/drawing/2014/main" id="{033B831B-31A4-0FDD-857F-9DEC128D4B2F}"/>
               </a:ext>
             </a:extLst>
           </p:cNvPr>
@@ -7945,8 +7614,8 @@
         </p:blipFill>
         <p:spPr>
           <a:xfrm>
-            <a:off x="6398261" y="256290"/>
-            <a:ext cx="2946003" cy="1178401"/>
+            <a:off x="4711700" y="2654300"/>
+            <a:ext cx="2768600" cy="1549400"/>
           </a:xfrm>
           <a:prstGeom prst="rect">
             <a:avLst/>
@@ -7955,10 +7624,10 @@
       </p:pic>
       <p:pic>
         <p:nvPicPr>
-          <p:cNvPr id="7" name="Picture 6" descr="A green and grey landscape&#10;&#10;AI-generated content may be incorrect.">
-            <a:extLst>
-              <a:ext uri="{FF2B5EF4-FFF2-40B4-BE49-F238E27FC236}">
-                <a16:creationId xmlns:a16="http://schemas.microsoft.com/office/drawing/2014/main" id="{FF7E820D-2F91-E73A-CF77-51DC15A7F21A}"/>
+          <p:cNvPr id="7" name="Picture 6" descr="A sunset over a beach&#10;&#10;AI-generated content may be incorrect.">
+            <a:extLst>
+              <a:ext uri="{FF2B5EF4-FFF2-40B4-BE49-F238E27FC236}">
+                <a16:creationId xmlns:a16="http://schemas.microsoft.com/office/drawing/2014/main" id="{C51E8054-B9CC-65AE-3B89-97630F46A0F5}"/>
               </a:ext>
             </a:extLst>
           </p:cNvPr>
@@ -7975,8 +7644,8 @@
         </p:blipFill>
         <p:spPr>
           <a:xfrm>
-            <a:off x="4114699" y="2891236"/>
-            <a:ext cx="3519365" cy="1407746"/>
+            <a:off x="4159250" y="2654300"/>
+            <a:ext cx="3873500" cy="1549400"/>
           </a:xfrm>
           <a:prstGeom prst="rect">
             <a:avLst/>
@@ -7985,10 +7654,10 @@
       </p:pic>
       <p:pic>
         <p:nvPicPr>
-          <p:cNvPr id="9" name="Picture 8" descr="A green and blue landscape&#10;&#10;AI-generated content may be incorrect.">
-            <a:extLst>
-              <a:ext uri="{FF2B5EF4-FFF2-40B4-BE49-F238E27FC236}">
-                <a16:creationId xmlns:a16="http://schemas.microsoft.com/office/drawing/2014/main" id="{2F8FDCB9-97E1-648F-8E5D-3E534B6053F1}"/>
+          <p:cNvPr id="9" name="Picture 8" descr="A drawing of a wall and grass&#10;&#10;AI-generated content may be incorrect.">
+            <a:extLst>
+              <a:ext uri="{FF2B5EF4-FFF2-40B4-BE49-F238E27FC236}">
+                <a16:creationId xmlns:a16="http://schemas.microsoft.com/office/drawing/2014/main" id="{1BD325F3-8F79-A7D8-2CE1-C92ABA0973FD}"/>
               </a:ext>
             </a:extLst>
           </p:cNvPr>
@@ -8005,7 +7674,7 @@
         </p:blipFill>
         <p:spPr>
           <a:xfrm>
-            <a:off x="7871262" y="2820409"/>
+            <a:off x="8032750" y="2654300"/>
             <a:ext cx="3873500" cy="1549400"/>
           </a:xfrm>
           <a:prstGeom prst="rect">
@@ -8015,10 +7684,10 @@
       </p:pic>
       <p:pic>
         <p:nvPicPr>
-          <p:cNvPr id="11" name="Picture 10" descr="A green and blue landscape&#10;&#10;AI-generated content may be incorrect.">
-            <a:extLst>
-              <a:ext uri="{FF2B5EF4-FFF2-40B4-BE49-F238E27FC236}">
-                <a16:creationId xmlns:a16="http://schemas.microsoft.com/office/drawing/2014/main" id="{B1893EDA-2B63-64D2-F91A-6BD991BDADE3}"/>
+          <p:cNvPr id="11" name="Picture 10" descr="A green mountains with blue sky&#10;&#10;AI-generated content may be incorrect.">
+            <a:extLst>
+              <a:ext uri="{FF2B5EF4-FFF2-40B4-BE49-F238E27FC236}">
+                <a16:creationId xmlns:a16="http://schemas.microsoft.com/office/drawing/2014/main" id="{E51B1948-ED02-418C-49B0-26742191C732}"/>
               </a:ext>
             </a:extLst>
           </p:cNvPr>
@@ -8035,7 +7704,7 @@
         </p:blipFill>
         <p:spPr>
           <a:xfrm>
-            <a:off x="7951169" y="4515581"/>
+            <a:off x="6096000" y="4203700"/>
             <a:ext cx="3873500" cy="1549400"/>
           </a:xfrm>
           <a:prstGeom prst="rect">
@@ -8045,10 +7714,10 @@
       </p:pic>
       <p:pic>
         <p:nvPicPr>
-          <p:cNvPr id="13" name="Picture 12" descr="A drawing of a landscape with trees and mountains&#10;&#10;AI-generated content may be incorrect.">
-            <a:extLst>
-              <a:ext uri="{FF2B5EF4-FFF2-40B4-BE49-F238E27FC236}">
-                <a16:creationId xmlns:a16="http://schemas.microsoft.com/office/drawing/2014/main" id="{30481321-1A73-6E30-785E-E93F92190427}"/>
+          <p:cNvPr id="13" name="Picture 12" descr="A green grass field with white dots and black sky&#10;&#10;AI-generated content may be incorrect.">
+            <a:extLst>
+              <a:ext uri="{FF2B5EF4-FFF2-40B4-BE49-F238E27FC236}">
+                <a16:creationId xmlns:a16="http://schemas.microsoft.com/office/drawing/2014/main" id="{DD03E9AA-7BE5-015F-8F8F-88CB2D7FDE31}"/>
               </a:ext>
             </a:extLst>
           </p:cNvPr>
@@ -8065,8 +7734,8 @@
         </p:blipFill>
         <p:spPr>
           <a:xfrm>
-            <a:off x="9587730" y="981639"/>
-            <a:ext cx="2510773" cy="1004309"/>
+            <a:off x="3327400" y="4203700"/>
+            <a:ext cx="2768600" cy="1549400"/>
           </a:xfrm>
           <a:prstGeom prst="rect">
             <a:avLst/>
@@ -8075,40 +7744,10 @@
       </p:pic>
       <p:pic>
         <p:nvPicPr>
-          <p:cNvPr id="15" name="Picture 14" descr="A drawing of a landscape with trees and mountains&#10;&#10;AI-generated content may be incorrect.">
-            <a:extLst>
-              <a:ext uri="{FF2B5EF4-FFF2-40B4-BE49-F238E27FC236}">
-                <a16:creationId xmlns:a16="http://schemas.microsoft.com/office/drawing/2014/main" id="{CA0CDEE1-3FD0-8FB6-C8A4-90F6C3106B94}"/>
-              </a:ext>
-            </a:extLst>
-          </p:cNvPr>
-          <p:cNvPicPr>
-            <a:picLocks noChangeAspect="1"/>
-          </p:cNvPicPr>
-          <p:nvPr/>
-        </p:nvPicPr>
-        <p:blipFill>
-          <a:blip r:embed="rId6"/>
-          <a:stretch>
-            <a:fillRect/>
-          </a:stretch>
-        </p:blipFill>
-        <p:spPr>
-          <a:xfrm>
-            <a:off x="3382600" y="1521802"/>
-            <a:ext cx="2946003" cy="1178401"/>
-          </a:xfrm>
-          <a:prstGeom prst="rect">
-            <a:avLst/>
-          </a:prstGeom>
-        </p:spPr>
-      </p:pic>
-      <p:pic>
-        <p:nvPicPr>
-          <p:cNvPr id="17" name="Picture 16" descr="A green and grey mountains&#10;&#10;AI-generated content may be incorrect.">
-            <a:extLst>
-              <a:ext uri="{FF2B5EF4-FFF2-40B4-BE49-F238E27FC236}">
-                <a16:creationId xmlns:a16="http://schemas.microsoft.com/office/drawing/2014/main" id="{1C57569B-AD50-4A4F-BA53-F1127AC31BCA}"/>
+          <p:cNvPr id="15" name="Picture 14" descr="A green and brown grass&#10;&#10;AI-generated content may be incorrect.">
+            <a:extLst>
+              <a:ext uri="{FF2B5EF4-FFF2-40B4-BE49-F238E27FC236}">
+                <a16:creationId xmlns:a16="http://schemas.microsoft.com/office/drawing/2014/main" id="{0982CCEC-DCCF-236B-47B1-1A0F73405AEF}"/>
               </a:ext>
             </a:extLst>
           </p:cNvPr>
@@ -8125,8 +7764,8 @@
         </p:blipFill>
         <p:spPr>
           <a:xfrm>
-            <a:off x="4199401" y="4489511"/>
-            <a:ext cx="3519364" cy="1407746"/>
+            <a:off x="285750" y="2654300"/>
+            <a:ext cx="3873500" cy="1549400"/>
           </a:xfrm>
           <a:prstGeom prst="rect">
             <a:avLst/>
@@ -8135,10 +7774,10 @@
       </p:pic>
       <p:pic>
         <p:nvPicPr>
-          <p:cNvPr id="19" name="Picture 18" descr="A green and grey mountains&#10;&#10;AI-generated content may be incorrect.">
-            <a:extLst>
-              <a:ext uri="{FF2B5EF4-FFF2-40B4-BE49-F238E27FC236}">
-                <a16:creationId xmlns:a16="http://schemas.microsoft.com/office/drawing/2014/main" id="{763B6504-84F6-9CC0-D4B6-33685D86A017}"/>
+          <p:cNvPr id="17" name="Picture 16" descr="A drawing of trees and flowers&#10;&#10;AI-generated content may be incorrect.">
+            <a:extLst>
+              <a:ext uri="{FF2B5EF4-FFF2-40B4-BE49-F238E27FC236}">
+                <a16:creationId xmlns:a16="http://schemas.microsoft.com/office/drawing/2014/main" id="{F6B25DF6-537E-753F-3B3B-3673F4721A3A}"/>
               </a:ext>
             </a:extLst>
           </p:cNvPr>
@@ -8155,8 +7794,8 @@
         </p:blipFill>
         <p:spPr>
           <a:xfrm>
-            <a:off x="249789" y="1504449"/>
-            <a:ext cx="2989385" cy="1195754"/>
+            <a:off x="4159250" y="1104900"/>
+            <a:ext cx="3873500" cy="1549400"/>
           </a:xfrm>
           <a:prstGeom prst="rect">
             <a:avLst/>
@@ -8165,10 +7804,10 @@
       </p:pic>
       <p:pic>
         <p:nvPicPr>
-          <p:cNvPr id="21" name="Picture 20" descr="A green and grey landscape&#10;&#10;AI-generated content may be incorrect.">
-            <a:extLst>
-              <a:ext uri="{FF2B5EF4-FFF2-40B4-BE49-F238E27FC236}">
-                <a16:creationId xmlns:a16="http://schemas.microsoft.com/office/drawing/2014/main" id="{84E958D1-4D72-9E66-2FF3-CF7EE54F4183}"/>
+          <p:cNvPr id="19" name="Picture 18" descr="A field of flowers and rocks&#10;&#10;AI-generated content may be incorrect.">
+            <a:extLst>
+              <a:ext uri="{FF2B5EF4-FFF2-40B4-BE49-F238E27FC236}">
+                <a16:creationId xmlns:a16="http://schemas.microsoft.com/office/drawing/2014/main" id="{1AEC06AD-E480-DC36-FB6F-AE3FD314A312}"/>
               </a:ext>
             </a:extLst>
           </p:cNvPr>
@@ -8185,7 +7824,7 @@
         </p:blipFill>
         <p:spPr>
           <a:xfrm>
-            <a:off x="209699" y="4489511"/>
+            <a:off x="285750" y="1104900"/>
             <a:ext cx="3873500" cy="1549400"/>
           </a:xfrm>
           <a:prstGeom prst="rect">
@@ -8195,10 +7834,10 @@
       </p:pic>
       <p:pic>
         <p:nvPicPr>
-          <p:cNvPr id="23" name="Picture 22" descr="A green and grey landscape&#10;&#10;AI-generated content may be incorrect.">
-            <a:extLst>
-              <a:ext uri="{FF2B5EF4-FFF2-40B4-BE49-F238E27FC236}">
-                <a16:creationId xmlns:a16="http://schemas.microsoft.com/office/drawing/2014/main" id="{DF6FBD12-69DA-3391-89C8-3EBFAF755E67}"/>
+          <p:cNvPr id="21" name="Picture 20" descr="A drawing of fireworks on a black background&#10;&#10;AI-generated content may be incorrect.">
+            <a:extLst>
+              <a:ext uri="{FF2B5EF4-FFF2-40B4-BE49-F238E27FC236}">
+                <a16:creationId xmlns:a16="http://schemas.microsoft.com/office/drawing/2014/main" id="{BD799648-44DC-FF8D-FAA9-A3ECFF5659C8}"/>
               </a:ext>
             </a:extLst>
           </p:cNvPr>
@@ -8215,98 +7854,8 @@
         </p:blipFill>
         <p:spPr>
           <a:xfrm>
-            <a:off x="125634" y="2820409"/>
+            <a:off x="8032750" y="1104900"/>
             <a:ext cx="3873500" cy="1549400"/>
-          </a:xfrm>
-          <a:prstGeom prst="rect">
-            <a:avLst/>
-          </a:prstGeom>
-        </p:spPr>
-      </p:pic>
-      <p:pic>
-        <p:nvPicPr>
-          <p:cNvPr id="25" name="Picture 24" descr="A drawing of a landscape&#10;&#10;AI-generated content may be incorrect.">
-            <a:extLst>
-              <a:ext uri="{FF2B5EF4-FFF2-40B4-BE49-F238E27FC236}">
-                <a16:creationId xmlns:a16="http://schemas.microsoft.com/office/drawing/2014/main" id="{10E9CC11-A8D4-BDEA-7903-91F83292B09A}"/>
-              </a:ext>
-            </a:extLst>
-          </p:cNvPr>
-          <p:cNvPicPr>
-            <a:picLocks noChangeAspect="1"/>
-          </p:cNvPicPr>
-          <p:nvPr/>
-        </p:nvPicPr>
-        <p:blipFill>
-          <a:blip r:embed="rId11"/>
-          <a:stretch>
-            <a:fillRect/>
-          </a:stretch>
-        </p:blipFill>
-        <p:spPr>
-          <a:xfrm>
-            <a:off x="6385884" y="1500377"/>
-            <a:ext cx="2946003" cy="1178401"/>
-          </a:xfrm>
-          <a:prstGeom prst="rect">
-            <a:avLst/>
-          </a:prstGeom>
-        </p:spPr>
-      </p:pic>
-      <p:pic>
-        <p:nvPicPr>
-          <p:cNvPr id="27" name="Picture 26" descr="A drawing of trees and mountains&#10;&#10;AI-generated content may be incorrect.">
-            <a:extLst>
-              <a:ext uri="{FF2B5EF4-FFF2-40B4-BE49-F238E27FC236}">
-                <a16:creationId xmlns:a16="http://schemas.microsoft.com/office/drawing/2014/main" id="{6F9C5057-D209-1FFA-C895-4234976AA4E8}"/>
-              </a:ext>
-            </a:extLst>
-          </p:cNvPr>
-          <p:cNvPicPr>
-            <a:picLocks noChangeAspect="1"/>
-          </p:cNvPicPr>
-          <p:nvPr/>
-        </p:nvPicPr>
-        <p:blipFill>
-          <a:blip r:embed="rId12"/>
-          <a:stretch>
-            <a:fillRect/>
-          </a:stretch>
-        </p:blipFill>
-        <p:spPr>
-          <a:xfrm>
-            <a:off x="3375237" y="268618"/>
-            <a:ext cx="2953366" cy="1181346"/>
-          </a:xfrm>
-          <a:prstGeom prst="rect">
-            <a:avLst/>
-          </a:prstGeom>
-        </p:spPr>
-      </p:pic>
-      <p:pic>
-        <p:nvPicPr>
-          <p:cNvPr id="29" name="Picture 28" descr="A drawing of trees and mountains&#10;&#10;AI-generated content may be incorrect.">
-            <a:extLst>
-              <a:ext uri="{FF2B5EF4-FFF2-40B4-BE49-F238E27FC236}">
-                <a16:creationId xmlns:a16="http://schemas.microsoft.com/office/drawing/2014/main" id="{77D12A4B-A9AA-CE91-2E76-C337E137A3D6}"/>
-              </a:ext>
-            </a:extLst>
-          </p:cNvPr>
-          <p:cNvPicPr>
-            <a:picLocks noChangeAspect="1"/>
-          </p:cNvPicPr>
-          <p:nvPr/>
-        </p:nvPicPr>
-        <p:blipFill>
-          <a:blip r:embed="rId13"/>
-          <a:stretch>
-            <a:fillRect/>
-          </a:stretch>
-        </p:blipFill>
-        <p:spPr>
-          <a:xfrm>
-            <a:off x="236819" y="256290"/>
-            <a:ext cx="3068760" cy="1227504"/>
           </a:xfrm>
           <a:prstGeom prst="rect">
             <a:avLst/>
@@ -8316,7 +7865,7 @@
     </p:spTree>
     <p:extLst>
       <p:ext uri="{BB962C8B-B14F-4D97-AF65-F5344CB8AC3E}">
-        <p14:creationId xmlns:p14="http://schemas.microsoft.com/office/powerpoint/2010/main" val="1839365695"/>
+        <p14:creationId xmlns:p14="http://schemas.microsoft.com/office/powerpoint/2010/main" val="3656435372"/>
       </p:ext>
     </p:extLst>
   </p:cSld>
@@ -8345,6 +7894,251 @@
       </p:grpSpPr>
       <p:pic>
         <p:nvPicPr>
+          <p:cNvPr id="5" name="Picture 4">
+            <a:extLst>
+              <a:ext uri="{FF2B5EF4-FFF2-40B4-BE49-F238E27FC236}">
+                <a16:creationId xmlns:a16="http://schemas.microsoft.com/office/drawing/2014/main" id="{20953D05-7C6C-642A-B2B4-6DE7BEC7ABC6}"/>
+              </a:ext>
+            </a:extLst>
+          </p:cNvPr>
+          <p:cNvPicPr>
+            <a:picLocks noChangeAspect="1"/>
+          </p:cNvPicPr>
+          <p:nvPr/>
+        </p:nvPicPr>
+        <p:blipFill>
+          <a:blip r:embed="rId2"/>
+          <a:srcRect t="34438"/>
+          <a:stretch/>
+        </p:blipFill>
+        <p:spPr>
+          <a:xfrm>
+            <a:off x="886987" y="896730"/>
+            <a:ext cx="5245858" cy="1925983"/>
+          </a:xfrm>
+          <a:prstGeom prst="rect">
+            <a:avLst/>
+          </a:prstGeom>
+        </p:spPr>
+      </p:pic>
+      <p:pic>
+        <p:nvPicPr>
+          <p:cNvPr id="7" name="Picture 6" descr="A tree with pink flowers&#10;&#10;AI-generated content may be incorrect.">
+            <a:extLst>
+              <a:ext uri="{FF2B5EF4-FFF2-40B4-BE49-F238E27FC236}">
+                <a16:creationId xmlns:a16="http://schemas.microsoft.com/office/drawing/2014/main" id="{B23B2697-2CE3-A8F5-30AB-3B483943ED22}"/>
+              </a:ext>
+            </a:extLst>
+          </p:cNvPr>
+          <p:cNvPicPr>
+            <a:picLocks noChangeAspect="1"/>
+          </p:cNvPicPr>
+          <p:nvPr/>
+        </p:nvPicPr>
+        <p:blipFill>
+          <a:blip r:embed="rId3"/>
+          <a:stretch>
+            <a:fillRect/>
+          </a:stretch>
+        </p:blipFill>
+        <p:spPr>
+          <a:xfrm>
+            <a:off x="2838023" y="3429000"/>
+            <a:ext cx="6589644" cy="2196548"/>
+          </a:xfrm>
+          <a:prstGeom prst="rect">
+            <a:avLst/>
+          </a:prstGeom>
+        </p:spPr>
+      </p:pic>
+      <p:pic>
+        <p:nvPicPr>
+          <p:cNvPr id="9" name="Picture 8" descr="A pixelated image of a beach&#10;&#10;AI-generated content may be incorrect.">
+            <a:extLst>
+              <a:ext uri="{FF2B5EF4-FFF2-40B4-BE49-F238E27FC236}">
+                <a16:creationId xmlns:a16="http://schemas.microsoft.com/office/drawing/2014/main" id="{5E783867-FCFB-4880-C442-42648349D88E}"/>
+              </a:ext>
+            </a:extLst>
+          </p:cNvPr>
+          <p:cNvPicPr>
+            <a:picLocks noChangeAspect="1"/>
+          </p:cNvPicPr>
+          <p:nvPr/>
+        </p:nvPicPr>
+        <p:blipFill>
+          <a:blip r:embed="rId4"/>
+          <a:stretch>
+            <a:fillRect/>
+          </a:stretch>
+        </p:blipFill>
+        <p:spPr>
+          <a:xfrm>
+            <a:off x="7330662" y="896730"/>
+            <a:ext cx="3667538" cy="2053822"/>
+          </a:xfrm>
+          <a:prstGeom prst="rect">
+            <a:avLst/>
+          </a:prstGeom>
+        </p:spPr>
+      </p:pic>
+      <p:sp>
+        <p:nvSpPr>
+          <p:cNvPr id="11" name="TextBox 10">
+            <a:extLst>
+              <a:ext uri="{FF2B5EF4-FFF2-40B4-BE49-F238E27FC236}">
+                <a16:creationId xmlns:a16="http://schemas.microsoft.com/office/drawing/2014/main" id="{1AB50995-4D1B-2C41-8754-B64E8745A4A6}"/>
+              </a:ext>
+            </a:extLst>
+          </p:cNvPr>
+          <p:cNvSpPr txBox="1"/>
+          <p:nvPr/>
+        </p:nvSpPr>
+        <p:spPr>
+          <a:xfrm>
+            <a:off x="850142" y="3003345"/>
+            <a:ext cx="5245858" cy="369332"/>
+          </a:xfrm>
+          <a:prstGeom prst="rect">
+            <a:avLst/>
+          </a:prstGeom>
+          <a:solidFill>
+            <a:schemeClr val="accent2"/>
+          </a:solidFill>
+        </p:spPr>
+        <p:txBody>
+          <a:bodyPr wrap="square" rtlCol="0">
+            <a:spAutoFit/>
+          </a:bodyPr>
+          <a:lstStyle/>
+          <a:p>
+            <a:pPr algn="ctr"/>
+            <a:r>
+              <a:rPr lang="en-US" dirty="0">
+                <a:solidFill>
+                  <a:schemeClr val="bg1"/>
+                </a:solidFill>
+              </a:rPr>
+              <a:t>Mountains</a:t>
+            </a:r>
+          </a:p>
+        </p:txBody>
+      </p:sp>
+      <p:sp>
+        <p:nvSpPr>
+          <p:cNvPr id="13" name="TextBox 12">
+            <a:extLst>
+              <a:ext uri="{FF2B5EF4-FFF2-40B4-BE49-F238E27FC236}">
+                <a16:creationId xmlns:a16="http://schemas.microsoft.com/office/drawing/2014/main" id="{DBC18466-DAB1-280B-00F2-E50FD90D36D0}"/>
+              </a:ext>
+            </a:extLst>
+          </p:cNvPr>
+          <p:cNvSpPr txBox="1"/>
+          <p:nvPr/>
+        </p:nvSpPr>
+        <p:spPr>
+          <a:xfrm>
+            <a:off x="7330662" y="3039262"/>
+            <a:ext cx="3667538" cy="369332"/>
+          </a:xfrm>
+          <a:prstGeom prst="rect">
+            <a:avLst/>
+          </a:prstGeom>
+          <a:solidFill>
+            <a:schemeClr val="accent2"/>
+          </a:solidFill>
+        </p:spPr>
+        <p:txBody>
+          <a:bodyPr wrap="square" rtlCol="0">
+            <a:spAutoFit/>
+          </a:bodyPr>
+          <a:lstStyle/>
+          <a:p>
+            <a:pPr algn="ctr"/>
+            <a:r>
+              <a:rPr lang="en-US" dirty="0">
+                <a:solidFill>
+                  <a:schemeClr val="bg1"/>
+                </a:solidFill>
+              </a:rPr>
+              <a:t>Sky</a:t>
+            </a:r>
+          </a:p>
+        </p:txBody>
+      </p:sp>
+      <p:sp>
+        <p:nvSpPr>
+          <p:cNvPr id="15" name="TextBox 14">
+            <a:extLst>
+              <a:ext uri="{FF2B5EF4-FFF2-40B4-BE49-F238E27FC236}">
+                <a16:creationId xmlns:a16="http://schemas.microsoft.com/office/drawing/2014/main" id="{9AF93C03-036F-83C4-2448-3FD98D3CB0E6}"/>
+              </a:ext>
+            </a:extLst>
+          </p:cNvPr>
+          <p:cNvSpPr txBox="1"/>
+          <p:nvPr/>
+        </p:nvSpPr>
+        <p:spPr>
+          <a:xfrm>
+            <a:off x="3308627" y="5776604"/>
+            <a:ext cx="5782363" cy="369332"/>
+          </a:xfrm>
+          <a:prstGeom prst="rect">
+            <a:avLst/>
+          </a:prstGeom>
+          <a:solidFill>
+            <a:schemeClr val="accent2"/>
+          </a:solidFill>
+        </p:spPr>
+        <p:txBody>
+          <a:bodyPr wrap="square" rtlCol="0">
+            <a:spAutoFit/>
+          </a:bodyPr>
+          <a:lstStyle/>
+          <a:p>
+            <a:pPr algn="ctr"/>
+            <a:r>
+              <a:rPr lang="en-US" dirty="0">
+                <a:solidFill>
+                  <a:schemeClr val="bg1"/>
+                </a:solidFill>
+              </a:rPr>
+              <a:t>Cherry Blossoms</a:t>
+            </a:r>
+          </a:p>
+        </p:txBody>
+      </p:sp>
+    </p:spTree>
+    <p:extLst>
+      <p:ext uri="{BB962C8B-B14F-4D97-AF65-F5344CB8AC3E}">
+        <p14:creationId xmlns:p14="http://schemas.microsoft.com/office/powerpoint/2010/main" val="2980248134"/>
+      </p:ext>
+    </p:extLst>
+  </p:cSld>
+  <p:clrMapOvr>
+    <a:masterClrMapping/>
+  </p:clrMapOvr>
+</p:sld>
+</file>
+
+<file path=ppt/slides/slide31.xml><?xml version="1.0" encoding="utf-8"?>
+<p:sld xmlns:a="http://schemas.openxmlformats.org/drawingml/2006/main" xmlns:r="http://schemas.openxmlformats.org/officeDocument/2006/relationships" xmlns:p="http://schemas.openxmlformats.org/presentationml/2006/main">
+  <p:cSld>
+    <p:spTree>
+      <p:nvGrpSpPr>
+        <p:cNvPr id="1" name=""/>
+        <p:cNvGrpSpPr/>
+        <p:nvPr/>
+      </p:nvGrpSpPr>
+      <p:grpSpPr>
+        <a:xfrm>
+          <a:off x="0" y="0"/>
+          <a:ext cx="0" cy="0"/>
+          <a:chOff x="0" y="0"/>
+          <a:chExt cx="0" cy="0"/>
+        </a:xfrm>
+      </p:grpSpPr>
+      <p:pic>
+        <p:nvPicPr>
           <p:cNvPr id="1026" name="Picture 2">
             <a:extLst>
               <a:ext uri="{FF2B5EF4-FFF2-40B4-BE49-F238E27FC236}">
@@ -8587,7 +8381,7 @@
 </p:sld>
 </file>
 
-<file path=ppt/slides/slide31.xml><?xml version="1.0" encoding="utf-8"?>
+<file path=ppt/slides/slide32.xml><?xml version="1.0" encoding="utf-8"?>
 <p:sld xmlns:a="http://schemas.openxmlformats.org/drawingml/2006/main" xmlns:r="http://schemas.openxmlformats.org/officeDocument/2006/relationships" xmlns:p="http://schemas.openxmlformats.org/presentationml/2006/main">
   <p:cSld>
     <p:bg>
@@ -9069,10 +8863,10 @@
       </p:grpSpPr>
       <p:pic>
         <p:nvPicPr>
-          <p:cNvPr id="5" name="Picture 4" descr="A tree with pink flowers&#10;&#10;AI-generated content may be incorrect.">
-            <a:extLst>
-              <a:ext uri="{FF2B5EF4-FFF2-40B4-BE49-F238E27FC236}">
-                <a16:creationId xmlns:a16="http://schemas.microsoft.com/office/drawing/2014/main" id="{A323C376-344A-C5B3-6AB6-978B6D96FDD7}"/>
+          <p:cNvPr id="5" name="Picture 4" descr="A green and grey landscape&#10;&#10;AI-generated content may be incorrect.">
+            <a:extLst>
+              <a:ext uri="{FF2B5EF4-FFF2-40B4-BE49-F238E27FC236}">
+                <a16:creationId xmlns:a16="http://schemas.microsoft.com/office/drawing/2014/main" id="{FC1C84A4-96DB-0179-78AF-5F7D33BF3F0E}"/>
               </a:ext>
             </a:extLst>
           </p:cNvPr>
@@ -9089,8 +8883,8 @@
         </p:blipFill>
         <p:spPr>
           <a:xfrm>
-            <a:off x="4077188" y="2016858"/>
-            <a:ext cx="3873500" cy="1549400"/>
+            <a:off x="6398261" y="256290"/>
+            <a:ext cx="2946003" cy="1178401"/>
           </a:xfrm>
           <a:prstGeom prst="rect">
             <a:avLst/>
@@ -9099,10 +8893,10 @@
       </p:pic>
       <p:pic>
         <p:nvPicPr>
-          <p:cNvPr id="7" name="Picture 6" descr="A tree with pink flowers&#10;&#10;AI-generated content may be incorrect.">
-            <a:extLst>
-              <a:ext uri="{FF2B5EF4-FFF2-40B4-BE49-F238E27FC236}">
-                <a16:creationId xmlns:a16="http://schemas.microsoft.com/office/drawing/2014/main" id="{5A3FE8E8-E17C-1915-D591-86C3AE423BF1}"/>
+          <p:cNvPr id="7" name="Picture 6" descr="A green and grey landscape&#10;&#10;AI-generated content may be incorrect.">
+            <a:extLst>
+              <a:ext uri="{FF2B5EF4-FFF2-40B4-BE49-F238E27FC236}">
+                <a16:creationId xmlns:a16="http://schemas.microsoft.com/office/drawing/2014/main" id="{FF7E820D-2F91-E73A-CF77-51DC15A7F21A}"/>
               </a:ext>
             </a:extLst>
           </p:cNvPr>
@@ -9119,8 +8913,8 @@
         </p:blipFill>
         <p:spPr>
           <a:xfrm>
-            <a:off x="4077188" y="3744547"/>
-            <a:ext cx="3873500" cy="1549400"/>
+            <a:off x="4114699" y="2891236"/>
+            <a:ext cx="3519365" cy="1407746"/>
           </a:xfrm>
           <a:prstGeom prst="rect">
             <a:avLst/>
@@ -9129,10 +8923,10 @@
       </p:pic>
       <p:pic>
         <p:nvPicPr>
-          <p:cNvPr id="9" name="Picture 8" descr="A group of trees with pink spots&#10;&#10;AI-generated content may be incorrect.">
-            <a:extLst>
-              <a:ext uri="{FF2B5EF4-FFF2-40B4-BE49-F238E27FC236}">
-                <a16:creationId xmlns:a16="http://schemas.microsoft.com/office/drawing/2014/main" id="{CA4B2934-730C-40D3-384A-84F765FE52D8}"/>
+          <p:cNvPr id="9" name="Picture 8" descr="A green and blue landscape&#10;&#10;AI-generated content may be incorrect.">
+            <a:extLst>
+              <a:ext uri="{FF2B5EF4-FFF2-40B4-BE49-F238E27FC236}">
+                <a16:creationId xmlns:a16="http://schemas.microsoft.com/office/drawing/2014/main" id="{2F8FDCB9-97E1-648F-8E5D-3E534B6053F1}"/>
               </a:ext>
             </a:extLst>
           </p:cNvPr>
@@ -9149,7 +8943,7 @@
         </p:blipFill>
         <p:spPr>
           <a:xfrm>
-            <a:off x="8032751" y="2021254"/>
+            <a:off x="7871262" y="2820409"/>
             <a:ext cx="3873500" cy="1549400"/>
           </a:xfrm>
           <a:prstGeom prst="rect">
@@ -9159,10 +8953,10 @@
       </p:pic>
       <p:pic>
         <p:nvPicPr>
-          <p:cNvPr id="11" name="Picture 10" descr="A drawing of trees with pink flowers&#10;&#10;AI-generated content may be incorrect.">
-            <a:extLst>
-              <a:ext uri="{FF2B5EF4-FFF2-40B4-BE49-F238E27FC236}">
-                <a16:creationId xmlns:a16="http://schemas.microsoft.com/office/drawing/2014/main" id="{11C0E5B4-B834-755A-7129-7F8C65D2078B}"/>
+          <p:cNvPr id="11" name="Picture 10" descr="A green and blue landscape&#10;&#10;AI-generated content may be incorrect.">
+            <a:extLst>
+              <a:ext uri="{FF2B5EF4-FFF2-40B4-BE49-F238E27FC236}">
+                <a16:creationId xmlns:a16="http://schemas.microsoft.com/office/drawing/2014/main" id="{B1893EDA-2B63-64D2-F91A-6BD991BDADE3}"/>
               </a:ext>
             </a:extLst>
           </p:cNvPr>
@@ -9179,7 +8973,7 @@
         </p:blipFill>
         <p:spPr>
           <a:xfrm>
-            <a:off x="8032751" y="3744547"/>
+            <a:off x="7951169" y="4515581"/>
             <a:ext cx="3873500" cy="1549400"/>
           </a:xfrm>
           <a:prstGeom prst="rect">
@@ -9189,10 +8983,10 @@
       </p:pic>
       <p:pic>
         <p:nvPicPr>
-          <p:cNvPr id="13" name="Picture 12" descr="A group of trees with pink flowers&#10;&#10;AI-generated content may be incorrect.">
-            <a:extLst>
-              <a:ext uri="{FF2B5EF4-FFF2-40B4-BE49-F238E27FC236}">
-                <a16:creationId xmlns:a16="http://schemas.microsoft.com/office/drawing/2014/main" id="{E6BF121E-5A2F-8C6A-A4D6-2072A06B1D76}"/>
+          <p:cNvPr id="13" name="Picture 12" descr="A drawing of a landscape with trees and mountains&#10;&#10;AI-generated content may be incorrect.">
+            <a:extLst>
+              <a:ext uri="{FF2B5EF4-FFF2-40B4-BE49-F238E27FC236}">
+                <a16:creationId xmlns:a16="http://schemas.microsoft.com/office/drawing/2014/main" id="{30481321-1A73-6E30-785E-E93F92190427}"/>
               </a:ext>
             </a:extLst>
           </p:cNvPr>
@@ -9209,8 +9003,8 @@
         </p:blipFill>
         <p:spPr>
           <a:xfrm>
-            <a:off x="125046" y="3744547"/>
-            <a:ext cx="3873500" cy="1549400"/>
+            <a:off x="9587730" y="981639"/>
+            <a:ext cx="2510773" cy="1004309"/>
           </a:xfrm>
           <a:prstGeom prst="rect">
             <a:avLst/>
@@ -9219,10 +9013,40 @@
       </p:pic>
       <p:pic>
         <p:nvPicPr>
-          <p:cNvPr id="15" name="Picture 14" descr="A group of trees with pink flowers&#10;&#10;AI-generated content may be incorrect.">
-            <a:extLst>
-              <a:ext uri="{FF2B5EF4-FFF2-40B4-BE49-F238E27FC236}">
-                <a16:creationId xmlns:a16="http://schemas.microsoft.com/office/drawing/2014/main" id="{6BA4A803-42C1-7FEC-7195-E223A921AA82}"/>
+          <p:cNvPr id="15" name="Picture 14" descr="A drawing of a landscape with trees and mountains&#10;&#10;AI-generated content may be incorrect.">
+            <a:extLst>
+              <a:ext uri="{FF2B5EF4-FFF2-40B4-BE49-F238E27FC236}">
+                <a16:creationId xmlns:a16="http://schemas.microsoft.com/office/drawing/2014/main" id="{CA0CDEE1-3FD0-8FB6-C8A4-90F6C3106B94}"/>
+              </a:ext>
+            </a:extLst>
+          </p:cNvPr>
+          <p:cNvPicPr>
+            <a:picLocks noChangeAspect="1"/>
+          </p:cNvPicPr>
+          <p:nvPr/>
+        </p:nvPicPr>
+        <p:blipFill>
+          <a:blip r:embed="rId6"/>
+          <a:stretch>
+            <a:fillRect/>
+          </a:stretch>
+        </p:blipFill>
+        <p:spPr>
+          <a:xfrm>
+            <a:off x="3382600" y="1521802"/>
+            <a:ext cx="2946003" cy="1178401"/>
+          </a:xfrm>
+          <a:prstGeom prst="rect">
+            <a:avLst/>
+          </a:prstGeom>
+        </p:spPr>
+      </p:pic>
+      <p:pic>
+        <p:nvPicPr>
+          <p:cNvPr id="17" name="Picture 16" descr="A green and grey mountains&#10;&#10;AI-generated content may be incorrect.">
+            <a:extLst>
+              <a:ext uri="{FF2B5EF4-FFF2-40B4-BE49-F238E27FC236}">
+                <a16:creationId xmlns:a16="http://schemas.microsoft.com/office/drawing/2014/main" id="{1C57569B-AD50-4A4F-BA53-F1127AC31BCA}"/>
               </a:ext>
             </a:extLst>
           </p:cNvPr>
@@ -9239,8 +9063,8 @@
         </p:blipFill>
         <p:spPr>
           <a:xfrm>
-            <a:off x="102579" y="2021254"/>
-            <a:ext cx="3873500" cy="1549400"/>
+            <a:off x="4199401" y="4489511"/>
+            <a:ext cx="3519364" cy="1407746"/>
           </a:xfrm>
           <a:prstGeom prst="rect">
             <a:avLst/>
@@ -9249,10 +9073,10 @@
       </p:pic>
       <p:pic>
         <p:nvPicPr>
-          <p:cNvPr id="17" name="Picture 16" descr="A group of trees with pink flowers&#10;&#10;AI-generated content may be incorrect.">
-            <a:extLst>
-              <a:ext uri="{FF2B5EF4-FFF2-40B4-BE49-F238E27FC236}">
-                <a16:creationId xmlns:a16="http://schemas.microsoft.com/office/drawing/2014/main" id="{0A433662-E0C4-4CFB-ACA2-154AB39D4B4A}"/>
+          <p:cNvPr id="19" name="Picture 18" descr="A green and grey mountains&#10;&#10;AI-generated content may be incorrect.">
+            <a:extLst>
+              <a:ext uri="{FF2B5EF4-FFF2-40B4-BE49-F238E27FC236}">
+                <a16:creationId xmlns:a16="http://schemas.microsoft.com/office/drawing/2014/main" id="{763B6504-84F6-9CC0-D4B6-33685D86A017}"/>
               </a:ext>
             </a:extLst>
           </p:cNvPr>
@@ -9269,8 +9093,8 @@
         </p:blipFill>
         <p:spPr>
           <a:xfrm>
-            <a:off x="8032750" y="297961"/>
-            <a:ext cx="3873501" cy="1549400"/>
+            <a:off x="249789" y="1504449"/>
+            <a:ext cx="2989385" cy="1195754"/>
           </a:xfrm>
           <a:prstGeom prst="rect">
             <a:avLst/>
@@ -9279,10 +9103,10 @@
       </p:pic>
       <p:pic>
         <p:nvPicPr>
-          <p:cNvPr id="19" name="Picture 18" descr="A group of trees with pink flowers&#10;&#10;AI-generated content may be incorrect.">
-            <a:extLst>
-              <a:ext uri="{FF2B5EF4-FFF2-40B4-BE49-F238E27FC236}">
-                <a16:creationId xmlns:a16="http://schemas.microsoft.com/office/drawing/2014/main" id="{D5A0CDB9-D245-CE01-4531-9D2E8F4AA32F}"/>
+          <p:cNvPr id="21" name="Picture 20" descr="A green and grey landscape&#10;&#10;AI-generated content may be incorrect.">
+            <a:extLst>
+              <a:ext uri="{FF2B5EF4-FFF2-40B4-BE49-F238E27FC236}">
+                <a16:creationId xmlns:a16="http://schemas.microsoft.com/office/drawing/2014/main" id="{84E958D1-4D72-9E66-2FF3-CF7EE54F4183}"/>
               </a:ext>
             </a:extLst>
           </p:cNvPr>
@@ -9299,7 +9123,7 @@
         </p:blipFill>
         <p:spPr>
           <a:xfrm>
-            <a:off x="4077188" y="303823"/>
+            <a:off x="209699" y="4489511"/>
             <a:ext cx="3873500" cy="1549400"/>
           </a:xfrm>
           <a:prstGeom prst="rect">
@@ -9309,10 +9133,10 @@
       </p:pic>
       <p:pic>
         <p:nvPicPr>
-          <p:cNvPr id="21" name="Picture 20" descr="A tree with pink flowers&#10;&#10;AI-generated content may be incorrect.">
-            <a:extLst>
-              <a:ext uri="{FF2B5EF4-FFF2-40B4-BE49-F238E27FC236}">
-                <a16:creationId xmlns:a16="http://schemas.microsoft.com/office/drawing/2014/main" id="{9088EFA8-6571-69CA-B6B1-088E734DA7A9}"/>
+          <p:cNvPr id="23" name="Picture 22" descr="A green and grey landscape&#10;&#10;AI-generated content may be incorrect.">
+            <a:extLst>
+              <a:ext uri="{FF2B5EF4-FFF2-40B4-BE49-F238E27FC236}">
+                <a16:creationId xmlns:a16="http://schemas.microsoft.com/office/drawing/2014/main" id="{DF6FBD12-69DA-3391-89C8-3EBFAF755E67}"/>
               </a:ext>
             </a:extLst>
           </p:cNvPr>
@@ -9329,8 +9153,98 @@
         </p:blipFill>
         <p:spPr>
           <a:xfrm>
-            <a:off x="102579" y="297961"/>
+            <a:off x="125634" y="2820409"/>
             <a:ext cx="3873500" cy="1549400"/>
+          </a:xfrm>
+          <a:prstGeom prst="rect">
+            <a:avLst/>
+          </a:prstGeom>
+        </p:spPr>
+      </p:pic>
+      <p:pic>
+        <p:nvPicPr>
+          <p:cNvPr id="25" name="Picture 24" descr="A drawing of a landscape&#10;&#10;AI-generated content may be incorrect.">
+            <a:extLst>
+              <a:ext uri="{FF2B5EF4-FFF2-40B4-BE49-F238E27FC236}">
+                <a16:creationId xmlns:a16="http://schemas.microsoft.com/office/drawing/2014/main" id="{10E9CC11-A8D4-BDEA-7903-91F83292B09A}"/>
+              </a:ext>
+            </a:extLst>
+          </p:cNvPr>
+          <p:cNvPicPr>
+            <a:picLocks noChangeAspect="1"/>
+          </p:cNvPicPr>
+          <p:nvPr/>
+        </p:nvPicPr>
+        <p:blipFill>
+          <a:blip r:embed="rId11"/>
+          <a:stretch>
+            <a:fillRect/>
+          </a:stretch>
+        </p:blipFill>
+        <p:spPr>
+          <a:xfrm>
+            <a:off x="6385884" y="1500377"/>
+            <a:ext cx="2946003" cy="1178401"/>
+          </a:xfrm>
+          <a:prstGeom prst="rect">
+            <a:avLst/>
+          </a:prstGeom>
+        </p:spPr>
+      </p:pic>
+      <p:pic>
+        <p:nvPicPr>
+          <p:cNvPr id="27" name="Picture 26" descr="A drawing of trees and mountains&#10;&#10;AI-generated content may be incorrect.">
+            <a:extLst>
+              <a:ext uri="{FF2B5EF4-FFF2-40B4-BE49-F238E27FC236}">
+                <a16:creationId xmlns:a16="http://schemas.microsoft.com/office/drawing/2014/main" id="{6F9C5057-D209-1FFA-C895-4234976AA4E8}"/>
+              </a:ext>
+            </a:extLst>
+          </p:cNvPr>
+          <p:cNvPicPr>
+            <a:picLocks noChangeAspect="1"/>
+          </p:cNvPicPr>
+          <p:nvPr/>
+        </p:nvPicPr>
+        <p:blipFill>
+          <a:blip r:embed="rId12"/>
+          <a:stretch>
+            <a:fillRect/>
+          </a:stretch>
+        </p:blipFill>
+        <p:spPr>
+          <a:xfrm>
+            <a:off x="3375237" y="268618"/>
+            <a:ext cx="2953366" cy="1181346"/>
+          </a:xfrm>
+          <a:prstGeom prst="rect">
+            <a:avLst/>
+          </a:prstGeom>
+        </p:spPr>
+      </p:pic>
+      <p:pic>
+        <p:nvPicPr>
+          <p:cNvPr id="29" name="Picture 28" descr="A drawing of trees and mountains&#10;&#10;AI-generated content may be incorrect.">
+            <a:extLst>
+              <a:ext uri="{FF2B5EF4-FFF2-40B4-BE49-F238E27FC236}">
+                <a16:creationId xmlns:a16="http://schemas.microsoft.com/office/drawing/2014/main" id="{77D12A4B-A9AA-CE91-2E76-C337E137A3D6}"/>
+              </a:ext>
+            </a:extLst>
+          </p:cNvPr>
+          <p:cNvPicPr>
+            <a:picLocks noChangeAspect="1"/>
+          </p:cNvPicPr>
+          <p:nvPr/>
+        </p:nvPicPr>
+        <p:blipFill>
+          <a:blip r:embed="rId13"/>
+          <a:stretch>
+            <a:fillRect/>
+          </a:stretch>
+        </p:blipFill>
+        <p:spPr>
+          <a:xfrm>
+            <a:off x="236819" y="256290"/>
+            <a:ext cx="3068760" cy="1227504"/>
           </a:xfrm>
           <a:prstGeom prst="rect">
             <a:avLst/>
@@ -9340,7 +9254,7 @@
     </p:spTree>
     <p:extLst>
       <p:ext uri="{BB962C8B-B14F-4D97-AF65-F5344CB8AC3E}">
-        <p14:creationId xmlns:p14="http://schemas.microsoft.com/office/powerpoint/2010/main" val="2982297825"/>
+        <p14:creationId xmlns:p14="http://schemas.microsoft.com/office/powerpoint/2010/main" val="1839365695"/>
       </p:ext>
     </p:extLst>
   </p:cSld>
@@ -9369,10 +9283,10 @@
       </p:grpSpPr>
       <p:pic>
         <p:nvPicPr>
-          <p:cNvPr id="5" name="Picture 4" descr="A cartoon of a green creature with a yellow hat&#10;&#10;AI-generated content may be incorrect.">
-            <a:extLst>
-              <a:ext uri="{FF2B5EF4-FFF2-40B4-BE49-F238E27FC236}">
-                <a16:creationId xmlns:a16="http://schemas.microsoft.com/office/drawing/2014/main" id="{199A0CAA-A91E-5384-5F07-0929EB805BB0}"/>
+          <p:cNvPr id="5" name="Picture 4" descr="A tree with pink flowers&#10;&#10;AI-generated content may be incorrect.">
+            <a:extLst>
+              <a:ext uri="{FF2B5EF4-FFF2-40B4-BE49-F238E27FC236}">
+                <a16:creationId xmlns:a16="http://schemas.microsoft.com/office/drawing/2014/main" id="{A323C376-344A-C5B3-6AB6-978B6D96FDD7}"/>
               </a:ext>
             </a:extLst>
           </p:cNvPr>
@@ -9389,8 +9303,8 @@
         </p:blipFill>
         <p:spPr>
           <a:xfrm>
-            <a:off x="3642719" y="544840"/>
-            <a:ext cx="2768600" cy="1549400"/>
+            <a:off x="4077188" y="2016858"/>
+            <a:ext cx="3873500" cy="1549400"/>
           </a:xfrm>
           <a:prstGeom prst="rect">
             <a:avLst/>
@@ -9399,10 +9313,10 @@
       </p:pic>
       <p:pic>
         <p:nvPicPr>
-          <p:cNvPr id="7" name="Picture 6" descr="A drawing of a blue ghost&#10;&#10;AI-generated content may be incorrect.">
-            <a:extLst>
-              <a:ext uri="{FF2B5EF4-FFF2-40B4-BE49-F238E27FC236}">
-                <a16:creationId xmlns:a16="http://schemas.microsoft.com/office/drawing/2014/main" id="{A599EF02-04EB-849F-E026-777ED72F821E}"/>
+          <p:cNvPr id="7" name="Picture 6" descr="A tree with pink flowers&#10;&#10;AI-generated content may be incorrect.">
+            <a:extLst>
+              <a:ext uri="{FF2B5EF4-FFF2-40B4-BE49-F238E27FC236}">
+                <a16:creationId xmlns:a16="http://schemas.microsoft.com/office/drawing/2014/main" id="{5A3FE8E8-E17C-1915-D591-86C3AE423BF1}"/>
               </a:ext>
             </a:extLst>
           </p:cNvPr>
@@ -9419,8 +9333,8 @@
         </p:blipFill>
         <p:spPr>
           <a:xfrm>
-            <a:off x="1233914" y="728835"/>
-            <a:ext cx="2768600" cy="1549400"/>
+            <a:off x="4077188" y="3744547"/>
+            <a:ext cx="3873500" cy="1549400"/>
           </a:xfrm>
           <a:prstGeom prst="rect">
             <a:avLst/>
@@ -9429,10 +9343,10 @@
       </p:pic>
       <p:pic>
         <p:nvPicPr>
-          <p:cNvPr id="9" name="Picture 8" descr="A drawing of a triangle with pink flowers&#10;&#10;AI-generated content may be incorrect.">
-            <a:extLst>
-              <a:ext uri="{FF2B5EF4-FFF2-40B4-BE49-F238E27FC236}">
-                <a16:creationId xmlns:a16="http://schemas.microsoft.com/office/drawing/2014/main" id="{F9986131-FF00-9D45-51BC-2D9CBFBD6A2B}"/>
+          <p:cNvPr id="9" name="Picture 8" descr="A group of trees with pink spots&#10;&#10;AI-generated content may be incorrect.">
+            <a:extLst>
+              <a:ext uri="{FF2B5EF4-FFF2-40B4-BE49-F238E27FC236}">
+                <a16:creationId xmlns:a16="http://schemas.microsoft.com/office/drawing/2014/main" id="{CA4B2934-730C-40D3-384A-84F765FE52D8}"/>
               </a:ext>
             </a:extLst>
           </p:cNvPr>
@@ -9449,8 +9363,8 @@
         </p:blipFill>
         <p:spPr>
           <a:xfrm>
-            <a:off x="1109082" y="2568362"/>
-            <a:ext cx="2768600" cy="1549400"/>
+            <a:off x="8032751" y="2021254"/>
+            <a:ext cx="3873500" cy="1549400"/>
           </a:xfrm>
           <a:prstGeom prst="rect">
             <a:avLst/>
@@ -9459,10 +9373,10 @@
       </p:pic>
       <p:pic>
         <p:nvPicPr>
-          <p:cNvPr id="11" name="Picture 10" descr="A green and pink cartoon&#10;&#10;AI-generated content may be incorrect.">
-            <a:extLst>
-              <a:ext uri="{FF2B5EF4-FFF2-40B4-BE49-F238E27FC236}">
-                <a16:creationId xmlns:a16="http://schemas.microsoft.com/office/drawing/2014/main" id="{4AA0DA96-1AF2-6728-0B1E-BCAECE257596}"/>
+          <p:cNvPr id="11" name="Picture 10" descr="A drawing of trees with pink flowers&#10;&#10;AI-generated content may be incorrect.">
+            <a:extLst>
+              <a:ext uri="{FF2B5EF4-FFF2-40B4-BE49-F238E27FC236}">
+                <a16:creationId xmlns:a16="http://schemas.microsoft.com/office/drawing/2014/main" id="{11C0E5B4-B834-755A-7129-7F8C65D2078B}"/>
               </a:ext>
             </a:extLst>
           </p:cNvPr>
@@ -9479,8 +9393,158 @@
         </p:blipFill>
         <p:spPr>
           <a:xfrm>
-            <a:off x="3877682" y="1984607"/>
-            <a:ext cx="3470972" cy="2423282"/>
+            <a:off x="8032751" y="3744547"/>
+            <a:ext cx="3873500" cy="1549400"/>
+          </a:xfrm>
+          <a:prstGeom prst="rect">
+            <a:avLst/>
+          </a:prstGeom>
+        </p:spPr>
+      </p:pic>
+      <p:pic>
+        <p:nvPicPr>
+          <p:cNvPr id="13" name="Picture 12" descr="A group of trees with pink flowers&#10;&#10;AI-generated content may be incorrect.">
+            <a:extLst>
+              <a:ext uri="{FF2B5EF4-FFF2-40B4-BE49-F238E27FC236}">
+                <a16:creationId xmlns:a16="http://schemas.microsoft.com/office/drawing/2014/main" id="{E6BF121E-5A2F-8C6A-A4D6-2072A06B1D76}"/>
+              </a:ext>
+            </a:extLst>
+          </p:cNvPr>
+          <p:cNvPicPr>
+            <a:picLocks noChangeAspect="1"/>
+          </p:cNvPicPr>
+          <p:nvPr/>
+        </p:nvPicPr>
+        <p:blipFill>
+          <a:blip r:embed="rId6"/>
+          <a:stretch>
+            <a:fillRect/>
+          </a:stretch>
+        </p:blipFill>
+        <p:spPr>
+          <a:xfrm>
+            <a:off x="125046" y="3744547"/>
+            <a:ext cx="3873500" cy="1549400"/>
+          </a:xfrm>
+          <a:prstGeom prst="rect">
+            <a:avLst/>
+          </a:prstGeom>
+        </p:spPr>
+      </p:pic>
+      <p:pic>
+        <p:nvPicPr>
+          <p:cNvPr id="15" name="Picture 14" descr="A group of trees with pink flowers&#10;&#10;AI-generated content may be incorrect.">
+            <a:extLst>
+              <a:ext uri="{FF2B5EF4-FFF2-40B4-BE49-F238E27FC236}">
+                <a16:creationId xmlns:a16="http://schemas.microsoft.com/office/drawing/2014/main" id="{6BA4A803-42C1-7FEC-7195-E223A921AA82}"/>
+              </a:ext>
+            </a:extLst>
+          </p:cNvPr>
+          <p:cNvPicPr>
+            <a:picLocks noChangeAspect="1"/>
+          </p:cNvPicPr>
+          <p:nvPr/>
+        </p:nvPicPr>
+        <p:blipFill>
+          <a:blip r:embed="rId7"/>
+          <a:stretch>
+            <a:fillRect/>
+          </a:stretch>
+        </p:blipFill>
+        <p:spPr>
+          <a:xfrm>
+            <a:off x="102579" y="2021254"/>
+            <a:ext cx="3873500" cy="1549400"/>
+          </a:xfrm>
+          <a:prstGeom prst="rect">
+            <a:avLst/>
+          </a:prstGeom>
+        </p:spPr>
+      </p:pic>
+      <p:pic>
+        <p:nvPicPr>
+          <p:cNvPr id="17" name="Picture 16" descr="A group of trees with pink flowers&#10;&#10;AI-generated content may be incorrect.">
+            <a:extLst>
+              <a:ext uri="{FF2B5EF4-FFF2-40B4-BE49-F238E27FC236}">
+                <a16:creationId xmlns:a16="http://schemas.microsoft.com/office/drawing/2014/main" id="{0A433662-E0C4-4CFB-ACA2-154AB39D4B4A}"/>
+              </a:ext>
+            </a:extLst>
+          </p:cNvPr>
+          <p:cNvPicPr>
+            <a:picLocks noChangeAspect="1"/>
+          </p:cNvPicPr>
+          <p:nvPr/>
+        </p:nvPicPr>
+        <p:blipFill>
+          <a:blip r:embed="rId8"/>
+          <a:stretch>
+            <a:fillRect/>
+          </a:stretch>
+        </p:blipFill>
+        <p:spPr>
+          <a:xfrm>
+            <a:off x="8032750" y="297961"/>
+            <a:ext cx="3873501" cy="1549400"/>
+          </a:xfrm>
+          <a:prstGeom prst="rect">
+            <a:avLst/>
+          </a:prstGeom>
+        </p:spPr>
+      </p:pic>
+      <p:pic>
+        <p:nvPicPr>
+          <p:cNvPr id="19" name="Picture 18" descr="A group of trees with pink flowers&#10;&#10;AI-generated content may be incorrect.">
+            <a:extLst>
+              <a:ext uri="{FF2B5EF4-FFF2-40B4-BE49-F238E27FC236}">
+                <a16:creationId xmlns:a16="http://schemas.microsoft.com/office/drawing/2014/main" id="{D5A0CDB9-D245-CE01-4531-9D2E8F4AA32F}"/>
+              </a:ext>
+            </a:extLst>
+          </p:cNvPr>
+          <p:cNvPicPr>
+            <a:picLocks noChangeAspect="1"/>
+          </p:cNvPicPr>
+          <p:nvPr/>
+        </p:nvPicPr>
+        <p:blipFill>
+          <a:blip r:embed="rId9"/>
+          <a:stretch>
+            <a:fillRect/>
+          </a:stretch>
+        </p:blipFill>
+        <p:spPr>
+          <a:xfrm>
+            <a:off x="4077188" y="303823"/>
+            <a:ext cx="3873500" cy="1549400"/>
+          </a:xfrm>
+          <a:prstGeom prst="rect">
+            <a:avLst/>
+          </a:prstGeom>
+        </p:spPr>
+      </p:pic>
+      <p:pic>
+        <p:nvPicPr>
+          <p:cNvPr id="21" name="Picture 20" descr="A tree with pink flowers&#10;&#10;AI-generated content may be incorrect.">
+            <a:extLst>
+              <a:ext uri="{FF2B5EF4-FFF2-40B4-BE49-F238E27FC236}">
+                <a16:creationId xmlns:a16="http://schemas.microsoft.com/office/drawing/2014/main" id="{9088EFA8-6571-69CA-B6B1-088E734DA7A9}"/>
+              </a:ext>
+            </a:extLst>
+          </p:cNvPr>
+          <p:cNvPicPr>
+            <a:picLocks noChangeAspect="1"/>
+          </p:cNvPicPr>
+          <p:nvPr/>
+        </p:nvPicPr>
+        <p:blipFill>
+          <a:blip r:embed="rId10"/>
+          <a:stretch>
+            <a:fillRect/>
+          </a:stretch>
+        </p:blipFill>
+        <p:spPr>
+          <a:xfrm>
+            <a:off x="102579" y="297961"/>
+            <a:ext cx="3873500" cy="1549400"/>
           </a:xfrm>
           <a:prstGeom prst="rect">
             <a:avLst/>
@@ -9490,7 +9554,7 @@
     </p:spTree>
     <p:extLst>
       <p:ext uri="{BB962C8B-B14F-4D97-AF65-F5344CB8AC3E}">
-        <p14:creationId xmlns:p14="http://schemas.microsoft.com/office/powerpoint/2010/main" val="3738183592"/>
+        <p14:creationId xmlns:p14="http://schemas.microsoft.com/office/powerpoint/2010/main" val="2982297825"/>
       </p:ext>
     </p:extLst>
   </p:cSld>
@@ -9519,6 +9583,156 @@
       </p:grpSpPr>
       <p:pic>
         <p:nvPicPr>
+          <p:cNvPr id="5" name="Picture 4" descr="A cartoon of a green creature with a yellow hat&#10;&#10;AI-generated content may be incorrect.">
+            <a:extLst>
+              <a:ext uri="{FF2B5EF4-FFF2-40B4-BE49-F238E27FC236}">
+                <a16:creationId xmlns:a16="http://schemas.microsoft.com/office/drawing/2014/main" id="{199A0CAA-A91E-5384-5F07-0929EB805BB0}"/>
+              </a:ext>
+            </a:extLst>
+          </p:cNvPr>
+          <p:cNvPicPr>
+            <a:picLocks noChangeAspect="1"/>
+          </p:cNvPicPr>
+          <p:nvPr/>
+        </p:nvPicPr>
+        <p:blipFill>
+          <a:blip r:embed="rId2"/>
+          <a:stretch>
+            <a:fillRect/>
+          </a:stretch>
+        </p:blipFill>
+        <p:spPr>
+          <a:xfrm>
+            <a:off x="3642719" y="544840"/>
+            <a:ext cx="2768600" cy="1549400"/>
+          </a:xfrm>
+          <a:prstGeom prst="rect">
+            <a:avLst/>
+          </a:prstGeom>
+        </p:spPr>
+      </p:pic>
+      <p:pic>
+        <p:nvPicPr>
+          <p:cNvPr id="7" name="Picture 6" descr="A drawing of a blue ghost&#10;&#10;AI-generated content may be incorrect.">
+            <a:extLst>
+              <a:ext uri="{FF2B5EF4-FFF2-40B4-BE49-F238E27FC236}">
+                <a16:creationId xmlns:a16="http://schemas.microsoft.com/office/drawing/2014/main" id="{A599EF02-04EB-849F-E026-777ED72F821E}"/>
+              </a:ext>
+            </a:extLst>
+          </p:cNvPr>
+          <p:cNvPicPr>
+            <a:picLocks noChangeAspect="1"/>
+          </p:cNvPicPr>
+          <p:nvPr/>
+        </p:nvPicPr>
+        <p:blipFill>
+          <a:blip r:embed="rId3"/>
+          <a:stretch>
+            <a:fillRect/>
+          </a:stretch>
+        </p:blipFill>
+        <p:spPr>
+          <a:xfrm>
+            <a:off x="1233914" y="728835"/>
+            <a:ext cx="2768600" cy="1549400"/>
+          </a:xfrm>
+          <a:prstGeom prst="rect">
+            <a:avLst/>
+          </a:prstGeom>
+        </p:spPr>
+      </p:pic>
+      <p:pic>
+        <p:nvPicPr>
+          <p:cNvPr id="9" name="Picture 8" descr="A drawing of a triangle with pink flowers&#10;&#10;AI-generated content may be incorrect.">
+            <a:extLst>
+              <a:ext uri="{FF2B5EF4-FFF2-40B4-BE49-F238E27FC236}">
+                <a16:creationId xmlns:a16="http://schemas.microsoft.com/office/drawing/2014/main" id="{F9986131-FF00-9D45-51BC-2D9CBFBD6A2B}"/>
+              </a:ext>
+            </a:extLst>
+          </p:cNvPr>
+          <p:cNvPicPr>
+            <a:picLocks noChangeAspect="1"/>
+          </p:cNvPicPr>
+          <p:nvPr/>
+        </p:nvPicPr>
+        <p:blipFill>
+          <a:blip r:embed="rId4"/>
+          <a:stretch>
+            <a:fillRect/>
+          </a:stretch>
+        </p:blipFill>
+        <p:spPr>
+          <a:xfrm>
+            <a:off x="1109082" y="2568362"/>
+            <a:ext cx="2768600" cy="1549400"/>
+          </a:xfrm>
+          <a:prstGeom prst="rect">
+            <a:avLst/>
+          </a:prstGeom>
+        </p:spPr>
+      </p:pic>
+      <p:pic>
+        <p:nvPicPr>
+          <p:cNvPr id="11" name="Picture 10" descr="A green and pink cartoon&#10;&#10;AI-generated content may be incorrect.">
+            <a:extLst>
+              <a:ext uri="{FF2B5EF4-FFF2-40B4-BE49-F238E27FC236}">
+                <a16:creationId xmlns:a16="http://schemas.microsoft.com/office/drawing/2014/main" id="{4AA0DA96-1AF2-6728-0B1E-BCAECE257596}"/>
+              </a:ext>
+            </a:extLst>
+          </p:cNvPr>
+          <p:cNvPicPr>
+            <a:picLocks noChangeAspect="1"/>
+          </p:cNvPicPr>
+          <p:nvPr/>
+        </p:nvPicPr>
+        <p:blipFill>
+          <a:blip r:embed="rId5"/>
+          <a:stretch>
+            <a:fillRect/>
+          </a:stretch>
+        </p:blipFill>
+        <p:spPr>
+          <a:xfrm>
+            <a:off x="3877682" y="1984607"/>
+            <a:ext cx="3470972" cy="2423282"/>
+          </a:xfrm>
+          <a:prstGeom prst="rect">
+            <a:avLst/>
+          </a:prstGeom>
+        </p:spPr>
+      </p:pic>
+    </p:spTree>
+    <p:extLst>
+      <p:ext uri="{BB962C8B-B14F-4D97-AF65-F5344CB8AC3E}">
+        <p14:creationId xmlns:p14="http://schemas.microsoft.com/office/powerpoint/2010/main" val="3738183592"/>
+      </p:ext>
+    </p:extLst>
+  </p:cSld>
+  <p:clrMapOvr>
+    <a:masterClrMapping/>
+  </p:clrMapOvr>
+</p:sld>
+</file>
+
+<file path=ppt/slides/slide7.xml><?xml version="1.0" encoding="utf-8"?>
+<p:sld xmlns:a="http://schemas.openxmlformats.org/drawingml/2006/main" xmlns:r="http://schemas.openxmlformats.org/officeDocument/2006/relationships" xmlns:p="http://schemas.openxmlformats.org/presentationml/2006/main">
+  <p:cSld>
+    <p:spTree>
+      <p:nvGrpSpPr>
+        <p:cNvPr id="1" name=""/>
+        <p:cNvGrpSpPr/>
+        <p:nvPr/>
+      </p:nvGrpSpPr>
+      <p:grpSpPr>
+        <a:xfrm>
+          <a:off x="0" y="0"/>
+          <a:ext cx="0" cy="0"/>
+          <a:chOff x="0" y="0"/>
+          <a:chExt cx="0" cy="0"/>
+        </a:xfrm>
+      </p:grpSpPr>
+      <p:pic>
+        <p:nvPicPr>
           <p:cNvPr id="5" name="Picture 4" descr="A drawing of a hat with flowers&#10;&#10;AI-generated content may be incorrect.">
             <a:extLst>
               <a:ext uri="{FF2B5EF4-FFF2-40B4-BE49-F238E27FC236}">
@@ -9590,7 +9804,7 @@
 </p:sld>
 </file>
 
-<file path=ppt/slides/slide7.xml><?xml version="1.0" encoding="utf-8"?>
+<file path=ppt/slides/slide8.xml><?xml version="1.0" encoding="utf-8"?>
 <p:sld xmlns:a="http://schemas.openxmlformats.org/drawingml/2006/main" xmlns:r="http://schemas.openxmlformats.org/officeDocument/2006/relationships" xmlns:p="http://schemas.openxmlformats.org/presentationml/2006/main">
   <p:cSld>
     <p:spTree>
@@ -10154,7 +10368,7 @@
 </p:sld>
 </file>
 
-<file path=ppt/slides/slide8.xml><?xml version="1.0" encoding="utf-8"?>
+<file path=ppt/slides/slide9.xml><?xml version="1.0" encoding="utf-8"?>
 <p:sld xmlns:a="http://schemas.openxmlformats.org/drawingml/2006/main" xmlns:r="http://schemas.openxmlformats.org/officeDocument/2006/relationships" xmlns:p="http://schemas.openxmlformats.org/presentationml/2006/main">
   <p:cSld>
     <p:spTree>
@@ -10205,89 +10419,6 @@
     <p:extLst>
       <p:ext uri="{BB962C8B-B14F-4D97-AF65-F5344CB8AC3E}">
         <p14:creationId xmlns:p14="http://schemas.microsoft.com/office/powerpoint/2010/main" val="1732224417"/>
-      </p:ext>
-    </p:extLst>
-  </p:cSld>
-  <p:clrMapOvr>
-    <a:masterClrMapping/>
-  </p:clrMapOvr>
-</p:sld>
-</file>
-
-<file path=ppt/slides/slide9.xml><?xml version="1.0" encoding="utf-8"?>
-<p:sld xmlns:a="http://schemas.openxmlformats.org/drawingml/2006/main" xmlns:r="http://schemas.openxmlformats.org/officeDocument/2006/relationships" xmlns:p="http://schemas.openxmlformats.org/presentationml/2006/main">
-  <p:cSld>
-    <p:spTree>
-      <p:nvGrpSpPr>
-        <p:cNvPr id="1" name=""/>
-        <p:cNvGrpSpPr/>
-        <p:nvPr/>
-      </p:nvGrpSpPr>
-      <p:grpSpPr>
-        <a:xfrm>
-          <a:off x="0" y="0"/>
-          <a:ext cx="0" cy="0"/>
-          <a:chOff x="0" y="0"/>
-          <a:chExt cx="0" cy="0"/>
-        </a:xfrm>
-      </p:grpSpPr>
-      <p:sp>
-        <p:nvSpPr>
-          <p:cNvPr id="2" name="Title 1">
-            <a:extLst>
-              <a:ext uri="{FF2B5EF4-FFF2-40B4-BE49-F238E27FC236}">
-                <a16:creationId xmlns:a16="http://schemas.microsoft.com/office/drawing/2014/main" id="{49B2ED90-812E-898F-8A8E-D1657D3C04D6}"/>
-              </a:ext>
-            </a:extLst>
-          </p:cNvPr>
-          <p:cNvSpPr>
-            <a:spLocks noGrp="1"/>
-          </p:cNvSpPr>
-          <p:nvPr>
-            <p:ph type="ctrTitle"/>
-          </p:nvPr>
-        </p:nvSpPr>
-        <p:spPr/>
-        <p:txBody>
-          <a:bodyPr/>
-          <a:lstStyle/>
-          <a:p>
-            <a:r>
-              <a:rPr lang="en-US" dirty="0"/>
-              <a:t>PLAYER</a:t>
-            </a:r>
-          </a:p>
-        </p:txBody>
-      </p:sp>
-      <p:sp>
-        <p:nvSpPr>
-          <p:cNvPr id="3" name="Subtitle 2">
-            <a:extLst>
-              <a:ext uri="{FF2B5EF4-FFF2-40B4-BE49-F238E27FC236}">
-                <a16:creationId xmlns:a16="http://schemas.microsoft.com/office/drawing/2014/main" id="{AED40BF7-86BE-3517-B91D-E84D7E18EB78}"/>
-              </a:ext>
-            </a:extLst>
-          </p:cNvPr>
-          <p:cNvSpPr>
-            <a:spLocks noGrp="1"/>
-          </p:cNvSpPr>
-          <p:nvPr>
-            <p:ph type="subTitle" idx="1"/>
-          </p:nvPr>
-        </p:nvSpPr>
-        <p:spPr/>
-        <p:txBody>
-          <a:bodyPr/>
-          <a:lstStyle/>
-          <a:p>
-            <a:endParaRPr lang="en-US"/>
-          </a:p>
-        </p:txBody>
-      </p:sp>
-    </p:spTree>
-    <p:extLst>
-      <p:ext uri="{BB962C8B-B14F-4D97-AF65-F5344CB8AC3E}">
-        <p14:creationId xmlns:p14="http://schemas.microsoft.com/office/powerpoint/2010/main" val="3886958778"/>
       </p:ext>
     </p:extLst>
   </p:cSld>

</xml_diff>

<commit_message>
changed title to project reap
</commit_message>
<xml_diff>
--- a/Scenery Layout.pptx
+++ b/Scenery Layout.pptx
@@ -5,7 +5,7 @@
     <p:sldMasterId id="2147483648" r:id="rId1"/>
   </p:sldMasterIdLst>
   <p:notesMasterIdLst>
-    <p:notesMasterId r:id="rId34"/>
+    <p:notesMasterId r:id="rId35"/>
   </p:notesMasterIdLst>
   <p:sldIdLst>
     <p:sldId id="256" r:id="rId2"/>
@@ -40,6 +40,7 @@
     <p:sldId id="284" r:id="rId31"/>
     <p:sldId id="285" r:id="rId32"/>
     <p:sldId id="286" r:id="rId33"/>
+    <p:sldId id="288" r:id="rId34"/>
   </p:sldIdLst>
   <p:sldSz cx="12192000" cy="6858000"/>
   <p:notesSz cx="6858000" cy="9144000"/>
@@ -8835,6 +8836,210 @@
     <p:extLst>
       <p:ext uri="{BB962C8B-B14F-4D97-AF65-F5344CB8AC3E}">
         <p14:creationId xmlns:p14="http://schemas.microsoft.com/office/powerpoint/2010/main" val="2824108225"/>
+      </p:ext>
+    </p:extLst>
+  </p:cSld>
+  <p:clrMapOvr>
+    <a:masterClrMapping/>
+  </p:clrMapOvr>
+</p:sld>
+</file>
+
+<file path=ppt/slides/slide33.xml><?xml version="1.0" encoding="utf-8"?>
+<p:sld xmlns:a="http://schemas.openxmlformats.org/drawingml/2006/main" xmlns:r="http://schemas.openxmlformats.org/officeDocument/2006/relationships" xmlns:p="http://schemas.openxmlformats.org/presentationml/2006/main">
+  <p:cSld>
+    <p:spTree>
+      <p:nvGrpSpPr>
+        <p:cNvPr id="1" name=""/>
+        <p:cNvGrpSpPr/>
+        <p:nvPr/>
+      </p:nvGrpSpPr>
+      <p:grpSpPr>
+        <a:xfrm>
+          <a:off x="0" y="0"/>
+          <a:ext cx="0" cy="0"/>
+          <a:chOff x="0" y="0"/>
+          <a:chExt cx="0" cy="0"/>
+        </a:xfrm>
+      </p:grpSpPr>
+      <p:pic>
+        <p:nvPicPr>
+          <p:cNvPr id="1026" name="Picture 2">
+            <a:extLst>
+              <a:ext uri="{FF2B5EF4-FFF2-40B4-BE49-F238E27FC236}">
+                <a16:creationId xmlns:a16="http://schemas.microsoft.com/office/drawing/2014/main" id="{43807020-7658-EC44-E33D-147FBC75EEF1}"/>
+              </a:ext>
+            </a:extLst>
+          </p:cNvPr>
+          <p:cNvPicPr>
+            <a:picLocks noChangeAspect="1" noChangeArrowheads="1"/>
+          </p:cNvPicPr>
+          <p:nvPr/>
+        </p:nvPicPr>
+        <p:blipFill rotWithShape="1">
+          <a:blip r:embed="rId2">
+            <a:extLst>
+              <a:ext uri="{28A0092B-C50C-407E-A947-70E740481C1C}">
+                <a14:useLocalDpi xmlns:a14="http://schemas.microsoft.com/office/drawing/2010/main" val="0"/>
+              </a:ext>
+            </a:extLst>
+          </a:blip>
+          <a:srcRect t="28580"/>
+          <a:stretch/>
+        </p:blipFill>
+        <p:spPr bwMode="auto">
+          <a:xfrm>
+            <a:off x="480809" y="2397080"/>
+            <a:ext cx="5098692" cy="1213834"/>
+          </a:xfrm>
+          <a:prstGeom prst="rect">
+            <a:avLst/>
+          </a:prstGeom>
+          <a:noFill/>
+          <a:extLst>
+            <a:ext uri="{909E8E84-426E-40DD-AFC4-6F175D3DCCD1}">
+              <a14:hiddenFill xmlns:a14="http://schemas.microsoft.com/office/drawing/2010/main">
+                <a:solidFill>
+                  <a:srgbClr val="FFFFFF"/>
+                </a:solidFill>
+              </a14:hiddenFill>
+            </a:ext>
+          </a:extLst>
+        </p:spPr>
+      </p:pic>
+      <p:pic>
+        <p:nvPicPr>
+          <p:cNvPr id="1028" name="Picture 4">
+            <a:extLst>
+              <a:ext uri="{FF2B5EF4-FFF2-40B4-BE49-F238E27FC236}">
+                <a16:creationId xmlns:a16="http://schemas.microsoft.com/office/drawing/2014/main" id="{C608121A-9D23-E0B9-7965-4A51596D9BFC}"/>
+              </a:ext>
+            </a:extLst>
+          </p:cNvPr>
+          <p:cNvPicPr>
+            <a:picLocks noChangeAspect="1" noChangeArrowheads="1"/>
+          </p:cNvPicPr>
+          <p:nvPr/>
+        </p:nvPicPr>
+        <p:blipFill rotWithShape="1">
+          <a:blip r:embed="rId3">
+            <a:extLst>
+              <a:ext uri="{28A0092B-C50C-407E-A947-70E740481C1C}">
+                <a14:useLocalDpi xmlns:a14="http://schemas.microsoft.com/office/drawing/2010/main" val="0"/>
+              </a:ext>
+            </a:extLst>
+          </a:blip>
+          <a:srcRect t="28960"/>
+          <a:stretch/>
+        </p:blipFill>
+        <p:spPr bwMode="auto">
+          <a:xfrm>
+            <a:off x="648234" y="515155"/>
+            <a:ext cx="10895532" cy="967525"/>
+          </a:xfrm>
+          <a:prstGeom prst="rect">
+            <a:avLst/>
+          </a:prstGeom>
+          <a:noFill/>
+          <a:extLst>
+            <a:ext uri="{909E8E84-426E-40DD-AFC4-6F175D3DCCD1}">
+              <a14:hiddenFill xmlns:a14="http://schemas.microsoft.com/office/drawing/2010/main">
+                <a:solidFill>
+                  <a:srgbClr val="FFFFFF"/>
+                </a:solidFill>
+              </a14:hiddenFill>
+            </a:ext>
+          </a:extLst>
+        </p:spPr>
+      </p:pic>
+      <p:sp>
+        <p:nvSpPr>
+          <p:cNvPr id="4" name="TextBox 3">
+            <a:extLst>
+              <a:ext uri="{FF2B5EF4-FFF2-40B4-BE49-F238E27FC236}">
+                <a16:creationId xmlns:a16="http://schemas.microsoft.com/office/drawing/2014/main" id="{4504F9A1-0508-9FFE-3D8E-0B0BC983EF95}"/>
+              </a:ext>
+            </a:extLst>
+          </p:cNvPr>
+          <p:cNvSpPr txBox="1"/>
+          <p:nvPr/>
+        </p:nvSpPr>
+        <p:spPr>
+          <a:xfrm>
+            <a:off x="648233" y="1821686"/>
+            <a:ext cx="11037199" cy="369332"/>
+          </a:xfrm>
+          <a:prstGeom prst="rect">
+            <a:avLst/>
+          </a:prstGeom>
+          <a:solidFill>
+            <a:schemeClr val="accent2"/>
+          </a:solidFill>
+        </p:spPr>
+        <p:txBody>
+          <a:bodyPr wrap="square" rtlCol="0">
+            <a:spAutoFit/>
+          </a:bodyPr>
+          <a:lstStyle/>
+          <a:p>
+            <a:pPr algn="ctr"/>
+            <a:r>
+              <a:rPr lang="en-US" dirty="0">
+                <a:solidFill>
+                  <a:schemeClr val="bg1"/>
+                </a:solidFill>
+              </a:rPr>
+              <a:t>Attack</a:t>
+            </a:r>
+          </a:p>
+        </p:txBody>
+      </p:sp>
+      <p:sp>
+        <p:nvSpPr>
+          <p:cNvPr id="5" name="TextBox 4">
+            <a:extLst>
+              <a:ext uri="{FF2B5EF4-FFF2-40B4-BE49-F238E27FC236}">
+                <a16:creationId xmlns:a16="http://schemas.microsoft.com/office/drawing/2014/main" id="{6329CB90-F5B8-0C80-9614-750EC8C5D8E9}"/>
+              </a:ext>
+            </a:extLst>
+          </p:cNvPr>
+          <p:cNvSpPr txBox="1"/>
+          <p:nvPr/>
+        </p:nvSpPr>
+        <p:spPr>
+          <a:xfrm>
+            <a:off x="648234" y="3816976"/>
+            <a:ext cx="4735136" cy="369332"/>
+          </a:xfrm>
+          <a:prstGeom prst="rect">
+            <a:avLst/>
+          </a:prstGeom>
+          <a:solidFill>
+            <a:schemeClr val="accent2"/>
+          </a:solidFill>
+        </p:spPr>
+        <p:txBody>
+          <a:bodyPr wrap="square" rtlCol="0">
+            <a:spAutoFit/>
+          </a:bodyPr>
+          <a:lstStyle/>
+          <a:p>
+            <a:pPr algn="ctr"/>
+            <a:r>
+              <a:rPr lang="en-US" dirty="0">
+                <a:solidFill>
+                  <a:schemeClr val="bg1"/>
+                </a:solidFill>
+              </a:rPr>
+              <a:t>Idle</a:t>
+            </a:r>
+          </a:p>
+        </p:txBody>
+      </p:sp>
+    </p:spTree>
+    <p:extLst>
+      <p:ext uri="{BB962C8B-B14F-4D97-AF65-F5344CB8AC3E}">
+        <p14:creationId xmlns:p14="http://schemas.microsoft.com/office/powerpoint/2010/main" val="80237651"/>
       </p:ext>
     </p:extLst>
   </p:cSld>

</xml_diff>